<commit_message>
[DISC-4] Definition 페이지 개발
</commit_message>
<xml_diff>
--- a/src/img/IMG.pptx
+++ b/src/img/IMG.pptx
@@ -3857,10 +3857,10 @@
       </p:grpSpPr>
       <p:grpSp>
         <p:nvGrpSpPr>
-          <p:cNvPr id="6" name="그룹 5">
-            <a:extLst>
-              <a:ext uri="{FF2B5EF4-FFF2-40B4-BE49-F238E27FC236}">
-                <a16:creationId xmlns:a16="http://schemas.microsoft.com/office/drawing/2014/main" id="{18146137-7247-A9AE-5DE9-A3B9D1439078}"/>
+          <p:cNvPr id="28" name="그룹 27">
+            <a:extLst>
+              <a:ext uri="{FF2B5EF4-FFF2-40B4-BE49-F238E27FC236}">
+                <a16:creationId xmlns:a16="http://schemas.microsoft.com/office/drawing/2014/main" id="{51BA670A-2F71-F7C5-BAE0-6188C1600246}"/>
               </a:ext>
             </a:extLst>
           </p:cNvPr>
@@ -3869,91 +3869,181 @@
         </p:nvGrpSpPr>
         <p:grpSpPr>
           <a:xfrm>
-            <a:off x="3033297" y="1122693"/>
-            <a:ext cx="6123931" cy="4304838"/>
-            <a:chOff x="3033297" y="1122693"/>
-            <a:chExt cx="6123931" cy="4304838"/>
+            <a:off x="2136000" y="1265876"/>
+            <a:ext cx="7920000" cy="3960000"/>
+            <a:chOff x="2136000" y="1265876"/>
+            <a:chExt cx="7920000" cy="3963124"/>
           </a:xfrm>
         </p:grpSpPr>
-        <p:pic>
-          <p:nvPicPr>
-            <p:cNvPr id="17" name="그림 16">
+        <p:grpSp>
+          <p:nvGrpSpPr>
+            <p:cNvPr id="13" name="그룹 12">
               <a:extLst>
                 <a:ext uri="{FF2B5EF4-FFF2-40B4-BE49-F238E27FC236}">
-                  <a16:creationId xmlns:a16="http://schemas.microsoft.com/office/drawing/2014/main" id="{F5EBAD99-FF08-DB06-086A-AAF6897DA2A4}"/>
+                  <a16:creationId xmlns:a16="http://schemas.microsoft.com/office/drawing/2014/main" id="{9A3B6A26-5443-F689-A042-2EC9C0066BAC}"/>
                 </a:ext>
               </a:extLst>
             </p:cNvPr>
-            <p:cNvPicPr>
-              <a:picLocks noChangeAspect="1"/>
-            </p:cNvPicPr>
+            <p:cNvGrpSpPr/>
             <p:nvPr/>
-          </p:nvPicPr>
-          <p:blipFill>
-            <a:blip r:embed="rId2">
-              <a:extLst>
-                <a:ext uri="{28A0092B-C50C-407E-A947-70E740481C1C}">
-                  <a14:useLocalDpi xmlns:a14="http://schemas.microsoft.com/office/drawing/2010/main" val="0"/>
-                </a:ext>
-              </a:extLst>
-            </a:blip>
-            <a:stretch>
-              <a:fillRect/>
-            </a:stretch>
-          </p:blipFill>
-          <p:spPr>
+          </p:nvGrpSpPr>
+          <p:grpSpPr>
             <a:xfrm>
-              <a:off x="4276779" y="1476636"/>
-              <a:ext cx="3603048" cy="3596952"/>
+              <a:off x="4296000" y="1265876"/>
+              <a:ext cx="3600000" cy="3963124"/>
+              <a:chOff x="4296000" y="1265876"/>
+              <a:chExt cx="3600000" cy="3963124"/>
             </a:xfrm>
-            <a:prstGeom prst="rect">
-              <a:avLst/>
-            </a:prstGeom>
-          </p:spPr>
-        </p:pic>
+          </p:grpSpPr>
+          <p:pic>
+            <p:nvPicPr>
+              <p:cNvPr id="17" name="그림 16">
+                <a:extLst>
+                  <a:ext uri="{FF2B5EF4-FFF2-40B4-BE49-F238E27FC236}">
+                    <a16:creationId xmlns:a16="http://schemas.microsoft.com/office/drawing/2014/main" id="{F5EBAD99-FF08-DB06-086A-AAF6897DA2A4}"/>
+                  </a:ext>
+                </a:extLst>
+              </p:cNvPr>
+              <p:cNvPicPr>
+                <a:picLocks noChangeAspect="1"/>
+              </p:cNvPicPr>
+              <p:nvPr/>
+            </p:nvPicPr>
+            <p:blipFill>
+              <a:blip r:embed="rId2">
+                <a:extLst>
+                  <a:ext uri="{28A0092B-C50C-407E-A947-70E740481C1C}">
+                    <a14:useLocalDpi xmlns:a14="http://schemas.microsoft.com/office/drawing/2010/main" val="0"/>
+                  </a:ext>
+                </a:extLst>
+              </a:blip>
+              <a:stretch>
+                <a:fillRect/>
+              </a:stretch>
+            </p:blipFill>
+            <p:spPr>
+              <a:xfrm>
+                <a:off x="4296000" y="1629000"/>
+                <a:ext cx="3600000" cy="3600000"/>
+              </a:xfrm>
+              <a:prstGeom prst="rect">
+                <a:avLst/>
+              </a:prstGeom>
+            </p:spPr>
+          </p:pic>
+          <p:sp>
+            <p:nvSpPr>
+              <p:cNvPr id="12" name="직사각형 11">
+                <a:extLst>
+                  <a:ext uri="{FF2B5EF4-FFF2-40B4-BE49-F238E27FC236}">
+                    <a16:creationId xmlns:a16="http://schemas.microsoft.com/office/drawing/2014/main" id="{F5538747-7BDD-27C1-86FD-3E70D08257C4}"/>
+                  </a:ext>
+                </a:extLst>
+              </p:cNvPr>
+              <p:cNvSpPr/>
+              <p:nvPr/>
+            </p:nvSpPr>
+            <p:spPr>
+              <a:xfrm>
+                <a:off x="5556000" y="1265876"/>
+                <a:ext cx="1080000" cy="360000"/>
+              </a:xfrm>
+              <a:prstGeom prst="rect">
+                <a:avLst/>
+              </a:prstGeom>
+              <a:solidFill>
+                <a:schemeClr val="bg1"/>
+              </a:solidFill>
+              <a:ln>
+                <a:noFill/>
+              </a:ln>
+            </p:spPr>
+            <p:style>
+              <a:lnRef idx="2">
+                <a:schemeClr val="accent1">
+                  <a:shade val="50000"/>
+                </a:schemeClr>
+              </a:lnRef>
+              <a:fillRef idx="1">
+                <a:schemeClr val="accent1"/>
+              </a:fillRef>
+              <a:effectRef idx="0">
+                <a:schemeClr val="accent1"/>
+              </a:effectRef>
+              <a:fontRef idx="minor">
+                <a:schemeClr val="lt1"/>
+              </a:fontRef>
+            </p:style>
+            <p:txBody>
+              <a:bodyPr rtlCol="0" anchor="ctr"/>
+              <a:lstStyle/>
+              <a:p>
+                <a:pPr algn="ctr"/>
+                <a:endParaRPr lang="ko-KR" altLang="en-US"/>
+              </a:p>
+            </p:txBody>
+          </p:sp>
+        </p:grpSp>
         <p:sp>
           <p:nvSpPr>
-            <p:cNvPr id="2" name="TextBox 1">
+            <p:cNvPr id="24" name="직사각형 23">
               <a:extLst>
                 <a:ext uri="{FF2B5EF4-FFF2-40B4-BE49-F238E27FC236}">
-                  <a16:creationId xmlns:a16="http://schemas.microsoft.com/office/drawing/2014/main" id="{3608F848-62F2-CED6-6243-417FAB79D769}"/>
+                  <a16:creationId xmlns:a16="http://schemas.microsoft.com/office/drawing/2014/main" id="{15B49D55-C007-98E2-8E76-C9E026748FDE}"/>
                 </a:ext>
               </a:extLst>
             </p:cNvPr>
-            <p:cNvSpPr txBox="1"/>
+            <p:cNvSpPr/>
             <p:nvPr/>
           </p:nvSpPr>
           <p:spPr>
             <a:xfrm>
-              <a:off x="3033297" y="1122693"/>
-              <a:ext cx="1243482" cy="707886"/>
+              <a:off x="2136000" y="1625876"/>
+              <a:ext cx="2160000" cy="720000"/>
             </a:xfrm>
             <a:prstGeom prst="rect">
               <a:avLst/>
             </a:prstGeom>
             <a:noFill/>
+            <a:ln>
+              <a:noFill/>
+            </a:ln>
             <a:effectLst>
               <a:outerShdw blurRad="50800" dist="38100" dir="2700000" algn="tl" rotWithShape="0">
                 <a:srgbClr val="FF6565"/>
               </a:outerShdw>
             </a:effectLst>
           </p:spPr>
+          <p:style>
+            <a:lnRef idx="2">
+              <a:schemeClr val="accent1">
+                <a:shade val="50000"/>
+              </a:schemeClr>
+            </a:lnRef>
+            <a:fillRef idx="1">
+              <a:schemeClr val="accent1"/>
+            </a:fillRef>
+            <a:effectRef idx="0">
+              <a:schemeClr val="accent1"/>
+            </a:effectRef>
+            <a:fontRef idx="minor">
+              <a:schemeClr val="lt1"/>
+            </a:fontRef>
+          </p:style>
           <p:txBody>
-            <a:bodyPr wrap="none" rtlCol="0">
-              <a:spAutoFit/>
-            </a:bodyPr>
+            <a:bodyPr rtlCol="0" anchor="ctr"/>
             <a:lstStyle/>
             <a:p>
               <a:pPr algn="ctr"/>
               <a:r>
                 <a:rPr lang="en-US" altLang="ko-KR" sz="2000" b="1" dirty="0">
                   <a:solidFill>
-                    <a:srgbClr val="FF7575"/>
+                    <a:srgbClr val="FF6565"/>
                   </a:solidFill>
                   <a:latin typeface="Calibri" panose="020F0502020204030204" pitchFamily="34" charset="0"/>
                   <a:cs typeface="Calibri" panose="020F0502020204030204" pitchFamily="34" charset="0"/>
                 </a:rPr>
-                <a:t>Dominant</a:t>
+                <a:t>            Dominance</a:t>
               </a:r>
             </a:p>
             <a:p>
@@ -3961,7 +4051,111 @@
               <a:r>
                 <a:rPr lang="en-US" altLang="ko-KR" sz="2000" b="1" dirty="0">
                   <a:solidFill>
-                    <a:srgbClr val="FF7575"/>
+                    <a:srgbClr val="FF6565"/>
+                  </a:solidFill>
+                  <a:latin typeface="Calibri" panose="020F0502020204030204" pitchFamily="34" charset="0"/>
+                  <a:cs typeface="Calibri" panose="020F0502020204030204" pitchFamily="34" charset="0"/>
+                </a:rPr>
+                <a:t>             (</a:t>
+              </a:r>
+              <a:r>
+                <a:rPr lang="ko-KR" altLang="en-US" sz="2000" b="1" dirty="0">
+                  <a:solidFill>
+                    <a:srgbClr val="FF6565"/>
+                  </a:solidFill>
+                  <a:latin typeface="Calibri" panose="020F0502020204030204" pitchFamily="34" charset="0"/>
+                  <a:cs typeface="Calibri" panose="020F0502020204030204" pitchFamily="34" charset="0"/>
+                </a:rPr>
+                <a:t>주도형</a:t>
+              </a:r>
+              <a:r>
+                <a:rPr lang="en-US" altLang="ko-KR" sz="2000" b="1" dirty="0">
+                  <a:solidFill>
+                    <a:srgbClr val="FF6565"/>
+                  </a:solidFill>
+                  <a:latin typeface="Calibri" panose="020F0502020204030204" pitchFamily="34" charset="0"/>
+                  <a:cs typeface="Calibri" panose="020F0502020204030204" pitchFamily="34" charset="0"/>
+                </a:rPr>
+                <a:t>)</a:t>
+              </a:r>
+              <a:endParaRPr lang="ko-KR" altLang="en-US" sz="2000" b="1" dirty="0">
+                <a:solidFill>
+                  <a:srgbClr val="FF6565"/>
+                </a:solidFill>
+                <a:latin typeface="Calibri" panose="020F0502020204030204" pitchFamily="34" charset="0"/>
+                <a:cs typeface="Calibri" panose="020F0502020204030204" pitchFamily="34" charset="0"/>
+              </a:endParaRPr>
+            </a:p>
+          </p:txBody>
+        </p:sp>
+        <p:sp>
+          <p:nvSpPr>
+            <p:cNvPr id="25" name="직사각형 24">
+              <a:extLst>
+                <a:ext uri="{FF2B5EF4-FFF2-40B4-BE49-F238E27FC236}">
+                  <a16:creationId xmlns:a16="http://schemas.microsoft.com/office/drawing/2014/main" id="{87681379-2838-F2E0-E472-2C4284CC06D7}"/>
+                </a:ext>
+              </a:extLst>
+            </p:cNvPr>
+            <p:cNvSpPr/>
+            <p:nvPr/>
+          </p:nvSpPr>
+          <p:spPr>
+            <a:xfrm>
+              <a:off x="7896000" y="4509000"/>
+              <a:ext cx="2160000" cy="720000"/>
+            </a:xfrm>
+            <a:prstGeom prst="rect">
+              <a:avLst/>
+            </a:prstGeom>
+            <a:noFill/>
+            <a:ln>
+              <a:noFill/>
+            </a:ln>
+            <a:effectLst>
+              <a:outerShdw blurRad="50800" dist="38100" dir="2700000" algn="tl" rotWithShape="0">
+                <a:srgbClr val="77F586"/>
+              </a:outerShdw>
+            </a:effectLst>
+          </p:spPr>
+          <p:style>
+            <a:lnRef idx="2">
+              <a:schemeClr val="accent1">
+                <a:shade val="50000"/>
+              </a:schemeClr>
+            </a:lnRef>
+            <a:fillRef idx="1">
+              <a:schemeClr val="accent1"/>
+            </a:fillRef>
+            <a:effectRef idx="0">
+              <a:schemeClr val="accent1"/>
+            </a:effectRef>
+            <a:fontRef idx="minor">
+              <a:schemeClr val="lt1"/>
+            </a:fontRef>
+          </p:style>
+          <p:txBody>
+            <a:bodyPr rtlCol="0" anchor="ctr"/>
+            <a:lstStyle/>
+            <a:p>
+              <a:pPr algn="ctr"/>
+              <a:r>
+                <a:rPr lang="en-US" altLang="ko-KR" sz="2000" b="1" dirty="0">
+                  <a:solidFill>
+                    <a:srgbClr val="77F586"/>
+                  </a:solidFill>
+                  <a:latin typeface="Calibri" panose="020F0502020204030204" pitchFamily="34" charset="0"/>
+                  <a:cs typeface="Calibri" panose="020F0502020204030204" pitchFamily="34" charset="0"/>
+                </a:rPr>
+                <a:t>Conscientiousness</a:t>
+              </a:r>
+            </a:p>
+            <a:p>
+              <a:pPr algn="ctr"/>
+              <a:r>
+                <a:rPr lang="en-US" altLang="ko-KR" sz="2000" b="1" dirty="0">
+                  <a:solidFill>
+                    <a:srgbClr val="77F586"/>
                   </a:solidFill>
                   <a:latin typeface="Calibri" panose="020F0502020204030204" pitchFamily="34" charset="0"/>
                   <a:cs typeface="Calibri" panose="020F0502020204030204" pitchFamily="34" charset="0"/>
@@ -3971,17 +4165,17 @@
               <a:r>
                 <a:rPr lang="ko-KR" altLang="en-US" sz="2000" b="1" dirty="0">
                   <a:solidFill>
-                    <a:srgbClr val="FF7575"/>
+                    <a:srgbClr val="77F586"/>
                   </a:solidFill>
                   <a:latin typeface="Calibri" panose="020F0502020204030204" pitchFamily="34" charset="0"/>
                   <a:cs typeface="Calibri" panose="020F0502020204030204" pitchFamily="34" charset="0"/>
                 </a:rPr>
-                <a:t>주도형</a:t>
+                <a:t>신중형</a:t>
               </a:r>
               <a:r>
                 <a:rPr lang="en-US" altLang="ko-KR" sz="2000" b="1" dirty="0">
                   <a:solidFill>
-                    <a:srgbClr val="FF7575"/>
+                    <a:srgbClr val="77F586"/>
                   </a:solidFill>
                   <a:latin typeface="Calibri" panose="020F0502020204030204" pitchFamily="34" charset="0"/>
                   <a:cs typeface="Calibri" panose="020F0502020204030204" pitchFamily="34" charset="0"/>
@@ -3990,7 +4184,7 @@
               </a:r>
               <a:endParaRPr lang="ko-KR" altLang="en-US" sz="2000" b="1" dirty="0">
                 <a:solidFill>
-                  <a:srgbClr val="FF7575"/>
+                  <a:srgbClr val="77F586"/>
                 </a:solidFill>
                 <a:latin typeface="Calibri" panose="020F0502020204030204" pitchFamily="34" charset="0"/>
                 <a:cs typeface="Calibri" panose="020F0502020204030204" pitchFamily="34" charset="0"/>
@@ -4000,38 +4194,158 @@
         </p:sp>
         <p:sp>
           <p:nvSpPr>
-            <p:cNvPr id="18" name="TextBox 17">
+            <p:cNvPr id="26" name="직사각형 25">
               <a:extLst>
                 <a:ext uri="{FF2B5EF4-FFF2-40B4-BE49-F238E27FC236}">
-                  <a16:creationId xmlns:a16="http://schemas.microsoft.com/office/drawing/2014/main" id="{28976885-2014-33C6-DA68-C7FAC4A680D5}"/>
+                  <a16:creationId xmlns:a16="http://schemas.microsoft.com/office/drawing/2014/main" id="{E0527936-EBDB-DA4A-E70C-558F9A76B7EB}"/>
                 </a:ext>
               </a:extLst>
             </p:cNvPr>
-            <p:cNvSpPr txBox="1"/>
+            <p:cNvSpPr/>
             <p:nvPr/>
           </p:nvSpPr>
           <p:spPr>
             <a:xfrm>
-              <a:off x="7878351" y="1122693"/>
-              <a:ext cx="1277401" cy="707886"/>
+              <a:off x="2136000" y="4509000"/>
+              <a:ext cx="2160000" cy="720000"/>
             </a:xfrm>
             <a:prstGeom prst="rect">
               <a:avLst/>
             </a:prstGeom>
             <a:noFill/>
+            <a:ln>
+              <a:noFill/>
+            </a:ln>
             <a:effectLst>
               <a:outerShdw blurRad="50800" dist="38100" dir="2700000" algn="tl" rotWithShape="0">
-                <a:srgbClr val="FFFF5D"/>
+                <a:srgbClr val="93ADDD"/>
               </a:outerShdw>
             </a:effectLst>
           </p:spPr>
+          <p:style>
+            <a:lnRef idx="2">
+              <a:schemeClr val="accent1">
+                <a:shade val="50000"/>
+              </a:schemeClr>
+            </a:lnRef>
+            <a:fillRef idx="1">
+              <a:schemeClr val="accent1"/>
+            </a:fillRef>
+            <a:effectRef idx="0">
+              <a:schemeClr val="accent1"/>
+            </a:effectRef>
+            <a:fontRef idx="minor">
+              <a:schemeClr val="lt1"/>
+            </a:fontRef>
+          </p:style>
           <p:txBody>
-            <a:bodyPr wrap="none" rtlCol="0">
-              <a:spAutoFit/>
-            </a:bodyPr>
+            <a:bodyPr rtlCol="0" anchor="ctr"/>
             <a:lstStyle/>
             <a:p>
               <a:pPr algn="ctr"/>
+              <a:r>
+                <a:rPr lang="en-US" altLang="ko-KR" sz="2000" b="1" dirty="0">
+                  <a:solidFill>
+                    <a:srgbClr val="93ADDD"/>
+                  </a:solidFill>
+                  <a:latin typeface="Calibri" panose="020F0502020204030204" pitchFamily="34" charset="0"/>
+                  <a:cs typeface="Calibri" panose="020F0502020204030204" pitchFamily="34" charset="0"/>
+                </a:rPr>
+                <a:t>             Steadiness</a:t>
+              </a:r>
+            </a:p>
+            <a:p>
+              <a:pPr algn="ctr"/>
+              <a:r>
+                <a:rPr lang="en-US" altLang="ko-KR" sz="2000" b="1" dirty="0">
+                  <a:solidFill>
+                    <a:srgbClr val="93ADDD"/>
+                  </a:solidFill>
+                  <a:latin typeface="Calibri" panose="020F0502020204030204" pitchFamily="34" charset="0"/>
+                  <a:cs typeface="Calibri" panose="020F0502020204030204" pitchFamily="34" charset="0"/>
+                </a:rPr>
+                <a:t>             (</a:t>
+              </a:r>
+              <a:r>
+                <a:rPr lang="ko-KR" altLang="en-US" sz="2000" b="1" dirty="0">
+                  <a:solidFill>
+                    <a:srgbClr val="93ADDD"/>
+                  </a:solidFill>
+                  <a:latin typeface="Calibri" panose="020F0502020204030204" pitchFamily="34" charset="0"/>
+                  <a:cs typeface="Calibri" panose="020F0502020204030204" pitchFamily="34" charset="0"/>
+                </a:rPr>
+                <a:t>안정형</a:t>
+              </a:r>
+              <a:r>
+                <a:rPr lang="en-US" altLang="ko-KR" sz="2000" b="1" dirty="0">
+                  <a:solidFill>
+                    <a:srgbClr val="93ADDD"/>
+                  </a:solidFill>
+                  <a:latin typeface="Calibri" panose="020F0502020204030204" pitchFamily="34" charset="0"/>
+                  <a:cs typeface="Calibri" panose="020F0502020204030204" pitchFamily="34" charset="0"/>
+                </a:rPr>
+                <a:t>)</a:t>
+              </a:r>
+              <a:endParaRPr lang="ko-KR" altLang="en-US" sz="2000" b="1" dirty="0">
+                <a:solidFill>
+                  <a:srgbClr val="93ADDD"/>
+                </a:solidFill>
+                <a:latin typeface="Calibri" panose="020F0502020204030204" pitchFamily="34" charset="0"/>
+                <a:cs typeface="Calibri" panose="020F0502020204030204" pitchFamily="34" charset="0"/>
+              </a:endParaRPr>
+            </a:p>
+          </p:txBody>
+        </p:sp>
+        <p:sp>
+          <p:nvSpPr>
+            <p:cNvPr id="27" name="직사각형 26">
+              <a:extLst>
+                <a:ext uri="{FF2B5EF4-FFF2-40B4-BE49-F238E27FC236}">
+                  <a16:creationId xmlns:a16="http://schemas.microsoft.com/office/drawing/2014/main" id="{A6DC82A2-6D76-7FC2-C58A-D0822ACCB373}"/>
+                </a:ext>
+              </a:extLst>
+            </p:cNvPr>
+            <p:cNvSpPr/>
+            <p:nvPr/>
+          </p:nvSpPr>
+          <p:spPr>
+            <a:xfrm>
+              <a:off x="7896000" y="1625876"/>
+              <a:ext cx="2160000" cy="720000"/>
+            </a:xfrm>
+            <a:prstGeom prst="rect">
+              <a:avLst/>
+            </a:prstGeom>
+            <a:noFill/>
+            <a:ln>
+              <a:noFill/>
+            </a:ln>
+            <a:effectLst>
+              <a:outerShdw blurRad="50800" dist="38100" dir="2700000" algn="tl" rotWithShape="0">
+                <a:srgbClr val="FFC000"/>
+              </a:outerShdw>
+            </a:effectLst>
+          </p:spPr>
+          <p:style>
+            <a:lnRef idx="2">
+              <a:schemeClr val="accent1">
+                <a:shade val="50000"/>
+              </a:schemeClr>
+            </a:lnRef>
+            <a:fillRef idx="1">
+              <a:schemeClr val="accent1"/>
+            </a:fillRef>
+            <a:effectRef idx="0">
+              <a:schemeClr val="accent1"/>
+            </a:effectRef>
+            <a:fontRef idx="minor">
+              <a:schemeClr val="lt1"/>
+            </a:fontRef>
+          </p:style>
+          <p:txBody>
+            <a:bodyPr rtlCol="0" anchor="ctr"/>
+            <a:lstStyle/>
+            <a:p>
               <a:r>
                 <a:rPr lang="en-US" altLang="ko-KR" sz="2000" b="1" dirty="0">
                   <a:solidFill>
@@ -4043,11 +4357,10 @@
                   <a:latin typeface="Calibri" panose="020F0502020204030204" pitchFamily="34" charset="0"/>
                   <a:cs typeface="Calibri" panose="020F0502020204030204" pitchFamily="34" charset="0"/>
                 </a:rPr>
-                <a:t>Influential</a:t>
+                <a:t>Influence</a:t>
               </a:r>
             </a:p>
             <a:p>
-              <a:pPr algn="ctr"/>
               <a:r>
                 <a:rPr lang="en-US" altLang="ko-KR" sz="2000" b="1" dirty="0">
                   <a:solidFill>
@@ -4059,7 +4372,7 @@
                   <a:latin typeface="Calibri" panose="020F0502020204030204" pitchFamily="34" charset="0"/>
                   <a:cs typeface="Calibri" panose="020F0502020204030204" pitchFamily="34" charset="0"/>
                 </a:rPr>
-                <a:t>(</a:t>
+                <a:t> (</a:t>
               </a:r>
               <a:r>
                 <a:rPr lang="ko-KR" altLang="en-US" sz="2000" b="1" dirty="0">
@@ -4100,180 +4413,6 @@
             </a:p>
           </p:txBody>
         </p:sp>
-        <p:sp>
-          <p:nvSpPr>
-            <p:cNvPr id="20" name="TextBox 19">
-              <a:extLst>
-                <a:ext uri="{FF2B5EF4-FFF2-40B4-BE49-F238E27FC236}">
-                  <a16:creationId xmlns:a16="http://schemas.microsoft.com/office/drawing/2014/main" id="{89F363FE-2FC4-AC94-64BE-1C5C3B1407A8}"/>
-                </a:ext>
-              </a:extLst>
-            </p:cNvPr>
-            <p:cNvSpPr txBox="1"/>
-            <p:nvPr/>
-          </p:nvSpPr>
-          <p:spPr>
-            <a:xfrm>
-              <a:off x="3097834" y="4719645"/>
-              <a:ext cx="1114408" cy="707886"/>
-            </a:xfrm>
-            <a:prstGeom prst="rect">
-              <a:avLst/>
-            </a:prstGeom>
-            <a:noFill/>
-            <a:effectLst>
-              <a:outerShdw blurRad="50800" dist="38100" dir="2700000" algn="tl" rotWithShape="0">
-                <a:srgbClr val="93ADDD"/>
-              </a:outerShdw>
-            </a:effectLst>
-          </p:spPr>
-          <p:txBody>
-            <a:bodyPr wrap="none" rtlCol="0">
-              <a:spAutoFit/>
-            </a:bodyPr>
-            <a:lstStyle/>
-            <a:p>
-              <a:pPr algn="ctr"/>
-              <a:r>
-                <a:rPr lang="en-US" altLang="ko-KR" sz="2000" b="1" dirty="0">
-                  <a:solidFill>
-                    <a:srgbClr val="93ADDD"/>
-                  </a:solidFill>
-                  <a:latin typeface="Calibri" panose="020F0502020204030204" pitchFamily="34" charset="0"/>
-                  <a:cs typeface="Calibri" panose="020F0502020204030204" pitchFamily="34" charset="0"/>
-                </a:rPr>
-                <a:t>Steady</a:t>
-              </a:r>
-            </a:p>
-            <a:p>
-              <a:pPr algn="ctr"/>
-              <a:r>
-                <a:rPr lang="en-US" altLang="ko-KR" sz="2000" b="1" dirty="0">
-                  <a:solidFill>
-                    <a:srgbClr val="93ADDD"/>
-                  </a:solidFill>
-                  <a:latin typeface="Calibri" panose="020F0502020204030204" pitchFamily="34" charset="0"/>
-                  <a:cs typeface="Calibri" panose="020F0502020204030204" pitchFamily="34" charset="0"/>
-                </a:rPr>
-                <a:t>(</a:t>
-              </a:r>
-              <a:r>
-                <a:rPr lang="ko-KR" altLang="en-US" sz="2000" b="1" dirty="0">
-                  <a:solidFill>
-                    <a:srgbClr val="93ADDD"/>
-                  </a:solidFill>
-                  <a:latin typeface="Calibri" panose="020F0502020204030204" pitchFamily="34" charset="0"/>
-                  <a:cs typeface="Calibri" panose="020F0502020204030204" pitchFamily="34" charset="0"/>
-                </a:rPr>
-                <a:t>신중형</a:t>
-              </a:r>
-              <a:r>
-                <a:rPr lang="en-US" altLang="ko-KR" sz="2000" b="1" dirty="0">
-                  <a:solidFill>
-                    <a:srgbClr val="93ADDD"/>
-                  </a:solidFill>
-                  <a:latin typeface="Calibri" panose="020F0502020204030204" pitchFamily="34" charset="0"/>
-                  <a:cs typeface="Calibri" panose="020F0502020204030204" pitchFamily="34" charset="0"/>
-                </a:rPr>
-                <a:t>)</a:t>
-              </a:r>
-              <a:endParaRPr lang="ko-KR" altLang="en-US" sz="2000" b="1" dirty="0">
-                <a:solidFill>
-                  <a:srgbClr val="93ADDD"/>
-                </a:solidFill>
-                <a:latin typeface="Calibri" panose="020F0502020204030204" pitchFamily="34" charset="0"/>
-                <a:cs typeface="Calibri" panose="020F0502020204030204" pitchFamily="34" charset="0"/>
-              </a:endParaRPr>
-            </a:p>
-          </p:txBody>
-        </p:sp>
-        <p:sp>
-          <p:nvSpPr>
-            <p:cNvPr id="21" name="TextBox 20">
-              <a:extLst>
-                <a:ext uri="{FF2B5EF4-FFF2-40B4-BE49-F238E27FC236}">
-                  <a16:creationId xmlns:a16="http://schemas.microsoft.com/office/drawing/2014/main" id="{A9E7B82B-D43B-4EC9-8196-CBF8ED8C7F30}"/>
-                </a:ext>
-              </a:extLst>
-            </p:cNvPr>
-            <p:cNvSpPr txBox="1"/>
-            <p:nvPr/>
-          </p:nvSpPr>
-          <p:spPr>
-            <a:xfrm>
-              <a:off x="7876877" y="4719645"/>
-              <a:ext cx="1280351" cy="707886"/>
-            </a:xfrm>
-            <a:prstGeom prst="rect">
-              <a:avLst/>
-            </a:prstGeom>
-            <a:noFill/>
-            <a:effectLst>
-              <a:outerShdw blurRad="50800" dist="38100" dir="2700000" algn="tl" rotWithShape="0">
-                <a:srgbClr val="77F586"/>
-              </a:outerShdw>
-            </a:effectLst>
-          </p:spPr>
-          <p:txBody>
-            <a:bodyPr wrap="none" rtlCol="0">
-              <a:spAutoFit/>
-            </a:bodyPr>
-            <a:lstStyle/>
-            <a:p>
-              <a:pPr algn="ctr"/>
-              <a:r>
-                <a:rPr lang="en-US" altLang="ko-KR" sz="2000" b="1" dirty="0">
-                  <a:solidFill>
-                    <a:srgbClr val="77F586"/>
-                  </a:solidFill>
-                  <a:latin typeface="Calibri" panose="020F0502020204030204" pitchFamily="34" charset="0"/>
-                  <a:cs typeface="Calibri" panose="020F0502020204030204" pitchFamily="34" charset="0"/>
-                </a:rPr>
-                <a:t>Compliant</a:t>
-              </a:r>
-            </a:p>
-            <a:p>
-              <a:pPr algn="ctr"/>
-              <a:r>
-                <a:rPr lang="en-US" altLang="ko-KR" sz="2000" b="1" dirty="0">
-                  <a:solidFill>
-                    <a:srgbClr val="77F586"/>
-                  </a:solidFill>
-                  <a:latin typeface="Calibri" panose="020F0502020204030204" pitchFamily="34" charset="0"/>
-                  <a:cs typeface="Calibri" panose="020F0502020204030204" pitchFamily="34" charset="0"/>
-                </a:rPr>
-                <a:t>(</a:t>
-              </a:r>
-              <a:r>
-                <a:rPr lang="ko-KR" altLang="en-US" sz="2000" b="1" dirty="0">
-                  <a:solidFill>
-                    <a:srgbClr val="77F586"/>
-                  </a:solidFill>
-                  <a:latin typeface="Calibri" panose="020F0502020204030204" pitchFamily="34" charset="0"/>
-                  <a:cs typeface="Calibri" panose="020F0502020204030204" pitchFamily="34" charset="0"/>
-                </a:rPr>
-                <a:t>안정형</a:t>
-              </a:r>
-              <a:r>
-                <a:rPr lang="en-US" altLang="ko-KR" sz="2000" b="1" dirty="0">
-                  <a:solidFill>
-                    <a:srgbClr val="77F586"/>
-                  </a:solidFill>
-                  <a:latin typeface="Calibri" panose="020F0502020204030204" pitchFamily="34" charset="0"/>
-                  <a:cs typeface="Calibri" panose="020F0502020204030204" pitchFamily="34" charset="0"/>
-                </a:rPr>
-                <a:t>)</a:t>
-              </a:r>
-              <a:endParaRPr lang="ko-KR" altLang="en-US" sz="2000" b="1" dirty="0">
-                <a:solidFill>
-                  <a:srgbClr val="77F586"/>
-                </a:solidFill>
-                <a:latin typeface="Calibri" panose="020F0502020204030204" pitchFamily="34" charset="0"/>
-                <a:cs typeface="Calibri" panose="020F0502020204030204" pitchFamily="34" charset="0"/>
-              </a:endParaRPr>
-            </a:p>
-          </p:txBody>
-        </p:sp>
       </p:grpSp>
     </p:spTree>
     <p:extLst>
@@ -4305,56 +4444,235 @@
           <a:chExt cx="0" cy="0"/>
         </a:xfrm>
       </p:grpSpPr>
-      <p:sp>
-        <p:nvSpPr>
-          <p:cNvPr id="2" name="제목 1">
-            <a:extLst>
-              <a:ext uri="{FF2B5EF4-FFF2-40B4-BE49-F238E27FC236}">
-                <a16:creationId xmlns:a16="http://schemas.microsoft.com/office/drawing/2014/main" id="{CC74E74B-D588-B335-CFF3-000B7B68DFC5}"/>
-              </a:ext>
-            </a:extLst>
-          </p:cNvPr>
-          <p:cNvSpPr>
-            <a:spLocks noGrp="1"/>
-          </p:cNvSpPr>
-          <p:nvPr>
-            <p:ph type="title"/>
-          </p:nvPr>
-        </p:nvSpPr>
-        <p:spPr/>
-        <p:txBody>
-          <a:bodyPr/>
-          <a:lstStyle/>
-          <a:p>
-            <a:endParaRPr lang="ko-KR" altLang="en-US"/>
-          </a:p>
-        </p:txBody>
-      </p:sp>
-      <p:sp>
-        <p:nvSpPr>
-          <p:cNvPr id="3" name="내용 개체 틀 2">
-            <a:extLst>
-              <a:ext uri="{FF2B5EF4-FFF2-40B4-BE49-F238E27FC236}">
-                <a16:creationId xmlns:a16="http://schemas.microsoft.com/office/drawing/2014/main" id="{BFFA779B-AEE7-F734-BFD8-41E576D2B5AF}"/>
-              </a:ext>
-            </a:extLst>
-          </p:cNvPr>
-          <p:cNvSpPr>
-            <a:spLocks noGrp="1"/>
-          </p:cNvSpPr>
-          <p:nvPr>
-            <p:ph idx="1"/>
-          </p:nvPr>
-        </p:nvSpPr>
-        <p:spPr/>
-        <p:txBody>
-          <a:bodyPr/>
-          <a:lstStyle/>
-          <a:p>
-            <a:endParaRPr lang="ko-KR" altLang="en-US"/>
-          </a:p>
-        </p:txBody>
-      </p:sp>
+      <p:grpSp>
+        <p:nvGrpSpPr>
+          <p:cNvPr id="15" name="그룹 14">
+            <a:extLst>
+              <a:ext uri="{FF2B5EF4-FFF2-40B4-BE49-F238E27FC236}">
+                <a16:creationId xmlns:a16="http://schemas.microsoft.com/office/drawing/2014/main" id="{B15EF958-800B-2DD2-694A-719FF85A0F80}"/>
+              </a:ext>
+            </a:extLst>
+          </p:cNvPr>
+          <p:cNvGrpSpPr/>
+          <p:nvPr/>
+        </p:nvGrpSpPr>
+        <p:grpSpPr>
+          <a:xfrm>
+            <a:off x="4119085" y="3159000"/>
+            <a:ext cx="3953829" cy="540000"/>
+            <a:chOff x="3222171" y="1706879"/>
+            <a:chExt cx="3953829" cy="540000"/>
+          </a:xfrm>
+        </p:grpSpPr>
+        <p:sp>
+          <p:nvSpPr>
+            <p:cNvPr id="5" name="직사각형 4">
+              <a:extLst>
+                <a:ext uri="{FF2B5EF4-FFF2-40B4-BE49-F238E27FC236}">
+                  <a16:creationId xmlns:a16="http://schemas.microsoft.com/office/drawing/2014/main" id="{BC4213A2-80E4-1BEB-5814-DD72022B996A}"/>
+                </a:ext>
+              </a:extLst>
+            </p:cNvPr>
+            <p:cNvSpPr/>
+            <p:nvPr/>
+          </p:nvSpPr>
+          <p:spPr>
+            <a:xfrm>
+              <a:off x="3222171" y="1706879"/>
+              <a:ext cx="1080000" cy="180000"/>
+            </a:xfrm>
+            <a:prstGeom prst="rect">
+              <a:avLst/>
+            </a:prstGeom>
+            <a:solidFill>
+              <a:srgbClr val="4298B4"/>
+            </a:solidFill>
+            <a:ln>
+              <a:noFill/>
+            </a:ln>
+          </p:spPr>
+          <p:style>
+            <a:lnRef idx="2">
+              <a:schemeClr val="accent1">
+                <a:shade val="50000"/>
+              </a:schemeClr>
+            </a:lnRef>
+            <a:fillRef idx="1">
+              <a:schemeClr val="accent1"/>
+            </a:fillRef>
+            <a:effectRef idx="0">
+              <a:schemeClr val="accent1"/>
+            </a:effectRef>
+            <a:fontRef idx="minor">
+              <a:schemeClr val="lt1"/>
+            </a:fontRef>
+          </p:style>
+          <p:txBody>
+            <a:bodyPr rtlCol="0" anchor="ctr"/>
+            <a:lstStyle/>
+            <a:p>
+              <a:pPr algn="ctr"/>
+              <a:endParaRPr lang="ko-KR" altLang="en-US"/>
+            </a:p>
+          </p:txBody>
+        </p:sp>
+        <p:sp>
+          <p:nvSpPr>
+            <p:cNvPr id="6" name="직각 삼각형 5">
+              <a:extLst>
+                <a:ext uri="{FF2B5EF4-FFF2-40B4-BE49-F238E27FC236}">
+                  <a16:creationId xmlns:a16="http://schemas.microsoft.com/office/drawing/2014/main" id="{AEFF04EA-5A0D-359F-D017-F182AB175947}"/>
+                </a:ext>
+              </a:extLst>
+            </p:cNvPr>
+            <p:cNvSpPr/>
+            <p:nvPr/>
+          </p:nvSpPr>
+          <p:spPr>
+            <a:xfrm flipH="1" flipV="1">
+              <a:off x="3222171" y="1886879"/>
+              <a:ext cx="1080000" cy="360000"/>
+            </a:xfrm>
+            <a:prstGeom prst="rtTriangle">
+              <a:avLst/>
+            </a:prstGeom>
+            <a:solidFill>
+              <a:srgbClr val="4298B4"/>
+            </a:solidFill>
+            <a:ln>
+              <a:noFill/>
+            </a:ln>
+          </p:spPr>
+          <p:style>
+            <a:lnRef idx="2">
+              <a:schemeClr val="accent1">
+                <a:shade val="50000"/>
+              </a:schemeClr>
+            </a:lnRef>
+            <a:fillRef idx="1">
+              <a:schemeClr val="accent1"/>
+            </a:fillRef>
+            <a:effectRef idx="0">
+              <a:schemeClr val="accent1"/>
+            </a:effectRef>
+            <a:fontRef idx="minor">
+              <a:schemeClr val="lt1"/>
+            </a:fontRef>
+          </p:style>
+          <p:txBody>
+            <a:bodyPr rtlCol="0" anchor="ctr"/>
+            <a:lstStyle/>
+            <a:p>
+              <a:pPr algn="ctr"/>
+              <a:endParaRPr lang="ko-KR" altLang="en-US"/>
+            </a:p>
+          </p:txBody>
+        </p:sp>
+        <p:sp>
+          <p:nvSpPr>
+            <p:cNvPr id="7" name="직각 삼각형 6">
+              <a:extLst>
+                <a:ext uri="{FF2B5EF4-FFF2-40B4-BE49-F238E27FC236}">
+                  <a16:creationId xmlns:a16="http://schemas.microsoft.com/office/drawing/2014/main" id="{55613B94-F7B3-EFEC-1437-C3331EEDEB6F}"/>
+                </a:ext>
+              </a:extLst>
+            </p:cNvPr>
+            <p:cNvSpPr/>
+            <p:nvPr/>
+          </p:nvSpPr>
+          <p:spPr>
+            <a:xfrm flipV="1">
+              <a:off x="4302171" y="1706879"/>
+              <a:ext cx="1800000" cy="540000"/>
+            </a:xfrm>
+            <a:prstGeom prst="rtTriangle">
+              <a:avLst/>
+            </a:prstGeom>
+            <a:solidFill>
+              <a:srgbClr val="4298B4"/>
+            </a:solidFill>
+            <a:ln>
+              <a:noFill/>
+            </a:ln>
+          </p:spPr>
+          <p:style>
+            <a:lnRef idx="2">
+              <a:schemeClr val="accent1">
+                <a:shade val="50000"/>
+              </a:schemeClr>
+            </a:lnRef>
+            <a:fillRef idx="1">
+              <a:schemeClr val="accent1"/>
+            </a:fillRef>
+            <a:effectRef idx="0">
+              <a:schemeClr val="accent1"/>
+            </a:effectRef>
+            <a:fontRef idx="minor">
+              <a:schemeClr val="lt1"/>
+            </a:fontRef>
+          </p:style>
+          <p:txBody>
+            <a:bodyPr rtlCol="0" anchor="ctr"/>
+            <a:lstStyle/>
+            <a:p>
+              <a:pPr algn="ctr"/>
+              <a:endParaRPr lang="ko-KR" altLang="en-US"/>
+            </a:p>
+          </p:txBody>
+        </p:sp>
+        <p:sp>
+          <p:nvSpPr>
+            <p:cNvPr id="8" name="직각 삼각형 7">
+              <a:extLst>
+                <a:ext uri="{FF2B5EF4-FFF2-40B4-BE49-F238E27FC236}">
+                  <a16:creationId xmlns:a16="http://schemas.microsoft.com/office/drawing/2014/main" id="{79B6E5CF-6DCC-6E1C-436F-6A98B70ECAB2}"/>
+                </a:ext>
+              </a:extLst>
+            </p:cNvPr>
+            <p:cNvSpPr/>
+            <p:nvPr/>
+          </p:nvSpPr>
+          <p:spPr>
+            <a:xfrm flipH="1" flipV="1">
+              <a:off x="6096000" y="1706879"/>
+              <a:ext cx="1080000" cy="360000"/>
+            </a:xfrm>
+            <a:prstGeom prst="rtTriangle">
+              <a:avLst/>
+            </a:prstGeom>
+            <a:solidFill>
+              <a:srgbClr val="4298B4"/>
+            </a:solidFill>
+            <a:ln>
+              <a:noFill/>
+            </a:ln>
+          </p:spPr>
+          <p:style>
+            <a:lnRef idx="2">
+              <a:schemeClr val="accent1">
+                <a:shade val="50000"/>
+              </a:schemeClr>
+            </a:lnRef>
+            <a:fillRef idx="1">
+              <a:schemeClr val="accent1"/>
+            </a:fillRef>
+            <a:effectRef idx="0">
+              <a:schemeClr val="accent1"/>
+            </a:effectRef>
+            <a:fontRef idx="minor">
+              <a:schemeClr val="lt1"/>
+            </a:fontRef>
+          </p:style>
+          <p:txBody>
+            <a:bodyPr rtlCol="0" anchor="ctr"/>
+            <a:lstStyle/>
+            <a:p>
+              <a:pPr algn="ctr"/>
+              <a:endParaRPr lang="ko-KR" altLang="en-US"/>
+            </a:p>
+          </p:txBody>
+        </p:sp>
+      </p:grpSp>
     </p:spTree>
     <p:extLst>
       <p:ext uri="{BB962C8B-B14F-4D97-AF65-F5344CB8AC3E}">

</xml_diff>

<commit_message>
[DISC-5] Test 페이지 개발 1
</commit_message>
<xml_diff>
--- a/src/img/IMG.pptx
+++ b/src/img/IMG.pptx
@@ -8,6 +8,7 @@
     <p:sldId id="256" r:id="rId2"/>
     <p:sldId id="257" r:id="rId3"/>
     <p:sldId id="258" r:id="rId4"/>
+    <p:sldId id="259" r:id="rId5"/>
   </p:sldIdLst>
   <p:sldSz cx="12192000" cy="6858000"/>
   <p:notesSz cx="6858000" cy="9144000"/>
@@ -4686,6 +4687,72 @@
 </p:sld>
 </file>
 
+<file path=ppt/slides/slide4.xml><?xml version="1.0" encoding="utf-8"?>
+<p:sld xmlns:a="http://schemas.openxmlformats.org/drawingml/2006/main" xmlns:r="http://schemas.openxmlformats.org/officeDocument/2006/relationships" xmlns:p="http://schemas.openxmlformats.org/presentationml/2006/main">
+  <p:cSld>
+    <p:spTree>
+      <p:nvGrpSpPr>
+        <p:cNvPr id="1" name=""/>
+        <p:cNvGrpSpPr/>
+        <p:nvPr/>
+      </p:nvGrpSpPr>
+      <p:grpSpPr>
+        <a:xfrm>
+          <a:off x="0" y="0"/>
+          <a:ext cx="0" cy="0"/>
+          <a:chOff x="0" y="0"/>
+          <a:chExt cx="0" cy="0"/>
+        </a:xfrm>
+      </p:grpSpPr>
+      <p:pic>
+        <p:nvPicPr>
+          <p:cNvPr id="5" name="그림 4">
+            <a:extLst>
+              <a:ext uri="{FF2B5EF4-FFF2-40B4-BE49-F238E27FC236}">
+                <a16:creationId xmlns:a16="http://schemas.microsoft.com/office/drawing/2014/main" id="{D39BF7BB-A1A3-AC25-54FB-9DEC5D2B20E1}"/>
+              </a:ext>
+            </a:extLst>
+          </p:cNvPr>
+          <p:cNvPicPr>
+            <a:picLocks noChangeAspect="1"/>
+          </p:cNvPicPr>
+          <p:nvPr/>
+        </p:nvPicPr>
+        <p:blipFill>
+          <a:blip r:embed="rId2">
+            <a:extLst>
+              <a:ext uri="{28A0092B-C50C-407E-A947-70E740481C1C}">
+                <a14:useLocalDpi xmlns:a14="http://schemas.microsoft.com/office/drawing/2010/main" val="0"/>
+              </a:ext>
+            </a:extLst>
+          </a:blip>
+          <a:stretch>
+            <a:fillRect/>
+          </a:stretch>
+        </p:blipFill>
+        <p:spPr>
+          <a:xfrm>
+            <a:off x="5302066" y="2635066"/>
+            <a:ext cx="1587868" cy="1587868"/>
+          </a:xfrm>
+          <a:prstGeom prst="rect">
+            <a:avLst/>
+          </a:prstGeom>
+        </p:spPr>
+      </p:pic>
+    </p:spTree>
+    <p:extLst>
+      <p:ext uri="{BB962C8B-B14F-4D97-AF65-F5344CB8AC3E}">
+        <p14:creationId xmlns:p14="http://schemas.microsoft.com/office/powerpoint/2010/main" val="3864221017"/>
+      </p:ext>
+    </p:extLst>
+  </p:cSld>
+  <p:clrMapOvr>
+    <a:masterClrMapping/>
+  </p:clrMapOvr>
+</p:sld>
+</file>
+
 <file path=ppt/theme/theme1.xml><?xml version="1.0" encoding="utf-8"?>
 <a:theme xmlns:a="http://schemas.openxmlformats.org/drawingml/2006/main" name="Office 테마">
   <a:themeElements>

</xml_diff>

<commit_message>
[DISC-5] Test 페이지 개발 3
</commit_message>
<xml_diff>
--- a/src/img/IMG.pptx
+++ b/src/img/IMG.pptx
@@ -8,7 +8,8 @@
     <p:sldId id="256" r:id="rId2"/>
     <p:sldId id="257" r:id="rId3"/>
     <p:sldId id="258" r:id="rId4"/>
-    <p:sldId id="259" r:id="rId5"/>
+    <p:sldId id="260" r:id="rId5"/>
+    <p:sldId id="259" r:id="rId6"/>
   </p:sldIdLst>
   <p:sldSz cx="12192000" cy="6858000"/>
   <p:notesSz cx="6858000" cy="9144000"/>
@@ -4704,6 +4705,265 @@
           <a:chExt cx="0" cy="0"/>
         </a:xfrm>
       </p:grpSpPr>
+      <p:grpSp>
+        <p:nvGrpSpPr>
+          <p:cNvPr id="2" name="그룹 1">
+            <a:extLst>
+              <a:ext uri="{FF2B5EF4-FFF2-40B4-BE49-F238E27FC236}">
+                <a16:creationId xmlns:a16="http://schemas.microsoft.com/office/drawing/2014/main" id="{B6B06CED-8974-F029-C89C-1C0AD88893C7}"/>
+              </a:ext>
+            </a:extLst>
+          </p:cNvPr>
+          <p:cNvGrpSpPr/>
+          <p:nvPr/>
+        </p:nvGrpSpPr>
+        <p:grpSpPr>
+          <a:xfrm>
+            <a:off x="4119085" y="3159000"/>
+            <a:ext cx="3953829" cy="540000"/>
+            <a:chOff x="4119085" y="3159000"/>
+            <a:chExt cx="3953829" cy="540000"/>
+          </a:xfrm>
+        </p:grpSpPr>
+        <p:sp>
+          <p:nvSpPr>
+            <p:cNvPr id="5" name="직사각형 4">
+              <a:extLst>
+                <a:ext uri="{FF2B5EF4-FFF2-40B4-BE49-F238E27FC236}">
+                  <a16:creationId xmlns:a16="http://schemas.microsoft.com/office/drawing/2014/main" id="{BC4213A2-80E4-1BEB-5814-DD72022B996A}"/>
+                </a:ext>
+              </a:extLst>
+            </p:cNvPr>
+            <p:cNvSpPr/>
+            <p:nvPr/>
+          </p:nvSpPr>
+          <p:spPr>
+            <a:xfrm>
+              <a:off x="4119085" y="3159000"/>
+              <a:ext cx="1080000" cy="180000"/>
+            </a:xfrm>
+            <a:prstGeom prst="rect">
+              <a:avLst/>
+            </a:prstGeom>
+            <a:solidFill>
+              <a:srgbClr val="33A474"/>
+            </a:solidFill>
+            <a:ln>
+              <a:noFill/>
+            </a:ln>
+          </p:spPr>
+          <p:style>
+            <a:lnRef idx="2">
+              <a:schemeClr val="accent1">
+                <a:shade val="50000"/>
+              </a:schemeClr>
+            </a:lnRef>
+            <a:fillRef idx="1">
+              <a:schemeClr val="accent1"/>
+            </a:fillRef>
+            <a:effectRef idx="0">
+              <a:schemeClr val="accent1"/>
+            </a:effectRef>
+            <a:fontRef idx="minor">
+              <a:schemeClr val="lt1"/>
+            </a:fontRef>
+          </p:style>
+          <p:txBody>
+            <a:bodyPr rtlCol="0" anchor="ctr"/>
+            <a:lstStyle/>
+            <a:p>
+              <a:pPr algn="ctr"/>
+              <a:endParaRPr lang="ko-KR" altLang="en-US"/>
+            </a:p>
+          </p:txBody>
+        </p:sp>
+        <p:sp>
+          <p:nvSpPr>
+            <p:cNvPr id="6" name="직각 삼각형 5">
+              <a:extLst>
+                <a:ext uri="{FF2B5EF4-FFF2-40B4-BE49-F238E27FC236}">
+                  <a16:creationId xmlns:a16="http://schemas.microsoft.com/office/drawing/2014/main" id="{AEFF04EA-5A0D-359F-D017-F182AB175947}"/>
+                </a:ext>
+              </a:extLst>
+            </p:cNvPr>
+            <p:cNvSpPr/>
+            <p:nvPr/>
+          </p:nvSpPr>
+          <p:spPr>
+            <a:xfrm flipH="1" flipV="1">
+              <a:off x="4119085" y="3339000"/>
+              <a:ext cx="1080000" cy="360000"/>
+            </a:xfrm>
+            <a:prstGeom prst="rtTriangle">
+              <a:avLst/>
+            </a:prstGeom>
+            <a:solidFill>
+              <a:srgbClr val="33A474"/>
+            </a:solidFill>
+            <a:ln>
+              <a:noFill/>
+            </a:ln>
+          </p:spPr>
+          <p:style>
+            <a:lnRef idx="2">
+              <a:schemeClr val="accent1">
+                <a:shade val="50000"/>
+              </a:schemeClr>
+            </a:lnRef>
+            <a:fillRef idx="1">
+              <a:schemeClr val="accent1"/>
+            </a:fillRef>
+            <a:effectRef idx="0">
+              <a:schemeClr val="accent1"/>
+            </a:effectRef>
+            <a:fontRef idx="minor">
+              <a:schemeClr val="lt1"/>
+            </a:fontRef>
+          </p:style>
+          <p:txBody>
+            <a:bodyPr rtlCol="0" anchor="ctr"/>
+            <a:lstStyle/>
+            <a:p>
+              <a:pPr algn="ctr"/>
+              <a:endParaRPr lang="ko-KR" altLang="en-US"/>
+            </a:p>
+          </p:txBody>
+        </p:sp>
+        <p:sp>
+          <p:nvSpPr>
+            <p:cNvPr id="7" name="직각 삼각형 6">
+              <a:extLst>
+                <a:ext uri="{FF2B5EF4-FFF2-40B4-BE49-F238E27FC236}">
+                  <a16:creationId xmlns:a16="http://schemas.microsoft.com/office/drawing/2014/main" id="{55613B94-F7B3-EFEC-1437-C3331EEDEB6F}"/>
+                </a:ext>
+              </a:extLst>
+            </p:cNvPr>
+            <p:cNvSpPr/>
+            <p:nvPr/>
+          </p:nvSpPr>
+          <p:spPr>
+            <a:xfrm flipV="1">
+              <a:off x="5199085" y="3159000"/>
+              <a:ext cx="1800000" cy="540000"/>
+            </a:xfrm>
+            <a:prstGeom prst="rtTriangle">
+              <a:avLst/>
+            </a:prstGeom>
+            <a:solidFill>
+              <a:srgbClr val="33A474"/>
+            </a:solidFill>
+            <a:ln>
+              <a:noFill/>
+            </a:ln>
+          </p:spPr>
+          <p:style>
+            <a:lnRef idx="2">
+              <a:schemeClr val="accent1">
+                <a:shade val="50000"/>
+              </a:schemeClr>
+            </a:lnRef>
+            <a:fillRef idx="1">
+              <a:schemeClr val="accent1"/>
+            </a:fillRef>
+            <a:effectRef idx="0">
+              <a:schemeClr val="accent1"/>
+            </a:effectRef>
+            <a:fontRef idx="minor">
+              <a:schemeClr val="lt1"/>
+            </a:fontRef>
+          </p:style>
+          <p:txBody>
+            <a:bodyPr rtlCol="0" anchor="ctr"/>
+            <a:lstStyle/>
+            <a:p>
+              <a:pPr algn="ctr"/>
+              <a:endParaRPr lang="ko-KR" altLang="en-US"/>
+            </a:p>
+          </p:txBody>
+        </p:sp>
+        <p:sp>
+          <p:nvSpPr>
+            <p:cNvPr id="8" name="직각 삼각형 7">
+              <a:extLst>
+                <a:ext uri="{FF2B5EF4-FFF2-40B4-BE49-F238E27FC236}">
+                  <a16:creationId xmlns:a16="http://schemas.microsoft.com/office/drawing/2014/main" id="{79B6E5CF-6DCC-6E1C-436F-6A98B70ECAB2}"/>
+                </a:ext>
+              </a:extLst>
+            </p:cNvPr>
+            <p:cNvSpPr/>
+            <p:nvPr/>
+          </p:nvSpPr>
+          <p:spPr>
+            <a:xfrm flipH="1" flipV="1">
+              <a:off x="6992914" y="3159000"/>
+              <a:ext cx="1080000" cy="360000"/>
+            </a:xfrm>
+            <a:prstGeom prst="rtTriangle">
+              <a:avLst/>
+            </a:prstGeom>
+            <a:solidFill>
+              <a:srgbClr val="33A474"/>
+            </a:solidFill>
+            <a:ln>
+              <a:noFill/>
+            </a:ln>
+          </p:spPr>
+          <p:style>
+            <a:lnRef idx="2">
+              <a:schemeClr val="accent1">
+                <a:shade val="50000"/>
+              </a:schemeClr>
+            </a:lnRef>
+            <a:fillRef idx="1">
+              <a:schemeClr val="accent1"/>
+            </a:fillRef>
+            <a:effectRef idx="0">
+              <a:schemeClr val="accent1"/>
+            </a:effectRef>
+            <a:fontRef idx="minor">
+              <a:schemeClr val="lt1"/>
+            </a:fontRef>
+          </p:style>
+          <p:txBody>
+            <a:bodyPr rtlCol="0" anchor="ctr"/>
+            <a:lstStyle/>
+            <a:p>
+              <a:pPr algn="ctr"/>
+              <a:endParaRPr lang="ko-KR" altLang="en-US"/>
+            </a:p>
+          </p:txBody>
+        </p:sp>
+      </p:grpSp>
+    </p:spTree>
+    <p:extLst>
+      <p:ext uri="{BB962C8B-B14F-4D97-AF65-F5344CB8AC3E}">
+        <p14:creationId xmlns:p14="http://schemas.microsoft.com/office/powerpoint/2010/main" val="160113912"/>
+      </p:ext>
+    </p:extLst>
+  </p:cSld>
+  <p:clrMapOvr>
+    <a:masterClrMapping/>
+  </p:clrMapOvr>
+</p:sld>
+</file>
+
+<file path=ppt/slides/slide5.xml><?xml version="1.0" encoding="utf-8"?>
+<p:sld xmlns:a="http://schemas.openxmlformats.org/drawingml/2006/main" xmlns:r="http://schemas.openxmlformats.org/officeDocument/2006/relationships" xmlns:p="http://schemas.openxmlformats.org/presentationml/2006/main">
+  <p:cSld>
+    <p:spTree>
+      <p:nvGrpSpPr>
+        <p:cNvPr id="1" name=""/>
+        <p:cNvGrpSpPr/>
+        <p:nvPr/>
+      </p:nvGrpSpPr>
+      <p:grpSpPr>
+        <a:xfrm>
+          <a:off x="0" y="0"/>
+          <a:ext cx="0" cy="0"/>
+          <a:chOff x="0" y="0"/>
+          <a:chExt cx="0" cy="0"/>
+        </a:xfrm>
+      </p:grpSpPr>
       <p:pic>
         <p:nvPicPr>
           <p:cNvPr id="5" name="그림 4">

</xml_diff>

<commit_message>
[DISC-6] Question 컴포넌트 개발 2
</commit_message>
<xml_diff>
--- a/src/img/IMG.pptx
+++ b/src/img/IMG.pptx
@@ -9,7 +9,6 @@
     <p:sldId id="257" r:id="rId3"/>
     <p:sldId id="258" r:id="rId4"/>
     <p:sldId id="260" r:id="rId5"/>
-    <p:sldId id="259" r:id="rId6"/>
   </p:sldIdLst>
   <p:sldSz cx="12192000" cy="6858000"/>
   <p:notesSz cx="6858000" cy="9144000"/>
@@ -4947,72 +4946,6 @@
 </p:sld>
 </file>
 
-<file path=ppt/slides/slide5.xml><?xml version="1.0" encoding="utf-8"?>
-<p:sld xmlns:a="http://schemas.openxmlformats.org/drawingml/2006/main" xmlns:r="http://schemas.openxmlformats.org/officeDocument/2006/relationships" xmlns:p="http://schemas.openxmlformats.org/presentationml/2006/main">
-  <p:cSld>
-    <p:spTree>
-      <p:nvGrpSpPr>
-        <p:cNvPr id="1" name=""/>
-        <p:cNvGrpSpPr/>
-        <p:nvPr/>
-      </p:nvGrpSpPr>
-      <p:grpSpPr>
-        <a:xfrm>
-          <a:off x="0" y="0"/>
-          <a:ext cx="0" cy="0"/>
-          <a:chOff x="0" y="0"/>
-          <a:chExt cx="0" cy="0"/>
-        </a:xfrm>
-      </p:grpSpPr>
-      <p:pic>
-        <p:nvPicPr>
-          <p:cNvPr id="5" name="그림 4">
-            <a:extLst>
-              <a:ext uri="{FF2B5EF4-FFF2-40B4-BE49-F238E27FC236}">
-                <a16:creationId xmlns:a16="http://schemas.microsoft.com/office/drawing/2014/main" id="{D39BF7BB-A1A3-AC25-54FB-9DEC5D2B20E1}"/>
-              </a:ext>
-            </a:extLst>
-          </p:cNvPr>
-          <p:cNvPicPr>
-            <a:picLocks noChangeAspect="1"/>
-          </p:cNvPicPr>
-          <p:nvPr/>
-        </p:nvPicPr>
-        <p:blipFill>
-          <a:blip r:embed="rId2">
-            <a:extLst>
-              <a:ext uri="{28A0092B-C50C-407E-A947-70E740481C1C}">
-                <a14:useLocalDpi xmlns:a14="http://schemas.microsoft.com/office/drawing/2010/main" val="0"/>
-              </a:ext>
-            </a:extLst>
-          </a:blip>
-          <a:stretch>
-            <a:fillRect/>
-          </a:stretch>
-        </p:blipFill>
-        <p:spPr>
-          <a:xfrm>
-            <a:off x="5302066" y="2635066"/>
-            <a:ext cx="1587868" cy="1587868"/>
-          </a:xfrm>
-          <a:prstGeom prst="rect">
-            <a:avLst/>
-          </a:prstGeom>
-        </p:spPr>
-      </p:pic>
-    </p:spTree>
-    <p:extLst>
-      <p:ext uri="{BB962C8B-B14F-4D97-AF65-F5344CB8AC3E}">
-        <p14:creationId xmlns:p14="http://schemas.microsoft.com/office/powerpoint/2010/main" val="3864221017"/>
-      </p:ext>
-    </p:extLst>
-  </p:cSld>
-  <p:clrMapOvr>
-    <a:masterClrMapping/>
-  </p:clrMapOvr>
-</p:sld>
-</file>
-
 <file path=ppt/theme/theme1.xml><?xml version="1.0" encoding="utf-8"?>
 <a:theme xmlns:a="http://schemas.openxmlformats.org/drawingml/2006/main" name="Office 테마">
   <a:themeElements>

</xml_diff>

<commit_message>
[DISC-6] Question 컴포넌트 개발 3
</commit_message>
<xml_diff>
--- a/src/img/IMG.pptx
+++ b/src/img/IMG.pptx
@@ -9,6 +9,8 @@
     <p:sldId id="257" r:id="rId3"/>
     <p:sldId id="258" r:id="rId4"/>
     <p:sldId id="260" r:id="rId5"/>
+    <p:sldId id="262" r:id="rId6"/>
+    <p:sldId id="263" r:id="rId7"/>
   </p:sldIdLst>
   <p:sldSz cx="12192000" cy="6858000"/>
   <p:notesSz cx="6858000" cy="9144000"/>
@@ -262,7 +264,7 @@
           <a:p>
             <a:fld id="{74529166-E523-47B8-A70B-56CC3122A1F0}" type="datetimeFigureOut">
               <a:rPr lang="ko-KR" altLang="en-US" smtClean="0"/>
-              <a:t>2022-08-04</a:t>
+              <a:t>2022-08-05</a:t>
             </a:fld>
             <a:endParaRPr lang="ko-KR" altLang="en-US"/>
           </a:p>
@@ -460,7 +462,7 @@
           <a:p>
             <a:fld id="{74529166-E523-47B8-A70B-56CC3122A1F0}" type="datetimeFigureOut">
               <a:rPr lang="ko-KR" altLang="en-US" smtClean="0"/>
-              <a:t>2022-08-04</a:t>
+              <a:t>2022-08-05</a:t>
             </a:fld>
             <a:endParaRPr lang="ko-KR" altLang="en-US"/>
           </a:p>
@@ -668,7 +670,7 @@
           <a:p>
             <a:fld id="{74529166-E523-47B8-A70B-56CC3122A1F0}" type="datetimeFigureOut">
               <a:rPr lang="ko-KR" altLang="en-US" smtClean="0"/>
-              <a:t>2022-08-04</a:t>
+              <a:t>2022-08-05</a:t>
             </a:fld>
             <a:endParaRPr lang="ko-KR" altLang="en-US"/>
           </a:p>
@@ -866,7 +868,7 @@
           <a:p>
             <a:fld id="{74529166-E523-47B8-A70B-56CC3122A1F0}" type="datetimeFigureOut">
               <a:rPr lang="ko-KR" altLang="en-US" smtClean="0"/>
-              <a:t>2022-08-04</a:t>
+              <a:t>2022-08-05</a:t>
             </a:fld>
             <a:endParaRPr lang="ko-KR" altLang="en-US"/>
           </a:p>
@@ -1141,7 +1143,7 @@
           <a:p>
             <a:fld id="{74529166-E523-47B8-A70B-56CC3122A1F0}" type="datetimeFigureOut">
               <a:rPr lang="ko-KR" altLang="en-US" smtClean="0"/>
-              <a:t>2022-08-04</a:t>
+              <a:t>2022-08-05</a:t>
             </a:fld>
             <a:endParaRPr lang="ko-KR" altLang="en-US"/>
           </a:p>
@@ -1406,7 +1408,7 @@
           <a:p>
             <a:fld id="{74529166-E523-47B8-A70B-56CC3122A1F0}" type="datetimeFigureOut">
               <a:rPr lang="ko-KR" altLang="en-US" smtClean="0"/>
-              <a:t>2022-08-04</a:t>
+              <a:t>2022-08-05</a:t>
             </a:fld>
             <a:endParaRPr lang="ko-KR" altLang="en-US"/>
           </a:p>
@@ -1818,7 +1820,7 @@
           <a:p>
             <a:fld id="{74529166-E523-47B8-A70B-56CC3122A1F0}" type="datetimeFigureOut">
               <a:rPr lang="ko-KR" altLang="en-US" smtClean="0"/>
-              <a:t>2022-08-04</a:t>
+              <a:t>2022-08-05</a:t>
             </a:fld>
             <a:endParaRPr lang="ko-KR" altLang="en-US"/>
           </a:p>
@@ -1959,7 +1961,7 @@
           <a:p>
             <a:fld id="{74529166-E523-47B8-A70B-56CC3122A1F0}" type="datetimeFigureOut">
               <a:rPr lang="ko-KR" altLang="en-US" smtClean="0"/>
-              <a:t>2022-08-04</a:t>
+              <a:t>2022-08-05</a:t>
             </a:fld>
             <a:endParaRPr lang="ko-KR" altLang="en-US"/>
           </a:p>
@@ -2072,7 +2074,7 @@
           <a:p>
             <a:fld id="{74529166-E523-47B8-A70B-56CC3122A1F0}" type="datetimeFigureOut">
               <a:rPr lang="ko-KR" altLang="en-US" smtClean="0"/>
-              <a:t>2022-08-04</a:t>
+              <a:t>2022-08-05</a:t>
             </a:fld>
             <a:endParaRPr lang="ko-KR" altLang="en-US"/>
           </a:p>
@@ -2383,7 +2385,7 @@
           <a:p>
             <a:fld id="{74529166-E523-47B8-A70B-56CC3122A1F0}" type="datetimeFigureOut">
               <a:rPr lang="ko-KR" altLang="en-US" smtClean="0"/>
-              <a:t>2022-08-04</a:t>
+              <a:t>2022-08-05</a:t>
             </a:fld>
             <a:endParaRPr lang="ko-KR" altLang="en-US"/>
           </a:p>
@@ -2671,7 +2673,7 @@
           <a:p>
             <a:fld id="{74529166-E523-47B8-A70B-56CC3122A1F0}" type="datetimeFigureOut">
               <a:rPr lang="ko-KR" altLang="en-US" smtClean="0"/>
-              <a:t>2022-08-04</a:t>
+              <a:t>2022-08-05</a:t>
             </a:fld>
             <a:endParaRPr lang="ko-KR" altLang="en-US"/>
           </a:p>
@@ -2912,7 +2914,7 @@
           <a:p>
             <a:fld id="{74529166-E523-47B8-A70B-56CC3122A1F0}" type="datetimeFigureOut">
               <a:rPr lang="ko-KR" altLang="en-US" smtClean="0"/>
-              <a:t>2022-08-04</a:t>
+              <a:t>2022-08-05</a:t>
             </a:fld>
             <a:endParaRPr lang="ko-KR" altLang="en-US"/>
           </a:p>
@@ -4946,6 +4948,210 @@
 </p:sld>
 </file>
 
+<file path=ppt/slides/slide5.xml><?xml version="1.0" encoding="utf-8"?>
+<p:sld xmlns:a="http://schemas.openxmlformats.org/drawingml/2006/main" xmlns:r="http://schemas.openxmlformats.org/officeDocument/2006/relationships" xmlns:p="http://schemas.openxmlformats.org/presentationml/2006/main">
+  <p:cSld>
+    <p:spTree>
+      <p:nvGrpSpPr>
+        <p:cNvPr id="1" name=""/>
+        <p:cNvGrpSpPr/>
+        <p:nvPr/>
+      </p:nvGrpSpPr>
+      <p:grpSpPr>
+        <a:xfrm>
+          <a:off x="0" y="0"/>
+          <a:ext cx="0" cy="0"/>
+          <a:chOff x="0" y="0"/>
+          <a:chExt cx="0" cy="0"/>
+        </a:xfrm>
+      </p:grpSpPr>
+      <p:pic>
+        <p:nvPicPr>
+          <p:cNvPr id="12" name="그림 11">
+            <a:extLst>
+              <a:ext uri="{FF2B5EF4-FFF2-40B4-BE49-F238E27FC236}">
+                <a16:creationId xmlns:a16="http://schemas.microsoft.com/office/drawing/2014/main" id="{2597913B-59AA-98E1-521D-995EF0D6BB57}"/>
+              </a:ext>
+            </a:extLst>
+          </p:cNvPr>
+          <p:cNvPicPr>
+            <a:picLocks noChangeAspect="1"/>
+          </p:cNvPicPr>
+          <p:nvPr/>
+        </p:nvPicPr>
+        <p:blipFill>
+          <a:blip r:embed="rId2">
+            <a:extLst>
+              <a:ext uri="{28A0092B-C50C-407E-A947-70E740481C1C}">
+                <a14:useLocalDpi xmlns:a14="http://schemas.microsoft.com/office/drawing/2010/main" val="0"/>
+              </a:ext>
+            </a:extLst>
+          </a:blip>
+          <a:stretch>
+            <a:fillRect/>
+          </a:stretch>
+        </p:blipFill>
+        <p:spPr>
+          <a:xfrm>
+            <a:off x="2667000" y="0"/>
+            <a:ext cx="6858000" cy="6858000"/>
+          </a:xfrm>
+          <a:prstGeom prst="rect">
+            <a:avLst/>
+          </a:prstGeom>
+        </p:spPr>
+      </p:pic>
+    </p:spTree>
+    <p:extLst>
+      <p:ext uri="{BB962C8B-B14F-4D97-AF65-F5344CB8AC3E}">
+        <p14:creationId xmlns:p14="http://schemas.microsoft.com/office/powerpoint/2010/main" val="1709977928"/>
+      </p:ext>
+    </p:extLst>
+  </p:cSld>
+  <p:clrMapOvr>
+    <a:masterClrMapping/>
+  </p:clrMapOvr>
+</p:sld>
+</file>
+
+<file path=ppt/slides/slide6.xml><?xml version="1.0" encoding="utf-8"?>
+<p:sld xmlns:a="http://schemas.openxmlformats.org/drawingml/2006/main" xmlns:r="http://schemas.openxmlformats.org/officeDocument/2006/relationships" xmlns:p="http://schemas.openxmlformats.org/presentationml/2006/main">
+  <p:cSld>
+    <p:spTree>
+      <p:nvGrpSpPr>
+        <p:cNvPr id="1" name=""/>
+        <p:cNvGrpSpPr/>
+        <p:nvPr/>
+      </p:nvGrpSpPr>
+      <p:grpSpPr>
+        <a:xfrm>
+          <a:off x="0" y="0"/>
+          <a:ext cx="0" cy="0"/>
+          <a:chOff x="0" y="0"/>
+          <a:chExt cx="0" cy="0"/>
+        </a:xfrm>
+      </p:grpSpPr>
+      <p:grpSp>
+        <p:nvGrpSpPr>
+          <p:cNvPr id="10" name="그룹 9">
+            <a:extLst>
+              <a:ext uri="{FF2B5EF4-FFF2-40B4-BE49-F238E27FC236}">
+                <a16:creationId xmlns:a16="http://schemas.microsoft.com/office/drawing/2014/main" id="{EADDD30B-E66E-2DFB-0AE3-EEF16004E049}"/>
+              </a:ext>
+            </a:extLst>
+          </p:cNvPr>
+          <p:cNvGrpSpPr/>
+          <p:nvPr/>
+        </p:nvGrpSpPr>
+        <p:grpSpPr>
+          <a:xfrm>
+            <a:off x="2667000" y="0"/>
+            <a:ext cx="6858000" cy="6858000"/>
+            <a:chOff x="2667000" y="0"/>
+            <a:chExt cx="6858000" cy="6858000"/>
+          </a:xfrm>
+        </p:grpSpPr>
+        <p:sp>
+          <p:nvSpPr>
+            <p:cNvPr id="8" name="사각형: 둥근 모서리 7">
+              <a:extLst>
+                <a:ext uri="{FF2B5EF4-FFF2-40B4-BE49-F238E27FC236}">
+                  <a16:creationId xmlns:a16="http://schemas.microsoft.com/office/drawing/2014/main" id="{233EAEE4-9428-DAE9-32BD-0AA361A8380B}"/>
+                </a:ext>
+              </a:extLst>
+            </p:cNvPr>
+            <p:cNvSpPr/>
+            <p:nvPr/>
+          </p:nvSpPr>
+          <p:spPr>
+            <a:xfrm>
+              <a:off x="3359020" y="653143"/>
+              <a:ext cx="5533053" cy="5542384"/>
+            </a:xfrm>
+            <a:prstGeom prst="roundRect">
+              <a:avLst>
+                <a:gd name="adj" fmla="val 8667"/>
+              </a:avLst>
+            </a:prstGeom>
+            <a:solidFill>
+              <a:srgbClr val="FF6565"/>
+            </a:solidFill>
+          </p:spPr>
+          <p:style>
+            <a:lnRef idx="2">
+              <a:schemeClr val="accent1">
+                <a:shade val="50000"/>
+              </a:schemeClr>
+            </a:lnRef>
+            <a:fillRef idx="1">
+              <a:schemeClr val="accent1"/>
+            </a:fillRef>
+            <a:effectRef idx="0">
+              <a:schemeClr val="accent1"/>
+            </a:effectRef>
+            <a:fontRef idx="minor">
+              <a:schemeClr val="lt1"/>
+            </a:fontRef>
+          </p:style>
+          <p:txBody>
+            <a:bodyPr rtlCol="0" anchor="ctr"/>
+            <a:lstStyle/>
+            <a:p>
+              <a:pPr algn="ctr"/>
+              <a:endParaRPr lang="ko-KR" altLang="en-US"/>
+            </a:p>
+          </p:txBody>
+        </p:sp>
+        <p:pic>
+          <p:nvPicPr>
+            <p:cNvPr id="6" name="그림 5">
+              <a:extLst>
+                <a:ext uri="{FF2B5EF4-FFF2-40B4-BE49-F238E27FC236}">
+                  <a16:creationId xmlns:a16="http://schemas.microsoft.com/office/drawing/2014/main" id="{C062DA75-2FCC-C42C-4530-5E47326FF300}"/>
+                </a:ext>
+              </a:extLst>
+            </p:cNvPr>
+            <p:cNvPicPr>
+              <a:picLocks noChangeAspect="1"/>
+            </p:cNvPicPr>
+            <p:nvPr/>
+          </p:nvPicPr>
+          <p:blipFill>
+            <a:blip r:embed="rId2">
+              <a:extLst>
+                <a:ext uri="{28A0092B-C50C-407E-A947-70E740481C1C}">
+                  <a14:useLocalDpi xmlns:a14="http://schemas.microsoft.com/office/drawing/2010/main" val="0"/>
+                </a:ext>
+              </a:extLst>
+            </a:blip>
+            <a:stretch>
+              <a:fillRect/>
+            </a:stretch>
+          </p:blipFill>
+          <p:spPr>
+            <a:xfrm>
+              <a:off x="2667000" y="0"/>
+              <a:ext cx="6858000" cy="6858000"/>
+            </a:xfrm>
+            <a:prstGeom prst="rect">
+              <a:avLst/>
+            </a:prstGeom>
+          </p:spPr>
+        </p:pic>
+      </p:grpSp>
+    </p:spTree>
+    <p:extLst>
+      <p:ext uri="{BB962C8B-B14F-4D97-AF65-F5344CB8AC3E}">
+        <p14:creationId xmlns:p14="http://schemas.microsoft.com/office/powerpoint/2010/main" val="3144296427"/>
+      </p:ext>
+    </p:extLst>
+  </p:cSld>
+  <p:clrMapOvr>
+    <a:masterClrMapping/>
+  </p:clrMapOvr>
+</p:sld>
+</file>
+
 <file path=ppt/theme/theme1.xml><?xml version="1.0" encoding="utf-8"?>
 <a:theme xmlns:a="http://schemas.openxmlformats.org/drawingml/2006/main" name="Office 테마">
   <a:themeElements>

</xml_diff>

<commit_message>
[DISC-6] Question 컴포넌트 개발 5
</commit_message>
<xml_diff>
--- a/src/img/IMG.pptx
+++ b/src/img/IMG.pptx
@@ -11,6 +11,7 @@
     <p:sldId id="260" r:id="rId5"/>
     <p:sldId id="262" r:id="rId6"/>
     <p:sldId id="263" r:id="rId7"/>
+    <p:sldId id="264" r:id="rId8"/>
   </p:sldIdLst>
   <p:sldSz cx="12192000" cy="6858000"/>
   <p:notesSz cx="6858000" cy="9144000"/>
@@ -5152,6 +5153,88 @@
 </p:sld>
 </file>
 
+<file path=ppt/slides/slide7.xml><?xml version="1.0" encoding="utf-8"?>
+<p:sld xmlns:a="http://schemas.openxmlformats.org/drawingml/2006/main" xmlns:r="http://schemas.openxmlformats.org/officeDocument/2006/relationships" xmlns:p="http://schemas.openxmlformats.org/presentationml/2006/main">
+  <p:cSld>
+    <p:spTree>
+      <p:nvGrpSpPr>
+        <p:cNvPr id="1" name=""/>
+        <p:cNvGrpSpPr/>
+        <p:nvPr/>
+      </p:nvGrpSpPr>
+      <p:grpSpPr>
+        <a:xfrm>
+          <a:off x="0" y="0"/>
+          <a:ext cx="0" cy="0"/>
+          <a:chOff x="0" y="0"/>
+          <a:chExt cx="0" cy="0"/>
+        </a:xfrm>
+      </p:grpSpPr>
+      <p:sp>
+        <p:nvSpPr>
+          <p:cNvPr id="4" name="직사각형 3">
+            <a:extLst>
+              <a:ext uri="{FF2B5EF4-FFF2-40B4-BE49-F238E27FC236}">
+                <a16:creationId xmlns:a16="http://schemas.microsoft.com/office/drawing/2014/main" id="{CE0FEEE6-14D9-6D92-051A-47C632FCBD58}"/>
+              </a:ext>
+            </a:extLst>
+          </p:cNvPr>
+          <p:cNvSpPr/>
+          <p:nvPr/>
+        </p:nvSpPr>
+        <p:spPr>
+          <a:xfrm>
+            <a:off x="5363547" y="2687216"/>
+            <a:ext cx="1464906" cy="1483567"/>
+          </a:xfrm>
+          <a:prstGeom prst="rect">
+            <a:avLst/>
+          </a:prstGeom>
+          <a:solidFill>
+            <a:srgbClr val="F2F9F2"/>
+          </a:solidFill>
+          <a:ln>
+            <a:noFill/>
+          </a:ln>
+        </p:spPr>
+        <p:style>
+          <a:lnRef idx="2">
+            <a:schemeClr val="accent1">
+              <a:shade val="50000"/>
+            </a:schemeClr>
+          </a:lnRef>
+          <a:fillRef idx="1">
+            <a:schemeClr val="accent1"/>
+          </a:fillRef>
+          <a:effectRef idx="0">
+            <a:schemeClr val="accent1"/>
+          </a:effectRef>
+          <a:fontRef idx="minor">
+            <a:schemeClr val="lt1"/>
+          </a:fontRef>
+        </p:style>
+        <p:txBody>
+          <a:bodyPr rtlCol="0" anchor="ctr"/>
+          <a:lstStyle/>
+          <a:p>
+            <a:pPr algn="ctr"/>
+            <a:endParaRPr lang="ko-KR" altLang="en-US"/>
+          </a:p>
+        </p:txBody>
+      </p:sp>
+    </p:spTree>
+    <p:extLst>
+      <p:ext uri="{BB962C8B-B14F-4D97-AF65-F5344CB8AC3E}">
+        <p14:creationId xmlns:p14="http://schemas.microsoft.com/office/powerpoint/2010/main" val="1951826797"/>
+      </p:ext>
+    </p:extLst>
+  </p:cSld>
+  <p:clrMapOvr>
+    <a:masterClrMapping/>
+  </p:clrMapOvr>
+</p:sld>
+</file>
+
 <file path=ppt/theme/theme1.xml><?xml version="1.0" encoding="utf-8"?>
 <a:theme xmlns:a="http://schemas.openxmlformats.org/drawingml/2006/main" name="Office 테마">
   <a:themeElements>

</xml_diff>

<commit_message>
[DISC-6] Question 컴포넌트 개발 7
</commit_message>
<xml_diff>
--- a/src/img/IMG.pptx
+++ b/src/img/IMG.pptx
@@ -5184,7 +5184,7 @@
         </p:nvSpPr>
         <p:spPr>
           <a:xfrm>
-            <a:off x="5363547" y="2687216"/>
+            <a:off x="4631094" y="2687215"/>
             <a:ext cx="1464906" cy="1483567"/>
           </a:xfrm>
           <a:prstGeom prst="rect">
@@ -5192,6 +5192,58 @@
           </a:prstGeom>
           <a:solidFill>
             <a:srgbClr val="F2F9F2"/>
+          </a:solidFill>
+          <a:ln>
+            <a:noFill/>
+          </a:ln>
+        </p:spPr>
+        <p:style>
+          <a:lnRef idx="2">
+            <a:schemeClr val="accent1">
+              <a:shade val="50000"/>
+            </a:schemeClr>
+          </a:lnRef>
+          <a:fillRef idx="1">
+            <a:schemeClr val="accent1"/>
+          </a:fillRef>
+          <a:effectRef idx="0">
+            <a:schemeClr val="accent1"/>
+          </a:effectRef>
+          <a:fontRef idx="minor">
+            <a:schemeClr val="lt1"/>
+          </a:fontRef>
+        </p:style>
+        <p:txBody>
+          <a:bodyPr rtlCol="0" anchor="ctr"/>
+          <a:lstStyle/>
+          <a:p>
+            <a:pPr algn="ctr"/>
+            <a:endParaRPr lang="ko-KR" altLang="en-US"/>
+          </a:p>
+        </p:txBody>
+      </p:sp>
+      <p:sp>
+        <p:nvSpPr>
+          <p:cNvPr id="5" name="직사각형 4">
+            <a:extLst>
+              <a:ext uri="{FF2B5EF4-FFF2-40B4-BE49-F238E27FC236}">
+                <a16:creationId xmlns:a16="http://schemas.microsoft.com/office/drawing/2014/main" id="{B815DEB8-8505-1640-E923-19E982D8A4F7}"/>
+              </a:ext>
+            </a:extLst>
+          </p:cNvPr>
+          <p:cNvSpPr/>
+          <p:nvPr/>
+        </p:nvSpPr>
+        <p:spPr>
+          <a:xfrm>
+            <a:off x="6096000" y="2687216"/>
+            <a:ext cx="1464906" cy="1483567"/>
+          </a:xfrm>
+          <a:prstGeom prst="rect">
+            <a:avLst/>
+          </a:prstGeom>
+          <a:solidFill>
+            <a:srgbClr val="F2DEDE"/>
           </a:solidFill>
           <a:ln>
             <a:noFill/>

</xml_diff>

<commit_message>
[DISC-7] Result 컴포넌트 개발 3
</commit_message>
<xml_diff>
--- a/src/img/IMG.pptx
+++ b/src/img/IMG.pptx
@@ -12,6 +12,7 @@
     <p:sldId id="262" r:id="rId6"/>
     <p:sldId id="263" r:id="rId7"/>
     <p:sldId id="264" r:id="rId8"/>
+    <p:sldId id="265" r:id="rId9"/>
   </p:sldIdLst>
   <p:sldSz cx="12192000" cy="6858000"/>
   <p:notesSz cx="6858000" cy="9144000"/>
@@ -265,7 +266,7 @@
           <a:p>
             <a:fld id="{74529166-E523-47B8-A70B-56CC3122A1F0}" type="datetimeFigureOut">
               <a:rPr lang="ko-KR" altLang="en-US" smtClean="0"/>
-              <a:t>2022-08-05</a:t>
+              <a:t>2022-08-06</a:t>
             </a:fld>
             <a:endParaRPr lang="ko-KR" altLang="en-US"/>
           </a:p>
@@ -463,7 +464,7 @@
           <a:p>
             <a:fld id="{74529166-E523-47B8-A70B-56CC3122A1F0}" type="datetimeFigureOut">
               <a:rPr lang="ko-KR" altLang="en-US" smtClean="0"/>
-              <a:t>2022-08-05</a:t>
+              <a:t>2022-08-06</a:t>
             </a:fld>
             <a:endParaRPr lang="ko-KR" altLang="en-US"/>
           </a:p>
@@ -671,7 +672,7 @@
           <a:p>
             <a:fld id="{74529166-E523-47B8-A70B-56CC3122A1F0}" type="datetimeFigureOut">
               <a:rPr lang="ko-KR" altLang="en-US" smtClean="0"/>
-              <a:t>2022-08-05</a:t>
+              <a:t>2022-08-06</a:t>
             </a:fld>
             <a:endParaRPr lang="ko-KR" altLang="en-US"/>
           </a:p>
@@ -869,7 +870,7 @@
           <a:p>
             <a:fld id="{74529166-E523-47B8-A70B-56CC3122A1F0}" type="datetimeFigureOut">
               <a:rPr lang="ko-KR" altLang="en-US" smtClean="0"/>
-              <a:t>2022-08-05</a:t>
+              <a:t>2022-08-06</a:t>
             </a:fld>
             <a:endParaRPr lang="ko-KR" altLang="en-US"/>
           </a:p>
@@ -1144,7 +1145,7 @@
           <a:p>
             <a:fld id="{74529166-E523-47B8-A70B-56CC3122A1F0}" type="datetimeFigureOut">
               <a:rPr lang="ko-KR" altLang="en-US" smtClean="0"/>
-              <a:t>2022-08-05</a:t>
+              <a:t>2022-08-06</a:t>
             </a:fld>
             <a:endParaRPr lang="ko-KR" altLang="en-US"/>
           </a:p>
@@ -1409,7 +1410,7 @@
           <a:p>
             <a:fld id="{74529166-E523-47B8-A70B-56CC3122A1F0}" type="datetimeFigureOut">
               <a:rPr lang="ko-KR" altLang="en-US" smtClean="0"/>
-              <a:t>2022-08-05</a:t>
+              <a:t>2022-08-06</a:t>
             </a:fld>
             <a:endParaRPr lang="ko-KR" altLang="en-US"/>
           </a:p>
@@ -1821,7 +1822,7 @@
           <a:p>
             <a:fld id="{74529166-E523-47B8-A70B-56CC3122A1F0}" type="datetimeFigureOut">
               <a:rPr lang="ko-KR" altLang="en-US" smtClean="0"/>
-              <a:t>2022-08-05</a:t>
+              <a:t>2022-08-06</a:t>
             </a:fld>
             <a:endParaRPr lang="ko-KR" altLang="en-US"/>
           </a:p>
@@ -1962,7 +1963,7 @@
           <a:p>
             <a:fld id="{74529166-E523-47B8-A70B-56CC3122A1F0}" type="datetimeFigureOut">
               <a:rPr lang="ko-KR" altLang="en-US" smtClean="0"/>
-              <a:t>2022-08-05</a:t>
+              <a:t>2022-08-06</a:t>
             </a:fld>
             <a:endParaRPr lang="ko-KR" altLang="en-US"/>
           </a:p>
@@ -2075,7 +2076,7 @@
           <a:p>
             <a:fld id="{74529166-E523-47B8-A70B-56CC3122A1F0}" type="datetimeFigureOut">
               <a:rPr lang="ko-KR" altLang="en-US" smtClean="0"/>
-              <a:t>2022-08-05</a:t>
+              <a:t>2022-08-06</a:t>
             </a:fld>
             <a:endParaRPr lang="ko-KR" altLang="en-US"/>
           </a:p>
@@ -2386,7 +2387,7 @@
           <a:p>
             <a:fld id="{74529166-E523-47B8-A70B-56CC3122A1F0}" type="datetimeFigureOut">
               <a:rPr lang="ko-KR" altLang="en-US" smtClean="0"/>
-              <a:t>2022-08-05</a:t>
+              <a:t>2022-08-06</a:t>
             </a:fld>
             <a:endParaRPr lang="ko-KR" altLang="en-US"/>
           </a:p>
@@ -2674,7 +2675,7 @@
           <a:p>
             <a:fld id="{74529166-E523-47B8-A70B-56CC3122A1F0}" type="datetimeFigureOut">
               <a:rPr lang="ko-KR" altLang="en-US" smtClean="0"/>
-              <a:t>2022-08-05</a:t>
+              <a:t>2022-08-06</a:t>
             </a:fld>
             <a:endParaRPr lang="ko-KR" altLang="en-US"/>
           </a:p>
@@ -2915,7 +2916,7 @@
           <a:p>
             <a:fld id="{74529166-E523-47B8-A70B-56CC3122A1F0}" type="datetimeFigureOut">
               <a:rPr lang="ko-KR" altLang="en-US" smtClean="0"/>
-              <a:t>2022-08-05</a:t>
+              <a:t>2022-08-06</a:t>
             </a:fld>
             <a:endParaRPr lang="ko-KR" altLang="en-US"/>
           </a:p>
@@ -5287,6 +5288,301 @@
 </p:sld>
 </file>
 
+<file path=ppt/slides/slide8.xml><?xml version="1.0" encoding="utf-8"?>
+<p:sld xmlns:a="http://schemas.openxmlformats.org/drawingml/2006/main" xmlns:r="http://schemas.openxmlformats.org/officeDocument/2006/relationships" xmlns:p="http://schemas.openxmlformats.org/presentationml/2006/main">
+  <p:cSld>
+    <p:spTree>
+      <p:nvGrpSpPr>
+        <p:cNvPr id="1" name=""/>
+        <p:cNvGrpSpPr/>
+        <p:nvPr/>
+      </p:nvGrpSpPr>
+      <p:grpSpPr>
+        <a:xfrm>
+          <a:off x="0" y="0"/>
+          <a:ext cx="0" cy="0"/>
+          <a:chOff x="0" y="0"/>
+          <a:chExt cx="0" cy="0"/>
+        </a:xfrm>
+      </p:grpSpPr>
+      <p:grpSp>
+        <p:nvGrpSpPr>
+          <p:cNvPr id="4" name="그룹 3">
+            <a:extLst>
+              <a:ext uri="{FF2B5EF4-FFF2-40B4-BE49-F238E27FC236}">
+                <a16:creationId xmlns:a16="http://schemas.microsoft.com/office/drawing/2014/main" id="{A1799870-32F6-737C-E121-65617D6CC2E3}"/>
+              </a:ext>
+            </a:extLst>
+          </p:cNvPr>
+          <p:cNvGrpSpPr/>
+          <p:nvPr/>
+        </p:nvGrpSpPr>
+        <p:grpSpPr>
+          <a:xfrm>
+            <a:off x="4296000" y="1630419"/>
+            <a:ext cx="3600000" cy="3597162"/>
+            <a:chOff x="4296000" y="1630419"/>
+            <a:chExt cx="3600000" cy="3597162"/>
+          </a:xfrm>
+        </p:grpSpPr>
+        <p:pic>
+          <p:nvPicPr>
+            <p:cNvPr id="17" name="그림 16">
+              <a:extLst>
+                <a:ext uri="{FF2B5EF4-FFF2-40B4-BE49-F238E27FC236}">
+                  <a16:creationId xmlns:a16="http://schemas.microsoft.com/office/drawing/2014/main" id="{F5EBAD99-FF08-DB06-086A-AAF6897DA2A4}"/>
+                </a:ext>
+              </a:extLst>
+            </p:cNvPr>
+            <p:cNvPicPr>
+              <a:picLocks noChangeAspect="1"/>
+            </p:cNvPicPr>
+            <p:nvPr/>
+          </p:nvPicPr>
+          <p:blipFill>
+            <a:blip r:embed="rId2">
+              <a:extLst>
+                <a:ext uri="{28A0092B-C50C-407E-A947-70E740481C1C}">
+                  <a14:useLocalDpi xmlns:a14="http://schemas.microsoft.com/office/drawing/2010/main" val="0"/>
+                </a:ext>
+              </a:extLst>
+            </a:blip>
+            <a:stretch>
+              <a:fillRect/>
+            </a:stretch>
+          </p:blipFill>
+          <p:spPr>
+            <a:xfrm>
+              <a:off x="4296000" y="1630419"/>
+              <a:ext cx="3600000" cy="3597162"/>
+            </a:xfrm>
+            <a:prstGeom prst="rect">
+              <a:avLst/>
+            </a:prstGeom>
+          </p:spPr>
+        </p:pic>
+        <p:sp>
+          <p:nvSpPr>
+            <p:cNvPr id="3" name="직사각형 2">
+              <a:extLst>
+                <a:ext uri="{FF2B5EF4-FFF2-40B4-BE49-F238E27FC236}">
+                  <a16:creationId xmlns:a16="http://schemas.microsoft.com/office/drawing/2014/main" id="{99DA0BAA-9587-438D-0852-50892BDB202C}"/>
+                </a:ext>
+              </a:extLst>
+            </p:cNvPr>
+            <p:cNvSpPr/>
+            <p:nvPr/>
+          </p:nvSpPr>
+          <p:spPr>
+            <a:xfrm>
+              <a:off x="4694540" y="2160970"/>
+              <a:ext cx="838512" cy="747693"/>
+            </a:xfrm>
+            <a:prstGeom prst="rect">
+              <a:avLst/>
+            </a:prstGeom>
+            <a:solidFill>
+              <a:srgbClr val="FF6565"/>
+            </a:solidFill>
+            <a:ln>
+              <a:noFill/>
+            </a:ln>
+          </p:spPr>
+          <p:style>
+            <a:lnRef idx="2">
+              <a:schemeClr val="accent1">
+                <a:shade val="50000"/>
+              </a:schemeClr>
+            </a:lnRef>
+            <a:fillRef idx="1">
+              <a:schemeClr val="accent1"/>
+            </a:fillRef>
+            <a:effectRef idx="0">
+              <a:schemeClr val="accent1"/>
+            </a:effectRef>
+            <a:fontRef idx="minor">
+              <a:schemeClr val="lt1"/>
+            </a:fontRef>
+          </p:style>
+          <p:txBody>
+            <a:bodyPr rtlCol="0" anchor="ctr"/>
+            <a:lstStyle/>
+            <a:p>
+              <a:pPr algn="ctr"/>
+              <a:endParaRPr lang="ko-KR" altLang="en-US"/>
+            </a:p>
+          </p:txBody>
+        </p:sp>
+        <p:sp>
+          <p:nvSpPr>
+            <p:cNvPr id="14" name="직사각형 13">
+              <a:extLst>
+                <a:ext uri="{FF2B5EF4-FFF2-40B4-BE49-F238E27FC236}">
+                  <a16:creationId xmlns:a16="http://schemas.microsoft.com/office/drawing/2014/main" id="{2FE3AC5B-B552-8E99-B9F3-939F3EF44767}"/>
+                </a:ext>
+              </a:extLst>
+            </p:cNvPr>
+            <p:cNvSpPr/>
+            <p:nvPr/>
+          </p:nvSpPr>
+          <p:spPr>
+            <a:xfrm>
+              <a:off x="6622058" y="4060683"/>
+              <a:ext cx="838512" cy="747693"/>
+            </a:xfrm>
+            <a:prstGeom prst="rect">
+              <a:avLst/>
+            </a:prstGeom>
+            <a:solidFill>
+              <a:srgbClr val="77F586"/>
+            </a:solidFill>
+            <a:ln>
+              <a:noFill/>
+            </a:ln>
+          </p:spPr>
+          <p:style>
+            <a:lnRef idx="2">
+              <a:schemeClr val="accent1">
+                <a:shade val="50000"/>
+              </a:schemeClr>
+            </a:lnRef>
+            <a:fillRef idx="1">
+              <a:schemeClr val="accent1"/>
+            </a:fillRef>
+            <a:effectRef idx="0">
+              <a:schemeClr val="accent1"/>
+            </a:effectRef>
+            <a:fontRef idx="minor">
+              <a:schemeClr val="lt1"/>
+            </a:fontRef>
+          </p:style>
+          <p:txBody>
+            <a:bodyPr rtlCol="0" anchor="ctr"/>
+            <a:lstStyle/>
+            <a:p>
+              <a:pPr algn="ctr"/>
+              <a:endParaRPr lang="ko-KR" altLang="en-US"/>
+            </a:p>
+          </p:txBody>
+        </p:sp>
+        <p:sp>
+          <p:nvSpPr>
+            <p:cNvPr id="15" name="직사각형 14">
+              <a:extLst>
+                <a:ext uri="{FF2B5EF4-FFF2-40B4-BE49-F238E27FC236}">
+                  <a16:creationId xmlns:a16="http://schemas.microsoft.com/office/drawing/2014/main" id="{D67B016F-828F-F227-DAC1-7C7FEEF3DC51}"/>
+                </a:ext>
+              </a:extLst>
+            </p:cNvPr>
+            <p:cNvSpPr/>
+            <p:nvPr/>
+          </p:nvSpPr>
+          <p:spPr>
+            <a:xfrm>
+              <a:off x="6658950" y="2263607"/>
+              <a:ext cx="838512" cy="747693"/>
+            </a:xfrm>
+            <a:prstGeom prst="rect">
+              <a:avLst/>
+            </a:prstGeom>
+            <a:solidFill>
+              <a:srgbClr val="FFFFAB"/>
+            </a:solidFill>
+            <a:ln>
+              <a:noFill/>
+            </a:ln>
+          </p:spPr>
+          <p:style>
+            <a:lnRef idx="2">
+              <a:schemeClr val="accent1">
+                <a:shade val="50000"/>
+              </a:schemeClr>
+            </a:lnRef>
+            <a:fillRef idx="1">
+              <a:schemeClr val="accent1"/>
+            </a:fillRef>
+            <a:effectRef idx="0">
+              <a:schemeClr val="accent1"/>
+            </a:effectRef>
+            <a:fontRef idx="minor">
+              <a:schemeClr val="lt1"/>
+            </a:fontRef>
+          </p:style>
+          <p:txBody>
+            <a:bodyPr rtlCol="0" anchor="ctr"/>
+            <a:lstStyle/>
+            <a:p>
+              <a:pPr algn="ctr"/>
+              <a:endParaRPr lang="ko-KR" altLang="en-US"/>
+            </a:p>
+          </p:txBody>
+        </p:sp>
+        <p:sp>
+          <p:nvSpPr>
+            <p:cNvPr id="16" name="직사각형 15">
+              <a:extLst>
+                <a:ext uri="{FF2B5EF4-FFF2-40B4-BE49-F238E27FC236}">
+                  <a16:creationId xmlns:a16="http://schemas.microsoft.com/office/drawing/2014/main" id="{AEE32158-1E24-1684-0AC9-CB6782003687}"/>
+                </a:ext>
+              </a:extLst>
+            </p:cNvPr>
+            <p:cNvSpPr/>
+            <p:nvPr/>
+          </p:nvSpPr>
+          <p:spPr>
+            <a:xfrm>
+              <a:off x="5039773" y="3885891"/>
+              <a:ext cx="838512" cy="747693"/>
+            </a:xfrm>
+            <a:prstGeom prst="rect">
+              <a:avLst/>
+            </a:prstGeom>
+            <a:solidFill>
+              <a:srgbClr val="93ADDD"/>
+            </a:solidFill>
+            <a:ln>
+              <a:noFill/>
+            </a:ln>
+          </p:spPr>
+          <p:style>
+            <a:lnRef idx="2">
+              <a:schemeClr val="accent1">
+                <a:shade val="50000"/>
+              </a:schemeClr>
+            </a:lnRef>
+            <a:fillRef idx="1">
+              <a:schemeClr val="accent1"/>
+            </a:fillRef>
+            <a:effectRef idx="0">
+              <a:schemeClr val="accent1"/>
+            </a:effectRef>
+            <a:fontRef idx="minor">
+              <a:schemeClr val="lt1"/>
+            </a:fontRef>
+          </p:style>
+          <p:txBody>
+            <a:bodyPr rtlCol="0" anchor="ctr"/>
+            <a:lstStyle/>
+            <a:p>
+              <a:pPr algn="ctr"/>
+              <a:endParaRPr lang="ko-KR" altLang="en-US"/>
+            </a:p>
+          </p:txBody>
+        </p:sp>
+      </p:grpSp>
+    </p:spTree>
+    <p:extLst>
+      <p:ext uri="{BB962C8B-B14F-4D97-AF65-F5344CB8AC3E}">
+        <p14:creationId xmlns:p14="http://schemas.microsoft.com/office/powerpoint/2010/main" val="373223169"/>
+      </p:ext>
+    </p:extLst>
+  </p:cSld>
+  <p:clrMapOvr>
+    <a:masterClrMapping/>
+  </p:clrMapOvr>
+</p:sld>
+</file>
+
 <file path=ppt/theme/theme1.xml><?xml version="1.0" encoding="utf-8"?>
 <a:theme xmlns:a="http://schemas.openxmlformats.org/drawingml/2006/main" name="Office 테마">
   <a:themeElements>

</xml_diff>

<commit_message>
[DISK-7] Result 컴포넌트 개발 6
</commit_message>
<xml_diff>
--- a/src/img/IMG.pptx
+++ b/src/img/IMG.pptx
@@ -266,7 +266,7 @@
           <a:p>
             <a:fld id="{74529166-E523-47B8-A70B-56CC3122A1F0}" type="datetimeFigureOut">
               <a:rPr lang="ko-KR" altLang="en-US" smtClean="0"/>
-              <a:t>2022-08-06</a:t>
+              <a:t>2022-08-07</a:t>
             </a:fld>
             <a:endParaRPr lang="ko-KR" altLang="en-US"/>
           </a:p>
@@ -464,7 +464,7 @@
           <a:p>
             <a:fld id="{74529166-E523-47B8-A70B-56CC3122A1F0}" type="datetimeFigureOut">
               <a:rPr lang="ko-KR" altLang="en-US" smtClean="0"/>
-              <a:t>2022-08-06</a:t>
+              <a:t>2022-08-07</a:t>
             </a:fld>
             <a:endParaRPr lang="ko-KR" altLang="en-US"/>
           </a:p>
@@ -672,7 +672,7 @@
           <a:p>
             <a:fld id="{74529166-E523-47B8-A70B-56CC3122A1F0}" type="datetimeFigureOut">
               <a:rPr lang="ko-KR" altLang="en-US" smtClean="0"/>
-              <a:t>2022-08-06</a:t>
+              <a:t>2022-08-07</a:t>
             </a:fld>
             <a:endParaRPr lang="ko-KR" altLang="en-US"/>
           </a:p>
@@ -870,7 +870,7 @@
           <a:p>
             <a:fld id="{74529166-E523-47B8-A70B-56CC3122A1F0}" type="datetimeFigureOut">
               <a:rPr lang="ko-KR" altLang="en-US" smtClean="0"/>
-              <a:t>2022-08-06</a:t>
+              <a:t>2022-08-07</a:t>
             </a:fld>
             <a:endParaRPr lang="ko-KR" altLang="en-US"/>
           </a:p>
@@ -1145,7 +1145,7 @@
           <a:p>
             <a:fld id="{74529166-E523-47B8-A70B-56CC3122A1F0}" type="datetimeFigureOut">
               <a:rPr lang="ko-KR" altLang="en-US" smtClean="0"/>
-              <a:t>2022-08-06</a:t>
+              <a:t>2022-08-07</a:t>
             </a:fld>
             <a:endParaRPr lang="ko-KR" altLang="en-US"/>
           </a:p>
@@ -1410,7 +1410,7 @@
           <a:p>
             <a:fld id="{74529166-E523-47B8-A70B-56CC3122A1F0}" type="datetimeFigureOut">
               <a:rPr lang="ko-KR" altLang="en-US" smtClean="0"/>
-              <a:t>2022-08-06</a:t>
+              <a:t>2022-08-07</a:t>
             </a:fld>
             <a:endParaRPr lang="ko-KR" altLang="en-US"/>
           </a:p>
@@ -1822,7 +1822,7 @@
           <a:p>
             <a:fld id="{74529166-E523-47B8-A70B-56CC3122A1F0}" type="datetimeFigureOut">
               <a:rPr lang="ko-KR" altLang="en-US" smtClean="0"/>
-              <a:t>2022-08-06</a:t>
+              <a:t>2022-08-07</a:t>
             </a:fld>
             <a:endParaRPr lang="ko-KR" altLang="en-US"/>
           </a:p>
@@ -1963,7 +1963,7 @@
           <a:p>
             <a:fld id="{74529166-E523-47B8-A70B-56CC3122A1F0}" type="datetimeFigureOut">
               <a:rPr lang="ko-KR" altLang="en-US" smtClean="0"/>
-              <a:t>2022-08-06</a:t>
+              <a:t>2022-08-07</a:t>
             </a:fld>
             <a:endParaRPr lang="ko-KR" altLang="en-US"/>
           </a:p>
@@ -2076,7 +2076,7 @@
           <a:p>
             <a:fld id="{74529166-E523-47B8-A70B-56CC3122A1F0}" type="datetimeFigureOut">
               <a:rPr lang="ko-KR" altLang="en-US" smtClean="0"/>
-              <a:t>2022-08-06</a:t>
+              <a:t>2022-08-07</a:t>
             </a:fld>
             <a:endParaRPr lang="ko-KR" altLang="en-US"/>
           </a:p>
@@ -2387,7 +2387,7 @@
           <a:p>
             <a:fld id="{74529166-E523-47B8-A70B-56CC3122A1F0}" type="datetimeFigureOut">
               <a:rPr lang="ko-KR" altLang="en-US" smtClean="0"/>
-              <a:t>2022-08-06</a:t>
+              <a:t>2022-08-07</a:t>
             </a:fld>
             <a:endParaRPr lang="ko-KR" altLang="en-US"/>
           </a:p>
@@ -2675,7 +2675,7 @@
           <a:p>
             <a:fld id="{74529166-E523-47B8-A70B-56CC3122A1F0}" type="datetimeFigureOut">
               <a:rPr lang="ko-KR" altLang="en-US" smtClean="0"/>
-              <a:t>2022-08-06</a:t>
+              <a:t>2022-08-07</a:t>
             </a:fld>
             <a:endParaRPr lang="ko-KR" altLang="en-US"/>
           </a:p>
@@ -2916,7 +2916,7 @@
           <a:p>
             <a:fld id="{74529166-E523-47B8-A70B-56CC3122A1F0}" type="datetimeFigureOut">
               <a:rPr lang="ko-KR" altLang="en-US" smtClean="0"/>
-              <a:t>2022-08-06</a:t>
+              <a:t>2022-08-07</a:t>
             </a:fld>
             <a:endParaRPr lang="ko-KR" altLang="en-US"/>
           </a:p>
@@ -4463,7 +4463,7 @@
         </p:nvGrpSpPr>
         <p:grpSpPr>
           <a:xfrm>
-            <a:off x="4119085" y="3159000"/>
+            <a:off x="1065256" y="537720"/>
             <a:ext cx="3953829" cy="540000"/>
             <a:chOff x="3222171" y="1706879"/>
             <a:chExt cx="3953829" cy="540000"/>
@@ -4678,6 +4678,2119 @@
           </p:txBody>
         </p:sp>
       </p:grpSp>
+      <p:grpSp>
+        <p:nvGrpSpPr>
+          <p:cNvPr id="9" name="그룹 8">
+            <a:extLst>
+              <a:ext uri="{FF2B5EF4-FFF2-40B4-BE49-F238E27FC236}">
+                <a16:creationId xmlns:a16="http://schemas.microsoft.com/office/drawing/2014/main" id="{4485E1D2-1637-3364-43C4-9177B055BD94}"/>
+              </a:ext>
+            </a:extLst>
+          </p:cNvPr>
+          <p:cNvGrpSpPr/>
+          <p:nvPr/>
+        </p:nvGrpSpPr>
+        <p:grpSpPr>
+          <a:xfrm>
+            <a:off x="1065255" y="1077720"/>
+            <a:ext cx="3953829" cy="540000"/>
+            <a:chOff x="4119085" y="3159000"/>
+            <a:chExt cx="3953829" cy="540000"/>
+          </a:xfrm>
+        </p:grpSpPr>
+        <p:sp>
+          <p:nvSpPr>
+            <p:cNvPr id="10" name="직사각형 9">
+              <a:extLst>
+                <a:ext uri="{FF2B5EF4-FFF2-40B4-BE49-F238E27FC236}">
+                  <a16:creationId xmlns:a16="http://schemas.microsoft.com/office/drawing/2014/main" id="{66F1AF71-95EC-0437-0EEB-D6B8633C7DB8}"/>
+                </a:ext>
+              </a:extLst>
+            </p:cNvPr>
+            <p:cNvSpPr/>
+            <p:nvPr/>
+          </p:nvSpPr>
+          <p:spPr>
+            <a:xfrm>
+              <a:off x="4119085" y="3159000"/>
+              <a:ext cx="1080000" cy="180000"/>
+            </a:xfrm>
+            <a:prstGeom prst="rect">
+              <a:avLst/>
+            </a:prstGeom>
+            <a:solidFill>
+              <a:srgbClr val="33A474"/>
+            </a:solidFill>
+            <a:ln>
+              <a:noFill/>
+            </a:ln>
+          </p:spPr>
+          <p:style>
+            <a:lnRef idx="2">
+              <a:schemeClr val="accent1">
+                <a:shade val="50000"/>
+              </a:schemeClr>
+            </a:lnRef>
+            <a:fillRef idx="1">
+              <a:schemeClr val="accent1"/>
+            </a:fillRef>
+            <a:effectRef idx="0">
+              <a:schemeClr val="accent1"/>
+            </a:effectRef>
+            <a:fontRef idx="minor">
+              <a:schemeClr val="lt1"/>
+            </a:fontRef>
+          </p:style>
+          <p:txBody>
+            <a:bodyPr rtlCol="0" anchor="ctr"/>
+            <a:lstStyle/>
+            <a:p>
+              <a:pPr algn="ctr"/>
+              <a:endParaRPr lang="ko-KR" altLang="en-US"/>
+            </a:p>
+          </p:txBody>
+        </p:sp>
+        <p:sp>
+          <p:nvSpPr>
+            <p:cNvPr id="11" name="직각 삼각형 10">
+              <a:extLst>
+                <a:ext uri="{FF2B5EF4-FFF2-40B4-BE49-F238E27FC236}">
+                  <a16:creationId xmlns:a16="http://schemas.microsoft.com/office/drawing/2014/main" id="{1617A71D-B458-E10B-0B4E-0A6479877FEE}"/>
+                </a:ext>
+              </a:extLst>
+            </p:cNvPr>
+            <p:cNvSpPr/>
+            <p:nvPr/>
+          </p:nvSpPr>
+          <p:spPr>
+            <a:xfrm flipH="1" flipV="1">
+              <a:off x="4119085" y="3339000"/>
+              <a:ext cx="1080000" cy="360000"/>
+            </a:xfrm>
+            <a:prstGeom prst="rtTriangle">
+              <a:avLst/>
+            </a:prstGeom>
+            <a:solidFill>
+              <a:srgbClr val="33A474"/>
+            </a:solidFill>
+            <a:ln>
+              <a:noFill/>
+            </a:ln>
+          </p:spPr>
+          <p:style>
+            <a:lnRef idx="2">
+              <a:schemeClr val="accent1">
+                <a:shade val="50000"/>
+              </a:schemeClr>
+            </a:lnRef>
+            <a:fillRef idx="1">
+              <a:schemeClr val="accent1"/>
+            </a:fillRef>
+            <a:effectRef idx="0">
+              <a:schemeClr val="accent1"/>
+            </a:effectRef>
+            <a:fontRef idx="minor">
+              <a:schemeClr val="lt1"/>
+            </a:fontRef>
+          </p:style>
+          <p:txBody>
+            <a:bodyPr rtlCol="0" anchor="ctr"/>
+            <a:lstStyle/>
+            <a:p>
+              <a:pPr algn="ctr"/>
+              <a:endParaRPr lang="ko-KR" altLang="en-US"/>
+            </a:p>
+          </p:txBody>
+        </p:sp>
+        <p:sp>
+          <p:nvSpPr>
+            <p:cNvPr id="12" name="직각 삼각형 11">
+              <a:extLst>
+                <a:ext uri="{FF2B5EF4-FFF2-40B4-BE49-F238E27FC236}">
+                  <a16:creationId xmlns:a16="http://schemas.microsoft.com/office/drawing/2014/main" id="{562F98E7-5D84-0D6C-456E-B27D1DF249F1}"/>
+                </a:ext>
+              </a:extLst>
+            </p:cNvPr>
+            <p:cNvSpPr/>
+            <p:nvPr/>
+          </p:nvSpPr>
+          <p:spPr>
+            <a:xfrm flipV="1">
+              <a:off x="5199085" y="3159000"/>
+              <a:ext cx="1800000" cy="540000"/>
+            </a:xfrm>
+            <a:prstGeom prst="rtTriangle">
+              <a:avLst/>
+            </a:prstGeom>
+            <a:solidFill>
+              <a:srgbClr val="33A474"/>
+            </a:solidFill>
+            <a:ln>
+              <a:noFill/>
+            </a:ln>
+          </p:spPr>
+          <p:style>
+            <a:lnRef idx="2">
+              <a:schemeClr val="accent1">
+                <a:shade val="50000"/>
+              </a:schemeClr>
+            </a:lnRef>
+            <a:fillRef idx="1">
+              <a:schemeClr val="accent1"/>
+            </a:fillRef>
+            <a:effectRef idx="0">
+              <a:schemeClr val="accent1"/>
+            </a:effectRef>
+            <a:fontRef idx="minor">
+              <a:schemeClr val="lt1"/>
+            </a:fontRef>
+          </p:style>
+          <p:txBody>
+            <a:bodyPr rtlCol="0" anchor="ctr"/>
+            <a:lstStyle/>
+            <a:p>
+              <a:pPr algn="ctr"/>
+              <a:endParaRPr lang="ko-KR" altLang="en-US"/>
+            </a:p>
+          </p:txBody>
+        </p:sp>
+        <p:sp>
+          <p:nvSpPr>
+            <p:cNvPr id="13" name="직각 삼각형 12">
+              <a:extLst>
+                <a:ext uri="{FF2B5EF4-FFF2-40B4-BE49-F238E27FC236}">
+                  <a16:creationId xmlns:a16="http://schemas.microsoft.com/office/drawing/2014/main" id="{DC5FE86E-ED7D-C423-8DCA-CB6868C6B384}"/>
+                </a:ext>
+              </a:extLst>
+            </p:cNvPr>
+            <p:cNvSpPr/>
+            <p:nvPr/>
+          </p:nvSpPr>
+          <p:spPr>
+            <a:xfrm flipH="1" flipV="1">
+              <a:off x="6992914" y="3159000"/>
+              <a:ext cx="1080000" cy="360000"/>
+            </a:xfrm>
+            <a:prstGeom prst="rtTriangle">
+              <a:avLst/>
+            </a:prstGeom>
+            <a:solidFill>
+              <a:srgbClr val="33A474"/>
+            </a:solidFill>
+            <a:ln>
+              <a:noFill/>
+            </a:ln>
+          </p:spPr>
+          <p:style>
+            <a:lnRef idx="2">
+              <a:schemeClr val="accent1">
+                <a:shade val="50000"/>
+              </a:schemeClr>
+            </a:lnRef>
+            <a:fillRef idx="1">
+              <a:schemeClr val="accent1"/>
+            </a:fillRef>
+            <a:effectRef idx="0">
+              <a:schemeClr val="accent1"/>
+            </a:effectRef>
+            <a:fontRef idx="minor">
+              <a:schemeClr val="lt1"/>
+            </a:fontRef>
+          </p:style>
+          <p:txBody>
+            <a:bodyPr rtlCol="0" anchor="ctr"/>
+            <a:lstStyle/>
+            <a:p>
+              <a:pPr algn="ctr"/>
+              <a:endParaRPr lang="ko-KR" altLang="en-US"/>
+            </a:p>
+          </p:txBody>
+        </p:sp>
+      </p:grpSp>
+      <p:grpSp>
+        <p:nvGrpSpPr>
+          <p:cNvPr id="2" name="그룹 1">
+            <a:extLst>
+              <a:ext uri="{FF2B5EF4-FFF2-40B4-BE49-F238E27FC236}">
+                <a16:creationId xmlns:a16="http://schemas.microsoft.com/office/drawing/2014/main" id="{4318E326-E611-33A4-191D-496F18FABB57}"/>
+              </a:ext>
+            </a:extLst>
+          </p:cNvPr>
+          <p:cNvGrpSpPr/>
+          <p:nvPr/>
+        </p:nvGrpSpPr>
+        <p:grpSpPr>
+          <a:xfrm>
+            <a:off x="1062170" y="1617720"/>
+            <a:ext cx="3953829" cy="540000"/>
+            <a:chOff x="1065256" y="2693161"/>
+            <a:chExt cx="3953829" cy="540000"/>
+          </a:xfrm>
+        </p:grpSpPr>
+        <p:sp>
+          <p:nvSpPr>
+            <p:cNvPr id="16" name="직사각형 15">
+              <a:extLst>
+                <a:ext uri="{FF2B5EF4-FFF2-40B4-BE49-F238E27FC236}">
+                  <a16:creationId xmlns:a16="http://schemas.microsoft.com/office/drawing/2014/main" id="{D2CE1681-EA1C-D775-99AF-85698AA7CC7A}"/>
+                </a:ext>
+              </a:extLst>
+            </p:cNvPr>
+            <p:cNvSpPr/>
+            <p:nvPr/>
+          </p:nvSpPr>
+          <p:spPr>
+            <a:xfrm>
+              <a:off x="1065256" y="2693161"/>
+              <a:ext cx="1080000" cy="180000"/>
+            </a:xfrm>
+            <a:prstGeom prst="rect">
+              <a:avLst/>
+            </a:prstGeom>
+            <a:solidFill>
+              <a:srgbClr val="FFA3A3"/>
+            </a:solidFill>
+            <a:ln>
+              <a:noFill/>
+            </a:ln>
+          </p:spPr>
+          <p:style>
+            <a:lnRef idx="2">
+              <a:schemeClr val="accent1">
+                <a:shade val="50000"/>
+              </a:schemeClr>
+            </a:lnRef>
+            <a:fillRef idx="1">
+              <a:schemeClr val="accent1"/>
+            </a:fillRef>
+            <a:effectRef idx="0">
+              <a:schemeClr val="accent1"/>
+            </a:effectRef>
+            <a:fontRef idx="minor">
+              <a:schemeClr val="lt1"/>
+            </a:fontRef>
+          </p:style>
+          <p:txBody>
+            <a:bodyPr rtlCol="0" anchor="ctr"/>
+            <a:lstStyle/>
+            <a:p>
+              <a:pPr algn="ctr"/>
+              <a:endParaRPr lang="ko-KR" altLang="en-US"/>
+            </a:p>
+          </p:txBody>
+        </p:sp>
+        <p:sp>
+          <p:nvSpPr>
+            <p:cNvPr id="17" name="직각 삼각형 16">
+              <a:extLst>
+                <a:ext uri="{FF2B5EF4-FFF2-40B4-BE49-F238E27FC236}">
+                  <a16:creationId xmlns:a16="http://schemas.microsoft.com/office/drawing/2014/main" id="{24AA20EC-3EB9-EA17-B759-E29985C57F57}"/>
+                </a:ext>
+              </a:extLst>
+            </p:cNvPr>
+            <p:cNvSpPr/>
+            <p:nvPr/>
+          </p:nvSpPr>
+          <p:spPr>
+            <a:xfrm flipH="1" flipV="1">
+              <a:off x="1065256" y="2873161"/>
+              <a:ext cx="1080000" cy="360000"/>
+            </a:xfrm>
+            <a:prstGeom prst="rtTriangle">
+              <a:avLst/>
+            </a:prstGeom>
+            <a:solidFill>
+              <a:srgbClr val="FFA3A3"/>
+            </a:solidFill>
+            <a:ln>
+              <a:noFill/>
+            </a:ln>
+          </p:spPr>
+          <p:style>
+            <a:lnRef idx="2">
+              <a:schemeClr val="accent1">
+                <a:shade val="50000"/>
+              </a:schemeClr>
+            </a:lnRef>
+            <a:fillRef idx="1">
+              <a:schemeClr val="accent1"/>
+            </a:fillRef>
+            <a:effectRef idx="0">
+              <a:schemeClr val="accent1"/>
+            </a:effectRef>
+            <a:fontRef idx="minor">
+              <a:schemeClr val="lt1"/>
+            </a:fontRef>
+          </p:style>
+          <p:txBody>
+            <a:bodyPr rtlCol="0" anchor="ctr"/>
+            <a:lstStyle/>
+            <a:p>
+              <a:pPr algn="ctr"/>
+              <a:endParaRPr lang="ko-KR" altLang="en-US"/>
+            </a:p>
+          </p:txBody>
+        </p:sp>
+        <p:sp>
+          <p:nvSpPr>
+            <p:cNvPr id="18" name="직각 삼각형 17">
+              <a:extLst>
+                <a:ext uri="{FF2B5EF4-FFF2-40B4-BE49-F238E27FC236}">
+                  <a16:creationId xmlns:a16="http://schemas.microsoft.com/office/drawing/2014/main" id="{7B94F8B5-6826-0EA6-1CA3-00DD47BF89CE}"/>
+                </a:ext>
+              </a:extLst>
+            </p:cNvPr>
+            <p:cNvSpPr/>
+            <p:nvPr/>
+          </p:nvSpPr>
+          <p:spPr>
+            <a:xfrm flipV="1">
+              <a:off x="2145256" y="2693161"/>
+              <a:ext cx="1800000" cy="540000"/>
+            </a:xfrm>
+            <a:prstGeom prst="rtTriangle">
+              <a:avLst/>
+            </a:prstGeom>
+            <a:solidFill>
+              <a:srgbClr val="FFA3A3"/>
+            </a:solidFill>
+            <a:ln>
+              <a:noFill/>
+            </a:ln>
+          </p:spPr>
+          <p:style>
+            <a:lnRef idx="2">
+              <a:schemeClr val="accent1">
+                <a:shade val="50000"/>
+              </a:schemeClr>
+            </a:lnRef>
+            <a:fillRef idx="1">
+              <a:schemeClr val="accent1"/>
+            </a:fillRef>
+            <a:effectRef idx="0">
+              <a:schemeClr val="accent1"/>
+            </a:effectRef>
+            <a:fontRef idx="minor">
+              <a:schemeClr val="lt1"/>
+            </a:fontRef>
+          </p:style>
+          <p:txBody>
+            <a:bodyPr rtlCol="0" anchor="ctr"/>
+            <a:lstStyle/>
+            <a:p>
+              <a:pPr algn="ctr"/>
+              <a:endParaRPr lang="ko-KR" altLang="en-US"/>
+            </a:p>
+          </p:txBody>
+        </p:sp>
+        <p:sp>
+          <p:nvSpPr>
+            <p:cNvPr id="19" name="직각 삼각형 18">
+              <a:extLst>
+                <a:ext uri="{FF2B5EF4-FFF2-40B4-BE49-F238E27FC236}">
+                  <a16:creationId xmlns:a16="http://schemas.microsoft.com/office/drawing/2014/main" id="{A6187C60-EA6C-50C6-33AB-D8D8F2AABB68}"/>
+                </a:ext>
+              </a:extLst>
+            </p:cNvPr>
+            <p:cNvSpPr/>
+            <p:nvPr/>
+          </p:nvSpPr>
+          <p:spPr>
+            <a:xfrm flipH="1" flipV="1">
+              <a:off x="3939085" y="2693161"/>
+              <a:ext cx="1080000" cy="360000"/>
+            </a:xfrm>
+            <a:prstGeom prst="rtTriangle">
+              <a:avLst/>
+            </a:prstGeom>
+            <a:solidFill>
+              <a:srgbClr val="FFA3A3"/>
+            </a:solidFill>
+            <a:ln>
+              <a:noFill/>
+            </a:ln>
+          </p:spPr>
+          <p:style>
+            <a:lnRef idx="2">
+              <a:schemeClr val="accent1">
+                <a:shade val="50000"/>
+              </a:schemeClr>
+            </a:lnRef>
+            <a:fillRef idx="1">
+              <a:schemeClr val="accent1"/>
+            </a:fillRef>
+            <a:effectRef idx="0">
+              <a:schemeClr val="accent1"/>
+            </a:effectRef>
+            <a:fontRef idx="minor">
+              <a:schemeClr val="lt1"/>
+            </a:fontRef>
+          </p:style>
+          <p:txBody>
+            <a:bodyPr rtlCol="0" anchor="ctr"/>
+            <a:lstStyle/>
+            <a:p>
+              <a:pPr algn="ctr"/>
+              <a:endParaRPr lang="ko-KR" altLang="en-US"/>
+            </a:p>
+          </p:txBody>
+        </p:sp>
+      </p:grpSp>
+      <p:grpSp>
+        <p:nvGrpSpPr>
+          <p:cNvPr id="3" name="그룹 2">
+            <a:extLst>
+              <a:ext uri="{FF2B5EF4-FFF2-40B4-BE49-F238E27FC236}">
+                <a16:creationId xmlns:a16="http://schemas.microsoft.com/office/drawing/2014/main" id="{873B232D-236F-BB4C-4D9E-4AA556E8FA25}"/>
+              </a:ext>
+            </a:extLst>
+          </p:cNvPr>
+          <p:cNvGrpSpPr/>
+          <p:nvPr/>
+        </p:nvGrpSpPr>
+        <p:grpSpPr>
+          <a:xfrm>
+            <a:off x="1065255" y="2157720"/>
+            <a:ext cx="3953829" cy="540000"/>
+            <a:chOff x="1059085" y="3617676"/>
+            <a:chExt cx="3953829" cy="540000"/>
+          </a:xfrm>
+        </p:grpSpPr>
+        <p:sp>
+          <p:nvSpPr>
+            <p:cNvPr id="20" name="직사각형 19">
+              <a:extLst>
+                <a:ext uri="{FF2B5EF4-FFF2-40B4-BE49-F238E27FC236}">
+                  <a16:creationId xmlns:a16="http://schemas.microsoft.com/office/drawing/2014/main" id="{C47DEC37-2C60-78F7-1B3C-7F5169BF2EE6}"/>
+                </a:ext>
+              </a:extLst>
+            </p:cNvPr>
+            <p:cNvSpPr/>
+            <p:nvPr/>
+          </p:nvSpPr>
+          <p:spPr>
+            <a:xfrm>
+              <a:off x="1059085" y="3617676"/>
+              <a:ext cx="1080000" cy="180000"/>
+            </a:xfrm>
+            <a:prstGeom prst="rect">
+              <a:avLst/>
+            </a:prstGeom>
+            <a:solidFill>
+              <a:srgbClr val="FFFFAB"/>
+            </a:solidFill>
+            <a:ln>
+              <a:noFill/>
+            </a:ln>
+          </p:spPr>
+          <p:style>
+            <a:lnRef idx="2">
+              <a:schemeClr val="accent1">
+                <a:shade val="50000"/>
+              </a:schemeClr>
+            </a:lnRef>
+            <a:fillRef idx="1">
+              <a:schemeClr val="accent1"/>
+            </a:fillRef>
+            <a:effectRef idx="0">
+              <a:schemeClr val="accent1"/>
+            </a:effectRef>
+            <a:fontRef idx="minor">
+              <a:schemeClr val="lt1"/>
+            </a:fontRef>
+          </p:style>
+          <p:txBody>
+            <a:bodyPr rtlCol="0" anchor="ctr"/>
+            <a:lstStyle/>
+            <a:p>
+              <a:pPr algn="ctr"/>
+              <a:endParaRPr lang="ko-KR" altLang="en-US"/>
+            </a:p>
+          </p:txBody>
+        </p:sp>
+        <p:sp>
+          <p:nvSpPr>
+            <p:cNvPr id="21" name="직각 삼각형 20">
+              <a:extLst>
+                <a:ext uri="{FF2B5EF4-FFF2-40B4-BE49-F238E27FC236}">
+                  <a16:creationId xmlns:a16="http://schemas.microsoft.com/office/drawing/2014/main" id="{74CEED94-D87A-B4E8-9E8F-C5DA0D852BB5}"/>
+                </a:ext>
+              </a:extLst>
+            </p:cNvPr>
+            <p:cNvSpPr/>
+            <p:nvPr/>
+          </p:nvSpPr>
+          <p:spPr>
+            <a:xfrm flipH="1" flipV="1">
+              <a:off x="1059085" y="3797676"/>
+              <a:ext cx="1080000" cy="360000"/>
+            </a:xfrm>
+            <a:prstGeom prst="rtTriangle">
+              <a:avLst/>
+            </a:prstGeom>
+            <a:solidFill>
+              <a:srgbClr val="FFFFAB"/>
+            </a:solidFill>
+            <a:ln>
+              <a:noFill/>
+            </a:ln>
+          </p:spPr>
+          <p:style>
+            <a:lnRef idx="2">
+              <a:schemeClr val="accent1">
+                <a:shade val="50000"/>
+              </a:schemeClr>
+            </a:lnRef>
+            <a:fillRef idx="1">
+              <a:schemeClr val="accent1"/>
+            </a:fillRef>
+            <a:effectRef idx="0">
+              <a:schemeClr val="accent1"/>
+            </a:effectRef>
+            <a:fontRef idx="minor">
+              <a:schemeClr val="lt1"/>
+            </a:fontRef>
+          </p:style>
+          <p:txBody>
+            <a:bodyPr rtlCol="0" anchor="ctr"/>
+            <a:lstStyle/>
+            <a:p>
+              <a:pPr algn="ctr"/>
+              <a:endParaRPr lang="ko-KR" altLang="en-US"/>
+            </a:p>
+          </p:txBody>
+        </p:sp>
+        <p:sp>
+          <p:nvSpPr>
+            <p:cNvPr id="22" name="직각 삼각형 21">
+              <a:extLst>
+                <a:ext uri="{FF2B5EF4-FFF2-40B4-BE49-F238E27FC236}">
+                  <a16:creationId xmlns:a16="http://schemas.microsoft.com/office/drawing/2014/main" id="{369B592C-A6E5-EE0A-217C-FF39C4E01CAA}"/>
+                </a:ext>
+              </a:extLst>
+            </p:cNvPr>
+            <p:cNvSpPr/>
+            <p:nvPr/>
+          </p:nvSpPr>
+          <p:spPr>
+            <a:xfrm flipV="1">
+              <a:off x="2139085" y="3617676"/>
+              <a:ext cx="1800000" cy="540000"/>
+            </a:xfrm>
+            <a:prstGeom prst="rtTriangle">
+              <a:avLst/>
+            </a:prstGeom>
+            <a:solidFill>
+              <a:srgbClr val="FFFFAB"/>
+            </a:solidFill>
+            <a:ln>
+              <a:noFill/>
+            </a:ln>
+          </p:spPr>
+          <p:style>
+            <a:lnRef idx="2">
+              <a:schemeClr val="accent1">
+                <a:shade val="50000"/>
+              </a:schemeClr>
+            </a:lnRef>
+            <a:fillRef idx="1">
+              <a:schemeClr val="accent1"/>
+            </a:fillRef>
+            <a:effectRef idx="0">
+              <a:schemeClr val="accent1"/>
+            </a:effectRef>
+            <a:fontRef idx="minor">
+              <a:schemeClr val="lt1"/>
+            </a:fontRef>
+          </p:style>
+          <p:txBody>
+            <a:bodyPr rtlCol="0" anchor="ctr"/>
+            <a:lstStyle/>
+            <a:p>
+              <a:pPr algn="ctr"/>
+              <a:endParaRPr lang="ko-KR" altLang="en-US"/>
+            </a:p>
+          </p:txBody>
+        </p:sp>
+        <p:sp>
+          <p:nvSpPr>
+            <p:cNvPr id="23" name="직각 삼각형 22">
+              <a:extLst>
+                <a:ext uri="{FF2B5EF4-FFF2-40B4-BE49-F238E27FC236}">
+                  <a16:creationId xmlns:a16="http://schemas.microsoft.com/office/drawing/2014/main" id="{38160CAE-6C1B-4FBB-81DB-A20575D83C53}"/>
+                </a:ext>
+              </a:extLst>
+            </p:cNvPr>
+            <p:cNvSpPr/>
+            <p:nvPr/>
+          </p:nvSpPr>
+          <p:spPr>
+            <a:xfrm flipH="1" flipV="1">
+              <a:off x="3932914" y="3617676"/>
+              <a:ext cx="1080000" cy="360000"/>
+            </a:xfrm>
+            <a:prstGeom prst="rtTriangle">
+              <a:avLst/>
+            </a:prstGeom>
+            <a:solidFill>
+              <a:srgbClr val="FFFFAB"/>
+            </a:solidFill>
+            <a:ln>
+              <a:noFill/>
+            </a:ln>
+          </p:spPr>
+          <p:style>
+            <a:lnRef idx="2">
+              <a:schemeClr val="accent1">
+                <a:shade val="50000"/>
+              </a:schemeClr>
+            </a:lnRef>
+            <a:fillRef idx="1">
+              <a:schemeClr val="accent1"/>
+            </a:fillRef>
+            <a:effectRef idx="0">
+              <a:schemeClr val="accent1"/>
+            </a:effectRef>
+            <a:fontRef idx="minor">
+              <a:schemeClr val="lt1"/>
+            </a:fontRef>
+          </p:style>
+          <p:txBody>
+            <a:bodyPr rtlCol="0" anchor="ctr"/>
+            <a:lstStyle/>
+            <a:p>
+              <a:pPr algn="ctr"/>
+              <a:endParaRPr lang="ko-KR" altLang="en-US"/>
+            </a:p>
+          </p:txBody>
+        </p:sp>
+      </p:grpSp>
+      <p:grpSp>
+        <p:nvGrpSpPr>
+          <p:cNvPr id="4" name="그룹 3">
+            <a:extLst>
+              <a:ext uri="{FF2B5EF4-FFF2-40B4-BE49-F238E27FC236}">
+                <a16:creationId xmlns:a16="http://schemas.microsoft.com/office/drawing/2014/main" id="{51F389F0-E7AD-2BC8-EA05-4E17D04DDF95}"/>
+              </a:ext>
+            </a:extLst>
+          </p:cNvPr>
+          <p:cNvGrpSpPr/>
+          <p:nvPr/>
+        </p:nvGrpSpPr>
+        <p:grpSpPr>
+          <a:xfrm>
+            <a:off x="1062170" y="2697720"/>
+            <a:ext cx="3953829" cy="540000"/>
+            <a:chOff x="1065256" y="4542191"/>
+            <a:chExt cx="3953829" cy="540000"/>
+          </a:xfrm>
+        </p:grpSpPr>
+        <p:sp>
+          <p:nvSpPr>
+            <p:cNvPr id="24" name="직사각형 23">
+              <a:extLst>
+                <a:ext uri="{FF2B5EF4-FFF2-40B4-BE49-F238E27FC236}">
+                  <a16:creationId xmlns:a16="http://schemas.microsoft.com/office/drawing/2014/main" id="{EC6E364E-CE97-B5DD-5D28-67F1E75BA7BB}"/>
+                </a:ext>
+              </a:extLst>
+            </p:cNvPr>
+            <p:cNvSpPr/>
+            <p:nvPr/>
+          </p:nvSpPr>
+          <p:spPr>
+            <a:xfrm>
+              <a:off x="1065256" y="4542191"/>
+              <a:ext cx="1080000" cy="180000"/>
+            </a:xfrm>
+            <a:prstGeom prst="rect">
+              <a:avLst/>
+            </a:prstGeom>
+            <a:solidFill>
+              <a:srgbClr val="93ADDD"/>
+            </a:solidFill>
+            <a:ln>
+              <a:noFill/>
+            </a:ln>
+          </p:spPr>
+          <p:style>
+            <a:lnRef idx="2">
+              <a:schemeClr val="accent1">
+                <a:shade val="50000"/>
+              </a:schemeClr>
+            </a:lnRef>
+            <a:fillRef idx="1">
+              <a:schemeClr val="accent1"/>
+            </a:fillRef>
+            <a:effectRef idx="0">
+              <a:schemeClr val="accent1"/>
+            </a:effectRef>
+            <a:fontRef idx="minor">
+              <a:schemeClr val="lt1"/>
+            </a:fontRef>
+          </p:style>
+          <p:txBody>
+            <a:bodyPr rtlCol="0" anchor="ctr"/>
+            <a:lstStyle/>
+            <a:p>
+              <a:pPr algn="ctr"/>
+              <a:endParaRPr lang="ko-KR" altLang="en-US"/>
+            </a:p>
+          </p:txBody>
+        </p:sp>
+        <p:sp>
+          <p:nvSpPr>
+            <p:cNvPr id="25" name="직각 삼각형 24">
+              <a:extLst>
+                <a:ext uri="{FF2B5EF4-FFF2-40B4-BE49-F238E27FC236}">
+                  <a16:creationId xmlns:a16="http://schemas.microsoft.com/office/drawing/2014/main" id="{2B244FE5-DD66-D731-93CE-50D60DE72519}"/>
+                </a:ext>
+              </a:extLst>
+            </p:cNvPr>
+            <p:cNvSpPr/>
+            <p:nvPr/>
+          </p:nvSpPr>
+          <p:spPr>
+            <a:xfrm flipH="1" flipV="1">
+              <a:off x="1065256" y="4722191"/>
+              <a:ext cx="1080000" cy="360000"/>
+            </a:xfrm>
+            <a:prstGeom prst="rtTriangle">
+              <a:avLst/>
+            </a:prstGeom>
+            <a:solidFill>
+              <a:srgbClr val="93ADDD"/>
+            </a:solidFill>
+            <a:ln>
+              <a:noFill/>
+            </a:ln>
+          </p:spPr>
+          <p:style>
+            <a:lnRef idx="2">
+              <a:schemeClr val="accent1">
+                <a:shade val="50000"/>
+              </a:schemeClr>
+            </a:lnRef>
+            <a:fillRef idx="1">
+              <a:schemeClr val="accent1"/>
+            </a:fillRef>
+            <a:effectRef idx="0">
+              <a:schemeClr val="accent1"/>
+            </a:effectRef>
+            <a:fontRef idx="minor">
+              <a:schemeClr val="lt1"/>
+            </a:fontRef>
+          </p:style>
+          <p:txBody>
+            <a:bodyPr rtlCol="0" anchor="ctr"/>
+            <a:lstStyle/>
+            <a:p>
+              <a:pPr algn="ctr"/>
+              <a:endParaRPr lang="ko-KR" altLang="en-US"/>
+            </a:p>
+          </p:txBody>
+        </p:sp>
+        <p:sp>
+          <p:nvSpPr>
+            <p:cNvPr id="26" name="직각 삼각형 25">
+              <a:extLst>
+                <a:ext uri="{FF2B5EF4-FFF2-40B4-BE49-F238E27FC236}">
+                  <a16:creationId xmlns:a16="http://schemas.microsoft.com/office/drawing/2014/main" id="{493C69CE-D2E1-75C4-437A-5277BA5E3881}"/>
+                </a:ext>
+              </a:extLst>
+            </p:cNvPr>
+            <p:cNvSpPr/>
+            <p:nvPr/>
+          </p:nvSpPr>
+          <p:spPr>
+            <a:xfrm flipV="1">
+              <a:off x="2145256" y="4542191"/>
+              <a:ext cx="1800000" cy="540000"/>
+            </a:xfrm>
+            <a:prstGeom prst="rtTriangle">
+              <a:avLst/>
+            </a:prstGeom>
+            <a:solidFill>
+              <a:srgbClr val="93ADDD"/>
+            </a:solidFill>
+            <a:ln>
+              <a:noFill/>
+            </a:ln>
+          </p:spPr>
+          <p:style>
+            <a:lnRef idx="2">
+              <a:schemeClr val="accent1">
+                <a:shade val="50000"/>
+              </a:schemeClr>
+            </a:lnRef>
+            <a:fillRef idx="1">
+              <a:schemeClr val="accent1"/>
+            </a:fillRef>
+            <a:effectRef idx="0">
+              <a:schemeClr val="accent1"/>
+            </a:effectRef>
+            <a:fontRef idx="minor">
+              <a:schemeClr val="lt1"/>
+            </a:fontRef>
+          </p:style>
+          <p:txBody>
+            <a:bodyPr rtlCol="0" anchor="ctr"/>
+            <a:lstStyle/>
+            <a:p>
+              <a:pPr algn="ctr"/>
+              <a:endParaRPr lang="ko-KR" altLang="en-US"/>
+            </a:p>
+          </p:txBody>
+        </p:sp>
+        <p:sp>
+          <p:nvSpPr>
+            <p:cNvPr id="27" name="직각 삼각형 26">
+              <a:extLst>
+                <a:ext uri="{FF2B5EF4-FFF2-40B4-BE49-F238E27FC236}">
+                  <a16:creationId xmlns:a16="http://schemas.microsoft.com/office/drawing/2014/main" id="{A221ED7B-41D0-FA38-5F3F-B51785B4226D}"/>
+                </a:ext>
+              </a:extLst>
+            </p:cNvPr>
+            <p:cNvSpPr/>
+            <p:nvPr/>
+          </p:nvSpPr>
+          <p:spPr>
+            <a:xfrm flipH="1" flipV="1">
+              <a:off x="3939085" y="4542191"/>
+              <a:ext cx="1080000" cy="360000"/>
+            </a:xfrm>
+            <a:prstGeom prst="rtTriangle">
+              <a:avLst/>
+            </a:prstGeom>
+            <a:solidFill>
+              <a:srgbClr val="93ADDD"/>
+            </a:solidFill>
+            <a:ln>
+              <a:noFill/>
+            </a:ln>
+          </p:spPr>
+          <p:style>
+            <a:lnRef idx="2">
+              <a:schemeClr val="accent1">
+                <a:shade val="50000"/>
+              </a:schemeClr>
+            </a:lnRef>
+            <a:fillRef idx="1">
+              <a:schemeClr val="accent1"/>
+            </a:fillRef>
+            <a:effectRef idx="0">
+              <a:schemeClr val="accent1"/>
+            </a:effectRef>
+            <a:fontRef idx="minor">
+              <a:schemeClr val="lt1"/>
+            </a:fontRef>
+          </p:style>
+          <p:txBody>
+            <a:bodyPr rtlCol="0" anchor="ctr"/>
+            <a:lstStyle/>
+            <a:p>
+              <a:pPr algn="ctr"/>
+              <a:endParaRPr lang="ko-KR" altLang="en-US"/>
+            </a:p>
+          </p:txBody>
+        </p:sp>
+      </p:grpSp>
+      <p:grpSp>
+        <p:nvGrpSpPr>
+          <p:cNvPr id="32" name="그룹 31">
+            <a:extLst>
+              <a:ext uri="{FF2B5EF4-FFF2-40B4-BE49-F238E27FC236}">
+                <a16:creationId xmlns:a16="http://schemas.microsoft.com/office/drawing/2014/main" id="{E5850CFB-30CC-EF87-B8CF-F083EBE2749B}"/>
+              </a:ext>
+            </a:extLst>
+          </p:cNvPr>
+          <p:cNvGrpSpPr/>
+          <p:nvPr/>
+        </p:nvGrpSpPr>
+        <p:grpSpPr>
+          <a:xfrm>
+            <a:off x="1065255" y="3237720"/>
+            <a:ext cx="3953829" cy="540000"/>
+            <a:chOff x="1059085" y="5556706"/>
+            <a:chExt cx="3953829" cy="540000"/>
+          </a:xfrm>
+        </p:grpSpPr>
+        <p:sp>
+          <p:nvSpPr>
+            <p:cNvPr id="28" name="직사각형 27">
+              <a:extLst>
+                <a:ext uri="{FF2B5EF4-FFF2-40B4-BE49-F238E27FC236}">
+                  <a16:creationId xmlns:a16="http://schemas.microsoft.com/office/drawing/2014/main" id="{8301415A-F694-A57A-4495-FBB58FE7775C}"/>
+                </a:ext>
+              </a:extLst>
+            </p:cNvPr>
+            <p:cNvSpPr/>
+            <p:nvPr/>
+          </p:nvSpPr>
+          <p:spPr>
+            <a:xfrm>
+              <a:off x="1059085" y="5556706"/>
+              <a:ext cx="1080000" cy="180000"/>
+            </a:xfrm>
+            <a:prstGeom prst="rect">
+              <a:avLst/>
+            </a:prstGeom>
+            <a:solidFill>
+              <a:srgbClr val="B4FABC"/>
+            </a:solidFill>
+            <a:ln>
+              <a:noFill/>
+            </a:ln>
+          </p:spPr>
+          <p:style>
+            <a:lnRef idx="2">
+              <a:schemeClr val="accent1">
+                <a:shade val="50000"/>
+              </a:schemeClr>
+            </a:lnRef>
+            <a:fillRef idx="1">
+              <a:schemeClr val="accent1"/>
+            </a:fillRef>
+            <a:effectRef idx="0">
+              <a:schemeClr val="accent1"/>
+            </a:effectRef>
+            <a:fontRef idx="minor">
+              <a:schemeClr val="lt1"/>
+            </a:fontRef>
+          </p:style>
+          <p:txBody>
+            <a:bodyPr rtlCol="0" anchor="ctr"/>
+            <a:lstStyle/>
+            <a:p>
+              <a:pPr algn="ctr"/>
+              <a:endParaRPr lang="ko-KR" altLang="en-US"/>
+            </a:p>
+          </p:txBody>
+        </p:sp>
+        <p:sp>
+          <p:nvSpPr>
+            <p:cNvPr id="29" name="직각 삼각형 28">
+              <a:extLst>
+                <a:ext uri="{FF2B5EF4-FFF2-40B4-BE49-F238E27FC236}">
+                  <a16:creationId xmlns:a16="http://schemas.microsoft.com/office/drawing/2014/main" id="{716614B9-899E-D5C5-15F2-A0EDD887642B}"/>
+                </a:ext>
+              </a:extLst>
+            </p:cNvPr>
+            <p:cNvSpPr/>
+            <p:nvPr/>
+          </p:nvSpPr>
+          <p:spPr>
+            <a:xfrm flipH="1" flipV="1">
+              <a:off x="1059085" y="5736706"/>
+              <a:ext cx="1080000" cy="360000"/>
+            </a:xfrm>
+            <a:prstGeom prst="rtTriangle">
+              <a:avLst/>
+            </a:prstGeom>
+            <a:solidFill>
+              <a:srgbClr val="B4FABC"/>
+            </a:solidFill>
+            <a:ln>
+              <a:noFill/>
+            </a:ln>
+          </p:spPr>
+          <p:style>
+            <a:lnRef idx="2">
+              <a:schemeClr val="accent1">
+                <a:shade val="50000"/>
+              </a:schemeClr>
+            </a:lnRef>
+            <a:fillRef idx="1">
+              <a:schemeClr val="accent1"/>
+            </a:fillRef>
+            <a:effectRef idx="0">
+              <a:schemeClr val="accent1"/>
+            </a:effectRef>
+            <a:fontRef idx="minor">
+              <a:schemeClr val="lt1"/>
+            </a:fontRef>
+          </p:style>
+          <p:txBody>
+            <a:bodyPr rtlCol="0" anchor="ctr"/>
+            <a:lstStyle/>
+            <a:p>
+              <a:pPr algn="ctr"/>
+              <a:endParaRPr lang="ko-KR" altLang="en-US"/>
+            </a:p>
+          </p:txBody>
+        </p:sp>
+        <p:sp>
+          <p:nvSpPr>
+            <p:cNvPr id="30" name="직각 삼각형 29">
+              <a:extLst>
+                <a:ext uri="{FF2B5EF4-FFF2-40B4-BE49-F238E27FC236}">
+                  <a16:creationId xmlns:a16="http://schemas.microsoft.com/office/drawing/2014/main" id="{24FBEE81-ADAB-7548-A592-9DFE37DF79B6}"/>
+                </a:ext>
+              </a:extLst>
+            </p:cNvPr>
+            <p:cNvSpPr/>
+            <p:nvPr/>
+          </p:nvSpPr>
+          <p:spPr>
+            <a:xfrm flipV="1">
+              <a:off x="2139085" y="5556706"/>
+              <a:ext cx="1800000" cy="540000"/>
+            </a:xfrm>
+            <a:prstGeom prst="rtTriangle">
+              <a:avLst/>
+            </a:prstGeom>
+            <a:solidFill>
+              <a:srgbClr val="B4FABC"/>
+            </a:solidFill>
+            <a:ln>
+              <a:noFill/>
+            </a:ln>
+          </p:spPr>
+          <p:style>
+            <a:lnRef idx="2">
+              <a:schemeClr val="accent1">
+                <a:shade val="50000"/>
+              </a:schemeClr>
+            </a:lnRef>
+            <a:fillRef idx="1">
+              <a:schemeClr val="accent1"/>
+            </a:fillRef>
+            <a:effectRef idx="0">
+              <a:schemeClr val="accent1"/>
+            </a:effectRef>
+            <a:fontRef idx="minor">
+              <a:schemeClr val="lt1"/>
+            </a:fontRef>
+          </p:style>
+          <p:txBody>
+            <a:bodyPr rtlCol="0" anchor="ctr"/>
+            <a:lstStyle/>
+            <a:p>
+              <a:pPr algn="ctr"/>
+              <a:endParaRPr lang="ko-KR" altLang="en-US"/>
+            </a:p>
+          </p:txBody>
+        </p:sp>
+        <p:sp>
+          <p:nvSpPr>
+            <p:cNvPr id="31" name="직각 삼각형 30">
+              <a:extLst>
+                <a:ext uri="{FF2B5EF4-FFF2-40B4-BE49-F238E27FC236}">
+                  <a16:creationId xmlns:a16="http://schemas.microsoft.com/office/drawing/2014/main" id="{95F0FB5D-00A7-EE01-8FD3-F588C48C7676}"/>
+                </a:ext>
+              </a:extLst>
+            </p:cNvPr>
+            <p:cNvSpPr/>
+            <p:nvPr/>
+          </p:nvSpPr>
+          <p:spPr>
+            <a:xfrm flipH="1" flipV="1">
+              <a:off x="3932914" y="5556706"/>
+              <a:ext cx="1080000" cy="360000"/>
+            </a:xfrm>
+            <a:prstGeom prst="rtTriangle">
+              <a:avLst/>
+            </a:prstGeom>
+            <a:solidFill>
+              <a:srgbClr val="B4FABC"/>
+            </a:solidFill>
+            <a:ln>
+              <a:noFill/>
+            </a:ln>
+          </p:spPr>
+          <p:style>
+            <a:lnRef idx="2">
+              <a:schemeClr val="accent1">
+                <a:shade val="50000"/>
+              </a:schemeClr>
+            </a:lnRef>
+            <a:fillRef idx="1">
+              <a:schemeClr val="accent1"/>
+            </a:fillRef>
+            <a:effectRef idx="0">
+              <a:schemeClr val="accent1"/>
+            </a:effectRef>
+            <a:fontRef idx="minor">
+              <a:schemeClr val="lt1"/>
+            </a:fontRef>
+          </p:style>
+          <p:txBody>
+            <a:bodyPr rtlCol="0" anchor="ctr"/>
+            <a:lstStyle/>
+            <a:p>
+              <a:pPr algn="ctr"/>
+              <a:endParaRPr lang="ko-KR" altLang="en-US"/>
+            </a:p>
+          </p:txBody>
+        </p:sp>
+      </p:grpSp>
+      <p:grpSp>
+        <p:nvGrpSpPr>
+          <p:cNvPr id="33" name="그룹 32">
+            <a:extLst>
+              <a:ext uri="{FF2B5EF4-FFF2-40B4-BE49-F238E27FC236}">
+                <a16:creationId xmlns:a16="http://schemas.microsoft.com/office/drawing/2014/main" id="{E197C728-CE33-2D9C-B9C1-9C4A7DDEBE6D}"/>
+              </a:ext>
+            </a:extLst>
+          </p:cNvPr>
+          <p:cNvGrpSpPr/>
+          <p:nvPr/>
+        </p:nvGrpSpPr>
+        <p:grpSpPr>
+          <a:xfrm flipH="1" flipV="1">
+            <a:off x="6533019" y="1527720"/>
+            <a:ext cx="3953829" cy="540000"/>
+            <a:chOff x="1065256" y="2693161"/>
+            <a:chExt cx="3953829" cy="540000"/>
+          </a:xfrm>
+        </p:grpSpPr>
+        <p:sp>
+          <p:nvSpPr>
+            <p:cNvPr id="34" name="직사각형 33">
+              <a:extLst>
+                <a:ext uri="{FF2B5EF4-FFF2-40B4-BE49-F238E27FC236}">
+                  <a16:creationId xmlns:a16="http://schemas.microsoft.com/office/drawing/2014/main" id="{FB8155B0-2458-C54C-46BE-714BDE620648}"/>
+                </a:ext>
+              </a:extLst>
+            </p:cNvPr>
+            <p:cNvSpPr/>
+            <p:nvPr/>
+          </p:nvSpPr>
+          <p:spPr>
+            <a:xfrm>
+              <a:off x="1065256" y="2693161"/>
+              <a:ext cx="1080000" cy="180000"/>
+            </a:xfrm>
+            <a:prstGeom prst="rect">
+              <a:avLst/>
+            </a:prstGeom>
+            <a:solidFill>
+              <a:srgbClr val="FFA3A3"/>
+            </a:solidFill>
+            <a:ln>
+              <a:noFill/>
+            </a:ln>
+          </p:spPr>
+          <p:style>
+            <a:lnRef idx="2">
+              <a:schemeClr val="accent1">
+                <a:shade val="50000"/>
+              </a:schemeClr>
+            </a:lnRef>
+            <a:fillRef idx="1">
+              <a:schemeClr val="accent1"/>
+            </a:fillRef>
+            <a:effectRef idx="0">
+              <a:schemeClr val="accent1"/>
+            </a:effectRef>
+            <a:fontRef idx="minor">
+              <a:schemeClr val="lt1"/>
+            </a:fontRef>
+          </p:style>
+          <p:txBody>
+            <a:bodyPr rtlCol="0" anchor="ctr"/>
+            <a:lstStyle/>
+            <a:p>
+              <a:pPr algn="ctr"/>
+              <a:endParaRPr lang="ko-KR" altLang="en-US"/>
+            </a:p>
+          </p:txBody>
+        </p:sp>
+        <p:sp>
+          <p:nvSpPr>
+            <p:cNvPr id="35" name="직각 삼각형 34">
+              <a:extLst>
+                <a:ext uri="{FF2B5EF4-FFF2-40B4-BE49-F238E27FC236}">
+                  <a16:creationId xmlns:a16="http://schemas.microsoft.com/office/drawing/2014/main" id="{30F490FF-BE96-E792-3F88-D42A9F5BEC5B}"/>
+                </a:ext>
+              </a:extLst>
+            </p:cNvPr>
+            <p:cNvSpPr/>
+            <p:nvPr/>
+          </p:nvSpPr>
+          <p:spPr>
+            <a:xfrm flipH="1" flipV="1">
+              <a:off x="1065256" y="2873161"/>
+              <a:ext cx="1080000" cy="360000"/>
+            </a:xfrm>
+            <a:prstGeom prst="rtTriangle">
+              <a:avLst/>
+            </a:prstGeom>
+            <a:solidFill>
+              <a:srgbClr val="FFA3A3"/>
+            </a:solidFill>
+            <a:ln>
+              <a:noFill/>
+            </a:ln>
+          </p:spPr>
+          <p:style>
+            <a:lnRef idx="2">
+              <a:schemeClr val="accent1">
+                <a:shade val="50000"/>
+              </a:schemeClr>
+            </a:lnRef>
+            <a:fillRef idx="1">
+              <a:schemeClr val="accent1"/>
+            </a:fillRef>
+            <a:effectRef idx="0">
+              <a:schemeClr val="accent1"/>
+            </a:effectRef>
+            <a:fontRef idx="minor">
+              <a:schemeClr val="lt1"/>
+            </a:fontRef>
+          </p:style>
+          <p:txBody>
+            <a:bodyPr rtlCol="0" anchor="ctr"/>
+            <a:lstStyle/>
+            <a:p>
+              <a:pPr algn="ctr"/>
+              <a:endParaRPr lang="ko-KR" altLang="en-US"/>
+            </a:p>
+          </p:txBody>
+        </p:sp>
+        <p:sp>
+          <p:nvSpPr>
+            <p:cNvPr id="36" name="직각 삼각형 35">
+              <a:extLst>
+                <a:ext uri="{FF2B5EF4-FFF2-40B4-BE49-F238E27FC236}">
+                  <a16:creationId xmlns:a16="http://schemas.microsoft.com/office/drawing/2014/main" id="{E960FFEA-B1EF-E5C0-AF32-2D347B9B8D5B}"/>
+                </a:ext>
+              </a:extLst>
+            </p:cNvPr>
+            <p:cNvSpPr/>
+            <p:nvPr/>
+          </p:nvSpPr>
+          <p:spPr>
+            <a:xfrm flipV="1">
+              <a:off x="2145256" y="2693161"/>
+              <a:ext cx="1800000" cy="540000"/>
+            </a:xfrm>
+            <a:prstGeom prst="rtTriangle">
+              <a:avLst/>
+            </a:prstGeom>
+            <a:solidFill>
+              <a:srgbClr val="FFA3A3"/>
+            </a:solidFill>
+            <a:ln>
+              <a:noFill/>
+            </a:ln>
+          </p:spPr>
+          <p:style>
+            <a:lnRef idx="2">
+              <a:schemeClr val="accent1">
+                <a:shade val="50000"/>
+              </a:schemeClr>
+            </a:lnRef>
+            <a:fillRef idx="1">
+              <a:schemeClr val="accent1"/>
+            </a:fillRef>
+            <a:effectRef idx="0">
+              <a:schemeClr val="accent1"/>
+            </a:effectRef>
+            <a:fontRef idx="minor">
+              <a:schemeClr val="lt1"/>
+            </a:fontRef>
+          </p:style>
+          <p:txBody>
+            <a:bodyPr rtlCol="0" anchor="ctr"/>
+            <a:lstStyle/>
+            <a:p>
+              <a:pPr algn="ctr"/>
+              <a:endParaRPr lang="ko-KR" altLang="en-US"/>
+            </a:p>
+          </p:txBody>
+        </p:sp>
+        <p:sp>
+          <p:nvSpPr>
+            <p:cNvPr id="37" name="직각 삼각형 36">
+              <a:extLst>
+                <a:ext uri="{FF2B5EF4-FFF2-40B4-BE49-F238E27FC236}">
+                  <a16:creationId xmlns:a16="http://schemas.microsoft.com/office/drawing/2014/main" id="{FEA86B4B-5869-00F2-89DD-2D7F311D13BD}"/>
+                </a:ext>
+              </a:extLst>
+            </p:cNvPr>
+            <p:cNvSpPr/>
+            <p:nvPr/>
+          </p:nvSpPr>
+          <p:spPr>
+            <a:xfrm flipH="1" flipV="1">
+              <a:off x="3939085" y="2693161"/>
+              <a:ext cx="1080000" cy="360000"/>
+            </a:xfrm>
+            <a:prstGeom prst="rtTriangle">
+              <a:avLst/>
+            </a:prstGeom>
+            <a:solidFill>
+              <a:srgbClr val="FFA3A3"/>
+            </a:solidFill>
+            <a:ln>
+              <a:noFill/>
+            </a:ln>
+          </p:spPr>
+          <p:style>
+            <a:lnRef idx="2">
+              <a:schemeClr val="accent1">
+                <a:shade val="50000"/>
+              </a:schemeClr>
+            </a:lnRef>
+            <a:fillRef idx="1">
+              <a:schemeClr val="accent1"/>
+            </a:fillRef>
+            <a:effectRef idx="0">
+              <a:schemeClr val="accent1"/>
+            </a:effectRef>
+            <a:fontRef idx="minor">
+              <a:schemeClr val="lt1"/>
+            </a:fontRef>
+          </p:style>
+          <p:txBody>
+            <a:bodyPr rtlCol="0" anchor="ctr"/>
+            <a:lstStyle/>
+            <a:p>
+              <a:pPr algn="ctr"/>
+              <a:endParaRPr lang="ko-KR" altLang="en-US"/>
+            </a:p>
+          </p:txBody>
+        </p:sp>
+      </p:grpSp>
+      <p:grpSp>
+        <p:nvGrpSpPr>
+          <p:cNvPr id="38" name="그룹 37">
+            <a:extLst>
+              <a:ext uri="{FF2B5EF4-FFF2-40B4-BE49-F238E27FC236}">
+                <a16:creationId xmlns:a16="http://schemas.microsoft.com/office/drawing/2014/main" id="{238C9553-5708-E4D5-CF2A-0CD7CE5D34FE}"/>
+              </a:ext>
+            </a:extLst>
+          </p:cNvPr>
+          <p:cNvGrpSpPr/>
+          <p:nvPr/>
+        </p:nvGrpSpPr>
+        <p:grpSpPr>
+          <a:xfrm flipH="1" flipV="1">
+            <a:off x="6536104" y="2067720"/>
+            <a:ext cx="3953829" cy="540000"/>
+            <a:chOff x="1059085" y="3617676"/>
+            <a:chExt cx="3953829" cy="540000"/>
+          </a:xfrm>
+        </p:grpSpPr>
+        <p:sp>
+          <p:nvSpPr>
+            <p:cNvPr id="39" name="직사각형 38">
+              <a:extLst>
+                <a:ext uri="{FF2B5EF4-FFF2-40B4-BE49-F238E27FC236}">
+                  <a16:creationId xmlns:a16="http://schemas.microsoft.com/office/drawing/2014/main" id="{F3850637-3AF9-E1F9-EFCA-F04278C8565B}"/>
+                </a:ext>
+              </a:extLst>
+            </p:cNvPr>
+            <p:cNvSpPr/>
+            <p:nvPr/>
+          </p:nvSpPr>
+          <p:spPr>
+            <a:xfrm>
+              <a:off x="1059085" y="3617676"/>
+              <a:ext cx="1080000" cy="180000"/>
+            </a:xfrm>
+            <a:prstGeom prst="rect">
+              <a:avLst/>
+            </a:prstGeom>
+            <a:solidFill>
+              <a:srgbClr val="FFFFAB"/>
+            </a:solidFill>
+            <a:ln>
+              <a:noFill/>
+            </a:ln>
+          </p:spPr>
+          <p:style>
+            <a:lnRef idx="2">
+              <a:schemeClr val="accent1">
+                <a:shade val="50000"/>
+              </a:schemeClr>
+            </a:lnRef>
+            <a:fillRef idx="1">
+              <a:schemeClr val="accent1"/>
+            </a:fillRef>
+            <a:effectRef idx="0">
+              <a:schemeClr val="accent1"/>
+            </a:effectRef>
+            <a:fontRef idx="minor">
+              <a:schemeClr val="lt1"/>
+            </a:fontRef>
+          </p:style>
+          <p:txBody>
+            <a:bodyPr rtlCol="0" anchor="ctr"/>
+            <a:lstStyle/>
+            <a:p>
+              <a:pPr algn="ctr"/>
+              <a:endParaRPr lang="ko-KR" altLang="en-US"/>
+            </a:p>
+          </p:txBody>
+        </p:sp>
+        <p:sp>
+          <p:nvSpPr>
+            <p:cNvPr id="40" name="직각 삼각형 39">
+              <a:extLst>
+                <a:ext uri="{FF2B5EF4-FFF2-40B4-BE49-F238E27FC236}">
+                  <a16:creationId xmlns:a16="http://schemas.microsoft.com/office/drawing/2014/main" id="{A3CC5C97-4CAD-903A-1388-FE0B5DC2B1D7}"/>
+                </a:ext>
+              </a:extLst>
+            </p:cNvPr>
+            <p:cNvSpPr/>
+            <p:nvPr/>
+          </p:nvSpPr>
+          <p:spPr>
+            <a:xfrm flipH="1" flipV="1">
+              <a:off x="1059085" y="3797676"/>
+              <a:ext cx="1080000" cy="360000"/>
+            </a:xfrm>
+            <a:prstGeom prst="rtTriangle">
+              <a:avLst/>
+            </a:prstGeom>
+            <a:solidFill>
+              <a:srgbClr val="FFFFAB"/>
+            </a:solidFill>
+            <a:ln>
+              <a:noFill/>
+            </a:ln>
+          </p:spPr>
+          <p:style>
+            <a:lnRef idx="2">
+              <a:schemeClr val="accent1">
+                <a:shade val="50000"/>
+              </a:schemeClr>
+            </a:lnRef>
+            <a:fillRef idx="1">
+              <a:schemeClr val="accent1"/>
+            </a:fillRef>
+            <a:effectRef idx="0">
+              <a:schemeClr val="accent1"/>
+            </a:effectRef>
+            <a:fontRef idx="minor">
+              <a:schemeClr val="lt1"/>
+            </a:fontRef>
+          </p:style>
+          <p:txBody>
+            <a:bodyPr rtlCol="0" anchor="ctr"/>
+            <a:lstStyle/>
+            <a:p>
+              <a:pPr algn="ctr"/>
+              <a:endParaRPr lang="ko-KR" altLang="en-US"/>
+            </a:p>
+          </p:txBody>
+        </p:sp>
+        <p:sp>
+          <p:nvSpPr>
+            <p:cNvPr id="41" name="직각 삼각형 40">
+              <a:extLst>
+                <a:ext uri="{FF2B5EF4-FFF2-40B4-BE49-F238E27FC236}">
+                  <a16:creationId xmlns:a16="http://schemas.microsoft.com/office/drawing/2014/main" id="{E4B784D4-AA7D-6889-54DA-DEF83CBB9898}"/>
+                </a:ext>
+              </a:extLst>
+            </p:cNvPr>
+            <p:cNvSpPr/>
+            <p:nvPr/>
+          </p:nvSpPr>
+          <p:spPr>
+            <a:xfrm flipV="1">
+              <a:off x="2139085" y="3617676"/>
+              <a:ext cx="1800000" cy="540000"/>
+            </a:xfrm>
+            <a:prstGeom prst="rtTriangle">
+              <a:avLst/>
+            </a:prstGeom>
+            <a:solidFill>
+              <a:srgbClr val="FFFFAB"/>
+            </a:solidFill>
+            <a:ln>
+              <a:noFill/>
+            </a:ln>
+          </p:spPr>
+          <p:style>
+            <a:lnRef idx="2">
+              <a:schemeClr val="accent1">
+                <a:shade val="50000"/>
+              </a:schemeClr>
+            </a:lnRef>
+            <a:fillRef idx="1">
+              <a:schemeClr val="accent1"/>
+            </a:fillRef>
+            <a:effectRef idx="0">
+              <a:schemeClr val="accent1"/>
+            </a:effectRef>
+            <a:fontRef idx="minor">
+              <a:schemeClr val="lt1"/>
+            </a:fontRef>
+          </p:style>
+          <p:txBody>
+            <a:bodyPr rtlCol="0" anchor="ctr"/>
+            <a:lstStyle/>
+            <a:p>
+              <a:pPr algn="ctr"/>
+              <a:endParaRPr lang="ko-KR" altLang="en-US"/>
+            </a:p>
+          </p:txBody>
+        </p:sp>
+        <p:sp>
+          <p:nvSpPr>
+            <p:cNvPr id="42" name="직각 삼각형 41">
+              <a:extLst>
+                <a:ext uri="{FF2B5EF4-FFF2-40B4-BE49-F238E27FC236}">
+                  <a16:creationId xmlns:a16="http://schemas.microsoft.com/office/drawing/2014/main" id="{4C6BCE8F-FA27-D9AC-A9A2-60F706D72435}"/>
+                </a:ext>
+              </a:extLst>
+            </p:cNvPr>
+            <p:cNvSpPr/>
+            <p:nvPr/>
+          </p:nvSpPr>
+          <p:spPr>
+            <a:xfrm flipH="1" flipV="1">
+              <a:off x="3932914" y="3617676"/>
+              <a:ext cx="1080000" cy="360000"/>
+            </a:xfrm>
+            <a:prstGeom prst="rtTriangle">
+              <a:avLst/>
+            </a:prstGeom>
+            <a:solidFill>
+              <a:srgbClr val="FFFFAB"/>
+            </a:solidFill>
+            <a:ln>
+              <a:noFill/>
+            </a:ln>
+          </p:spPr>
+          <p:style>
+            <a:lnRef idx="2">
+              <a:schemeClr val="accent1">
+                <a:shade val="50000"/>
+              </a:schemeClr>
+            </a:lnRef>
+            <a:fillRef idx="1">
+              <a:schemeClr val="accent1"/>
+            </a:fillRef>
+            <a:effectRef idx="0">
+              <a:schemeClr val="accent1"/>
+            </a:effectRef>
+            <a:fontRef idx="minor">
+              <a:schemeClr val="lt1"/>
+            </a:fontRef>
+          </p:style>
+          <p:txBody>
+            <a:bodyPr rtlCol="0" anchor="ctr"/>
+            <a:lstStyle/>
+            <a:p>
+              <a:pPr algn="ctr"/>
+              <a:endParaRPr lang="ko-KR" altLang="en-US"/>
+            </a:p>
+          </p:txBody>
+        </p:sp>
+      </p:grpSp>
+      <p:grpSp>
+        <p:nvGrpSpPr>
+          <p:cNvPr id="43" name="그룹 42">
+            <a:extLst>
+              <a:ext uri="{FF2B5EF4-FFF2-40B4-BE49-F238E27FC236}">
+                <a16:creationId xmlns:a16="http://schemas.microsoft.com/office/drawing/2014/main" id="{A60EF3C2-5F4D-47C2-72E5-EFF9485EF8D5}"/>
+              </a:ext>
+            </a:extLst>
+          </p:cNvPr>
+          <p:cNvGrpSpPr/>
+          <p:nvPr/>
+        </p:nvGrpSpPr>
+        <p:grpSpPr>
+          <a:xfrm flipH="1" flipV="1">
+            <a:off x="6533019" y="2607720"/>
+            <a:ext cx="3953829" cy="540000"/>
+            <a:chOff x="1065256" y="4542191"/>
+            <a:chExt cx="3953829" cy="540000"/>
+          </a:xfrm>
+        </p:grpSpPr>
+        <p:sp>
+          <p:nvSpPr>
+            <p:cNvPr id="44" name="직사각형 43">
+              <a:extLst>
+                <a:ext uri="{FF2B5EF4-FFF2-40B4-BE49-F238E27FC236}">
+                  <a16:creationId xmlns:a16="http://schemas.microsoft.com/office/drawing/2014/main" id="{F78B36EC-68EC-1DC3-8B86-97DB620A6E44}"/>
+                </a:ext>
+              </a:extLst>
+            </p:cNvPr>
+            <p:cNvSpPr/>
+            <p:nvPr/>
+          </p:nvSpPr>
+          <p:spPr>
+            <a:xfrm>
+              <a:off x="1065256" y="4542191"/>
+              <a:ext cx="1080000" cy="180000"/>
+            </a:xfrm>
+            <a:prstGeom prst="rect">
+              <a:avLst/>
+            </a:prstGeom>
+            <a:solidFill>
+              <a:srgbClr val="93ADDD"/>
+            </a:solidFill>
+            <a:ln>
+              <a:noFill/>
+            </a:ln>
+          </p:spPr>
+          <p:style>
+            <a:lnRef idx="2">
+              <a:schemeClr val="accent1">
+                <a:shade val="50000"/>
+              </a:schemeClr>
+            </a:lnRef>
+            <a:fillRef idx="1">
+              <a:schemeClr val="accent1"/>
+            </a:fillRef>
+            <a:effectRef idx="0">
+              <a:schemeClr val="accent1"/>
+            </a:effectRef>
+            <a:fontRef idx="minor">
+              <a:schemeClr val="lt1"/>
+            </a:fontRef>
+          </p:style>
+          <p:txBody>
+            <a:bodyPr rtlCol="0" anchor="ctr"/>
+            <a:lstStyle/>
+            <a:p>
+              <a:pPr algn="ctr"/>
+              <a:endParaRPr lang="ko-KR" altLang="en-US"/>
+            </a:p>
+          </p:txBody>
+        </p:sp>
+        <p:sp>
+          <p:nvSpPr>
+            <p:cNvPr id="45" name="직각 삼각형 44">
+              <a:extLst>
+                <a:ext uri="{FF2B5EF4-FFF2-40B4-BE49-F238E27FC236}">
+                  <a16:creationId xmlns:a16="http://schemas.microsoft.com/office/drawing/2014/main" id="{45694E70-476B-D995-4FAF-CB1B4BEEDBCF}"/>
+                </a:ext>
+              </a:extLst>
+            </p:cNvPr>
+            <p:cNvSpPr/>
+            <p:nvPr/>
+          </p:nvSpPr>
+          <p:spPr>
+            <a:xfrm flipH="1" flipV="1">
+              <a:off x="1065256" y="4722191"/>
+              <a:ext cx="1080000" cy="360000"/>
+            </a:xfrm>
+            <a:prstGeom prst="rtTriangle">
+              <a:avLst/>
+            </a:prstGeom>
+            <a:solidFill>
+              <a:srgbClr val="93ADDD"/>
+            </a:solidFill>
+            <a:ln>
+              <a:noFill/>
+            </a:ln>
+          </p:spPr>
+          <p:style>
+            <a:lnRef idx="2">
+              <a:schemeClr val="accent1">
+                <a:shade val="50000"/>
+              </a:schemeClr>
+            </a:lnRef>
+            <a:fillRef idx="1">
+              <a:schemeClr val="accent1"/>
+            </a:fillRef>
+            <a:effectRef idx="0">
+              <a:schemeClr val="accent1"/>
+            </a:effectRef>
+            <a:fontRef idx="minor">
+              <a:schemeClr val="lt1"/>
+            </a:fontRef>
+          </p:style>
+          <p:txBody>
+            <a:bodyPr rtlCol="0" anchor="ctr"/>
+            <a:lstStyle/>
+            <a:p>
+              <a:pPr algn="ctr"/>
+              <a:endParaRPr lang="ko-KR" altLang="en-US"/>
+            </a:p>
+          </p:txBody>
+        </p:sp>
+        <p:sp>
+          <p:nvSpPr>
+            <p:cNvPr id="46" name="직각 삼각형 45">
+              <a:extLst>
+                <a:ext uri="{FF2B5EF4-FFF2-40B4-BE49-F238E27FC236}">
+                  <a16:creationId xmlns:a16="http://schemas.microsoft.com/office/drawing/2014/main" id="{C518FD8B-AEFB-EC6B-344E-A6B8B8AC162C}"/>
+                </a:ext>
+              </a:extLst>
+            </p:cNvPr>
+            <p:cNvSpPr/>
+            <p:nvPr/>
+          </p:nvSpPr>
+          <p:spPr>
+            <a:xfrm flipV="1">
+              <a:off x="2145256" y="4542191"/>
+              <a:ext cx="1800000" cy="540000"/>
+            </a:xfrm>
+            <a:prstGeom prst="rtTriangle">
+              <a:avLst/>
+            </a:prstGeom>
+            <a:solidFill>
+              <a:srgbClr val="93ADDD"/>
+            </a:solidFill>
+            <a:ln>
+              <a:noFill/>
+            </a:ln>
+          </p:spPr>
+          <p:style>
+            <a:lnRef idx="2">
+              <a:schemeClr val="accent1">
+                <a:shade val="50000"/>
+              </a:schemeClr>
+            </a:lnRef>
+            <a:fillRef idx="1">
+              <a:schemeClr val="accent1"/>
+            </a:fillRef>
+            <a:effectRef idx="0">
+              <a:schemeClr val="accent1"/>
+            </a:effectRef>
+            <a:fontRef idx="minor">
+              <a:schemeClr val="lt1"/>
+            </a:fontRef>
+          </p:style>
+          <p:txBody>
+            <a:bodyPr rtlCol="0" anchor="ctr"/>
+            <a:lstStyle/>
+            <a:p>
+              <a:pPr algn="ctr"/>
+              <a:endParaRPr lang="ko-KR" altLang="en-US"/>
+            </a:p>
+          </p:txBody>
+        </p:sp>
+        <p:sp>
+          <p:nvSpPr>
+            <p:cNvPr id="47" name="직각 삼각형 46">
+              <a:extLst>
+                <a:ext uri="{FF2B5EF4-FFF2-40B4-BE49-F238E27FC236}">
+                  <a16:creationId xmlns:a16="http://schemas.microsoft.com/office/drawing/2014/main" id="{12363F01-0D48-9085-4D4E-F7923FC8AFA9}"/>
+                </a:ext>
+              </a:extLst>
+            </p:cNvPr>
+            <p:cNvSpPr/>
+            <p:nvPr/>
+          </p:nvSpPr>
+          <p:spPr>
+            <a:xfrm flipH="1" flipV="1">
+              <a:off x="3939085" y="4542191"/>
+              <a:ext cx="1080000" cy="360000"/>
+            </a:xfrm>
+            <a:prstGeom prst="rtTriangle">
+              <a:avLst/>
+            </a:prstGeom>
+            <a:solidFill>
+              <a:srgbClr val="93ADDD"/>
+            </a:solidFill>
+            <a:ln>
+              <a:noFill/>
+            </a:ln>
+          </p:spPr>
+          <p:style>
+            <a:lnRef idx="2">
+              <a:schemeClr val="accent1">
+                <a:shade val="50000"/>
+              </a:schemeClr>
+            </a:lnRef>
+            <a:fillRef idx="1">
+              <a:schemeClr val="accent1"/>
+            </a:fillRef>
+            <a:effectRef idx="0">
+              <a:schemeClr val="accent1"/>
+            </a:effectRef>
+            <a:fontRef idx="minor">
+              <a:schemeClr val="lt1"/>
+            </a:fontRef>
+          </p:style>
+          <p:txBody>
+            <a:bodyPr rtlCol="0" anchor="ctr"/>
+            <a:lstStyle/>
+            <a:p>
+              <a:pPr algn="ctr"/>
+              <a:endParaRPr lang="ko-KR" altLang="en-US"/>
+            </a:p>
+          </p:txBody>
+        </p:sp>
+      </p:grpSp>
+      <p:grpSp>
+        <p:nvGrpSpPr>
+          <p:cNvPr id="48" name="그룹 47">
+            <a:extLst>
+              <a:ext uri="{FF2B5EF4-FFF2-40B4-BE49-F238E27FC236}">
+                <a16:creationId xmlns:a16="http://schemas.microsoft.com/office/drawing/2014/main" id="{0CE65A91-ACC1-8DFC-544A-A192DF5B30F3}"/>
+              </a:ext>
+            </a:extLst>
+          </p:cNvPr>
+          <p:cNvGrpSpPr/>
+          <p:nvPr/>
+        </p:nvGrpSpPr>
+        <p:grpSpPr>
+          <a:xfrm flipH="1" flipV="1">
+            <a:off x="6536104" y="3147720"/>
+            <a:ext cx="3953829" cy="540000"/>
+            <a:chOff x="1059085" y="5556706"/>
+            <a:chExt cx="3953829" cy="540000"/>
+          </a:xfrm>
+        </p:grpSpPr>
+        <p:sp>
+          <p:nvSpPr>
+            <p:cNvPr id="49" name="직사각형 48">
+              <a:extLst>
+                <a:ext uri="{FF2B5EF4-FFF2-40B4-BE49-F238E27FC236}">
+                  <a16:creationId xmlns:a16="http://schemas.microsoft.com/office/drawing/2014/main" id="{E6C37E77-7A7F-2E50-D5AB-88261645D48C}"/>
+                </a:ext>
+              </a:extLst>
+            </p:cNvPr>
+            <p:cNvSpPr/>
+            <p:nvPr/>
+          </p:nvSpPr>
+          <p:spPr>
+            <a:xfrm>
+              <a:off x="1059085" y="5556706"/>
+              <a:ext cx="1080000" cy="180000"/>
+            </a:xfrm>
+            <a:prstGeom prst="rect">
+              <a:avLst/>
+            </a:prstGeom>
+            <a:solidFill>
+              <a:srgbClr val="B4FABC"/>
+            </a:solidFill>
+            <a:ln>
+              <a:noFill/>
+            </a:ln>
+          </p:spPr>
+          <p:style>
+            <a:lnRef idx="2">
+              <a:schemeClr val="accent1">
+                <a:shade val="50000"/>
+              </a:schemeClr>
+            </a:lnRef>
+            <a:fillRef idx="1">
+              <a:schemeClr val="accent1"/>
+            </a:fillRef>
+            <a:effectRef idx="0">
+              <a:schemeClr val="accent1"/>
+            </a:effectRef>
+            <a:fontRef idx="minor">
+              <a:schemeClr val="lt1"/>
+            </a:fontRef>
+          </p:style>
+          <p:txBody>
+            <a:bodyPr rtlCol="0" anchor="ctr"/>
+            <a:lstStyle/>
+            <a:p>
+              <a:pPr algn="ctr"/>
+              <a:endParaRPr lang="ko-KR" altLang="en-US"/>
+            </a:p>
+          </p:txBody>
+        </p:sp>
+        <p:sp>
+          <p:nvSpPr>
+            <p:cNvPr id="50" name="직각 삼각형 49">
+              <a:extLst>
+                <a:ext uri="{FF2B5EF4-FFF2-40B4-BE49-F238E27FC236}">
+                  <a16:creationId xmlns:a16="http://schemas.microsoft.com/office/drawing/2014/main" id="{F6577C21-4A60-7BB8-1A0D-57E7BE940EA2}"/>
+                </a:ext>
+              </a:extLst>
+            </p:cNvPr>
+            <p:cNvSpPr/>
+            <p:nvPr/>
+          </p:nvSpPr>
+          <p:spPr>
+            <a:xfrm flipH="1" flipV="1">
+              <a:off x="1059085" y="5736706"/>
+              <a:ext cx="1080000" cy="360000"/>
+            </a:xfrm>
+            <a:prstGeom prst="rtTriangle">
+              <a:avLst/>
+            </a:prstGeom>
+            <a:solidFill>
+              <a:srgbClr val="B4FABC"/>
+            </a:solidFill>
+            <a:ln>
+              <a:noFill/>
+            </a:ln>
+          </p:spPr>
+          <p:style>
+            <a:lnRef idx="2">
+              <a:schemeClr val="accent1">
+                <a:shade val="50000"/>
+              </a:schemeClr>
+            </a:lnRef>
+            <a:fillRef idx="1">
+              <a:schemeClr val="accent1"/>
+            </a:fillRef>
+            <a:effectRef idx="0">
+              <a:schemeClr val="accent1"/>
+            </a:effectRef>
+            <a:fontRef idx="minor">
+              <a:schemeClr val="lt1"/>
+            </a:fontRef>
+          </p:style>
+          <p:txBody>
+            <a:bodyPr rtlCol="0" anchor="ctr"/>
+            <a:lstStyle/>
+            <a:p>
+              <a:pPr algn="ctr"/>
+              <a:endParaRPr lang="ko-KR" altLang="en-US"/>
+            </a:p>
+          </p:txBody>
+        </p:sp>
+        <p:sp>
+          <p:nvSpPr>
+            <p:cNvPr id="51" name="직각 삼각형 50">
+              <a:extLst>
+                <a:ext uri="{FF2B5EF4-FFF2-40B4-BE49-F238E27FC236}">
+                  <a16:creationId xmlns:a16="http://schemas.microsoft.com/office/drawing/2014/main" id="{90686DC8-43D7-7C7A-60B1-F497E098F02B}"/>
+                </a:ext>
+              </a:extLst>
+            </p:cNvPr>
+            <p:cNvSpPr/>
+            <p:nvPr/>
+          </p:nvSpPr>
+          <p:spPr>
+            <a:xfrm flipV="1">
+              <a:off x="2139085" y="5556706"/>
+              <a:ext cx="1800000" cy="540000"/>
+            </a:xfrm>
+            <a:prstGeom prst="rtTriangle">
+              <a:avLst/>
+            </a:prstGeom>
+            <a:solidFill>
+              <a:srgbClr val="B4FABC"/>
+            </a:solidFill>
+            <a:ln>
+              <a:noFill/>
+            </a:ln>
+          </p:spPr>
+          <p:style>
+            <a:lnRef idx="2">
+              <a:schemeClr val="accent1">
+                <a:shade val="50000"/>
+              </a:schemeClr>
+            </a:lnRef>
+            <a:fillRef idx="1">
+              <a:schemeClr val="accent1"/>
+            </a:fillRef>
+            <a:effectRef idx="0">
+              <a:schemeClr val="accent1"/>
+            </a:effectRef>
+            <a:fontRef idx="minor">
+              <a:schemeClr val="lt1"/>
+            </a:fontRef>
+          </p:style>
+          <p:txBody>
+            <a:bodyPr rtlCol="0" anchor="ctr"/>
+            <a:lstStyle/>
+            <a:p>
+              <a:pPr algn="ctr"/>
+              <a:endParaRPr lang="ko-KR" altLang="en-US"/>
+            </a:p>
+          </p:txBody>
+        </p:sp>
+        <p:sp>
+          <p:nvSpPr>
+            <p:cNvPr id="52" name="직각 삼각형 51">
+              <a:extLst>
+                <a:ext uri="{FF2B5EF4-FFF2-40B4-BE49-F238E27FC236}">
+                  <a16:creationId xmlns:a16="http://schemas.microsoft.com/office/drawing/2014/main" id="{A542051F-7A7C-CFE2-A961-16609AFFDB9E}"/>
+                </a:ext>
+              </a:extLst>
+            </p:cNvPr>
+            <p:cNvSpPr/>
+            <p:nvPr/>
+          </p:nvSpPr>
+          <p:spPr>
+            <a:xfrm flipH="1" flipV="1">
+              <a:off x="3932914" y="5556706"/>
+              <a:ext cx="1080000" cy="360000"/>
+            </a:xfrm>
+            <a:prstGeom prst="rtTriangle">
+              <a:avLst/>
+            </a:prstGeom>
+            <a:solidFill>
+              <a:srgbClr val="B4FABC"/>
+            </a:solidFill>
+            <a:ln>
+              <a:noFill/>
+            </a:ln>
+          </p:spPr>
+          <p:style>
+            <a:lnRef idx="2">
+              <a:schemeClr val="accent1">
+                <a:shade val="50000"/>
+              </a:schemeClr>
+            </a:lnRef>
+            <a:fillRef idx="1">
+              <a:schemeClr val="accent1"/>
+            </a:fillRef>
+            <a:effectRef idx="0">
+              <a:schemeClr val="accent1"/>
+            </a:effectRef>
+            <a:fontRef idx="minor">
+              <a:schemeClr val="lt1"/>
+            </a:fontRef>
+          </p:style>
+          <p:txBody>
+            <a:bodyPr rtlCol="0" anchor="ctr"/>
+            <a:lstStyle/>
+            <a:p>
+              <a:pPr algn="ctr"/>
+              <a:endParaRPr lang="ko-KR" altLang="en-US"/>
+            </a:p>
+          </p:txBody>
+        </p:sp>
+      </p:grpSp>
+      <p:sp>
+        <p:nvSpPr>
+          <p:cNvPr id="14" name="직사각형 13">
+            <a:extLst>
+              <a:ext uri="{FF2B5EF4-FFF2-40B4-BE49-F238E27FC236}">
+                <a16:creationId xmlns:a16="http://schemas.microsoft.com/office/drawing/2014/main" id="{CE380583-4815-BA67-167B-8FF08E82EFD1}"/>
+              </a:ext>
+            </a:extLst>
+          </p:cNvPr>
+          <p:cNvSpPr/>
+          <p:nvPr/>
+        </p:nvSpPr>
+        <p:spPr>
+          <a:xfrm>
+            <a:off x="5015998" y="4915949"/>
+            <a:ext cx="1080000" cy="1080000"/>
+          </a:xfrm>
+          <a:prstGeom prst="rect">
+            <a:avLst/>
+          </a:prstGeom>
+          <a:solidFill>
+            <a:srgbClr val="B4FABC"/>
+          </a:solidFill>
+          <a:ln>
+            <a:noFill/>
+          </a:ln>
+        </p:spPr>
+        <p:style>
+          <a:lnRef idx="2">
+            <a:schemeClr val="accent1">
+              <a:shade val="50000"/>
+            </a:schemeClr>
+          </a:lnRef>
+          <a:fillRef idx="1">
+            <a:schemeClr val="accent1"/>
+          </a:fillRef>
+          <a:effectRef idx="0">
+            <a:schemeClr val="accent1"/>
+          </a:effectRef>
+          <a:fontRef idx="minor">
+            <a:schemeClr val="lt1"/>
+          </a:fontRef>
+        </p:style>
+        <p:txBody>
+          <a:bodyPr rtlCol="0" anchor="ctr"/>
+          <a:lstStyle/>
+          <a:p>
+            <a:pPr algn="ctr"/>
+            <a:endParaRPr lang="ko-KR" altLang="en-US"/>
+          </a:p>
+        </p:txBody>
+      </p:sp>
     </p:spTree>
     <p:extLst>
       <p:ext uri="{BB962C8B-B14F-4D97-AF65-F5344CB8AC3E}">
@@ -4708,235 +6821,6 @@
           <a:chExt cx="0" cy="0"/>
         </a:xfrm>
       </p:grpSpPr>
-      <p:grpSp>
-        <p:nvGrpSpPr>
-          <p:cNvPr id="2" name="그룹 1">
-            <a:extLst>
-              <a:ext uri="{FF2B5EF4-FFF2-40B4-BE49-F238E27FC236}">
-                <a16:creationId xmlns:a16="http://schemas.microsoft.com/office/drawing/2014/main" id="{B6B06CED-8974-F029-C89C-1C0AD88893C7}"/>
-              </a:ext>
-            </a:extLst>
-          </p:cNvPr>
-          <p:cNvGrpSpPr/>
-          <p:nvPr/>
-        </p:nvGrpSpPr>
-        <p:grpSpPr>
-          <a:xfrm>
-            <a:off x="4119085" y="3159000"/>
-            <a:ext cx="3953829" cy="540000"/>
-            <a:chOff x="4119085" y="3159000"/>
-            <a:chExt cx="3953829" cy="540000"/>
-          </a:xfrm>
-        </p:grpSpPr>
-        <p:sp>
-          <p:nvSpPr>
-            <p:cNvPr id="5" name="직사각형 4">
-              <a:extLst>
-                <a:ext uri="{FF2B5EF4-FFF2-40B4-BE49-F238E27FC236}">
-                  <a16:creationId xmlns:a16="http://schemas.microsoft.com/office/drawing/2014/main" id="{BC4213A2-80E4-1BEB-5814-DD72022B996A}"/>
-                </a:ext>
-              </a:extLst>
-            </p:cNvPr>
-            <p:cNvSpPr/>
-            <p:nvPr/>
-          </p:nvSpPr>
-          <p:spPr>
-            <a:xfrm>
-              <a:off x="4119085" y="3159000"/>
-              <a:ext cx="1080000" cy="180000"/>
-            </a:xfrm>
-            <a:prstGeom prst="rect">
-              <a:avLst/>
-            </a:prstGeom>
-            <a:solidFill>
-              <a:srgbClr val="33A474"/>
-            </a:solidFill>
-            <a:ln>
-              <a:noFill/>
-            </a:ln>
-          </p:spPr>
-          <p:style>
-            <a:lnRef idx="2">
-              <a:schemeClr val="accent1">
-                <a:shade val="50000"/>
-              </a:schemeClr>
-            </a:lnRef>
-            <a:fillRef idx="1">
-              <a:schemeClr val="accent1"/>
-            </a:fillRef>
-            <a:effectRef idx="0">
-              <a:schemeClr val="accent1"/>
-            </a:effectRef>
-            <a:fontRef idx="minor">
-              <a:schemeClr val="lt1"/>
-            </a:fontRef>
-          </p:style>
-          <p:txBody>
-            <a:bodyPr rtlCol="0" anchor="ctr"/>
-            <a:lstStyle/>
-            <a:p>
-              <a:pPr algn="ctr"/>
-              <a:endParaRPr lang="ko-KR" altLang="en-US"/>
-            </a:p>
-          </p:txBody>
-        </p:sp>
-        <p:sp>
-          <p:nvSpPr>
-            <p:cNvPr id="6" name="직각 삼각형 5">
-              <a:extLst>
-                <a:ext uri="{FF2B5EF4-FFF2-40B4-BE49-F238E27FC236}">
-                  <a16:creationId xmlns:a16="http://schemas.microsoft.com/office/drawing/2014/main" id="{AEFF04EA-5A0D-359F-D017-F182AB175947}"/>
-                </a:ext>
-              </a:extLst>
-            </p:cNvPr>
-            <p:cNvSpPr/>
-            <p:nvPr/>
-          </p:nvSpPr>
-          <p:spPr>
-            <a:xfrm flipH="1" flipV="1">
-              <a:off x="4119085" y="3339000"/>
-              <a:ext cx="1080000" cy="360000"/>
-            </a:xfrm>
-            <a:prstGeom prst="rtTriangle">
-              <a:avLst/>
-            </a:prstGeom>
-            <a:solidFill>
-              <a:srgbClr val="33A474"/>
-            </a:solidFill>
-            <a:ln>
-              <a:noFill/>
-            </a:ln>
-          </p:spPr>
-          <p:style>
-            <a:lnRef idx="2">
-              <a:schemeClr val="accent1">
-                <a:shade val="50000"/>
-              </a:schemeClr>
-            </a:lnRef>
-            <a:fillRef idx="1">
-              <a:schemeClr val="accent1"/>
-            </a:fillRef>
-            <a:effectRef idx="0">
-              <a:schemeClr val="accent1"/>
-            </a:effectRef>
-            <a:fontRef idx="minor">
-              <a:schemeClr val="lt1"/>
-            </a:fontRef>
-          </p:style>
-          <p:txBody>
-            <a:bodyPr rtlCol="0" anchor="ctr"/>
-            <a:lstStyle/>
-            <a:p>
-              <a:pPr algn="ctr"/>
-              <a:endParaRPr lang="ko-KR" altLang="en-US"/>
-            </a:p>
-          </p:txBody>
-        </p:sp>
-        <p:sp>
-          <p:nvSpPr>
-            <p:cNvPr id="7" name="직각 삼각형 6">
-              <a:extLst>
-                <a:ext uri="{FF2B5EF4-FFF2-40B4-BE49-F238E27FC236}">
-                  <a16:creationId xmlns:a16="http://schemas.microsoft.com/office/drawing/2014/main" id="{55613B94-F7B3-EFEC-1437-C3331EEDEB6F}"/>
-                </a:ext>
-              </a:extLst>
-            </p:cNvPr>
-            <p:cNvSpPr/>
-            <p:nvPr/>
-          </p:nvSpPr>
-          <p:spPr>
-            <a:xfrm flipV="1">
-              <a:off x="5199085" y="3159000"/>
-              <a:ext cx="1800000" cy="540000"/>
-            </a:xfrm>
-            <a:prstGeom prst="rtTriangle">
-              <a:avLst/>
-            </a:prstGeom>
-            <a:solidFill>
-              <a:srgbClr val="33A474"/>
-            </a:solidFill>
-            <a:ln>
-              <a:noFill/>
-            </a:ln>
-          </p:spPr>
-          <p:style>
-            <a:lnRef idx="2">
-              <a:schemeClr val="accent1">
-                <a:shade val="50000"/>
-              </a:schemeClr>
-            </a:lnRef>
-            <a:fillRef idx="1">
-              <a:schemeClr val="accent1"/>
-            </a:fillRef>
-            <a:effectRef idx="0">
-              <a:schemeClr val="accent1"/>
-            </a:effectRef>
-            <a:fontRef idx="minor">
-              <a:schemeClr val="lt1"/>
-            </a:fontRef>
-          </p:style>
-          <p:txBody>
-            <a:bodyPr rtlCol="0" anchor="ctr"/>
-            <a:lstStyle/>
-            <a:p>
-              <a:pPr algn="ctr"/>
-              <a:endParaRPr lang="ko-KR" altLang="en-US"/>
-            </a:p>
-          </p:txBody>
-        </p:sp>
-        <p:sp>
-          <p:nvSpPr>
-            <p:cNvPr id="8" name="직각 삼각형 7">
-              <a:extLst>
-                <a:ext uri="{FF2B5EF4-FFF2-40B4-BE49-F238E27FC236}">
-                  <a16:creationId xmlns:a16="http://schemas.microsoft.com/office/drawing/2014/main" id="{79B6E5CF-6DCC-6E1C-436F-6A98B70ECAB2}"/>
-                </a:ext>
-              </a:extLst>
-            </p:cNvPr>
-            <p:cNvSpPr/>
-            <p:nvPr/>
-          </p:nvSpPr>
-          <p:spPr>
-            <a:xfrm flipH="1" flipV="1">
-              <a:off x="6992914" y="3159000"/>
-              <a:ext cx="1080000" cy="360000"/>
-            </a:xfrm>
-            <a:prstGeom prst="rtTriangle">
-              <a:avLst/>
-            </a:prstGeom>
-            <a:solidFill>
-              <a:srgbClr val="33A474"/>
-            </a:solidFill>
-            <a:ln>
-              <a:noFill/>
-            </a:ln>
-          </p:spPr>
-          <p:style>
-            <a:lnRef idx="2">
-              <a:schemeClr val="accent1">
-                <a:shade val="50000"/>
-              </a:schemeClr>
-            </a:lnRef>
-            <a:fillRef idx="1">
-              <a:schemeClr val="accent1"/>
-            </a:fillRef>
-            <a:effectRef idx="0">
-              <a:schemeClr val="accent1"/>
-            </a:effectRef>
-            <a:fontRef idx="minor">
-              <a:schemeClr val="lt1"/>
-            </a:fontRef>
-          </p:style>
-          <p:txBody>
-            <a:bodyPr rtlCol="0" anchor="ctr"/>
-            <a:lstStyle/>
-            <a:p>
-              <a:pPr algn="ctr"/>
-              <a:endParaRPr lang="ko-KR" altLang="en-US"/>
-            </a:p>
-          </p:txBody>
-        </p:sp>
-      </p:grpSp>
     </p:spTree>
     <p:extLst>
       <p:ext uri="{BB962C8B-B14F-4D97-AF65-F5344CB8AC3E}">

</xml_diff>

<commit_message>
[DISC-7] Result 컴포넌트 개발 9
</commit_message>
<xml_diff>
--- a/src/img/IMG.pptx
+++ b/src/img/IMG.pptx
@@ -7,12 +7,14 @@
   <p:sldIdLst>
     <p:sldId id="256" r:id="rId2"/>
     <p:sldId id="257" r:id="rId3"/>
-    <p:sldId id="258" r:id="rId4"/>
-    <p:sldId id="260" r:id="rId5"/>
-    <p:sldId id="262" r:id="rId6"/>
-    <p:sldId id="263" r:id="rId7"/>
-    <p:sldId id="264" r:id="rId8"/>
-    <p:sldId id="265" r:id="rId9"/>
+    <p:sldId id="267" r:id="rId4"/>
+    <p:sldId id="269" r:id="rId5"/>
+    <p:sldId id="268" r:id="rId6"/>
+    <p:sldId id="266" r:id="rId7"/>
+    <p:sldId id="258" r:id="rId8"/>
+    <p:sldId id="262" r:id="rId9"/>
+    <p:sldId id="263" r:id="rId10"/>
+    <p:sldId id="264" r:id="rId11"/>
   </p:sldIdLst>
   <p:sldSz cx="12192000" cy="6858000"/>
   <p:notesSz cx="6858000" cy="9144000"/>
@@ -266,7 +268,7 @@
           <a:p>
             <a:fld id="{74529166-E523-47B8-A70B-56CC3122A1F0}" type="datetimeFigureOut">
               <a:rPr lang="ko-KR" altLang="en-US" smtClean="0"/>
-              <a:t>2022-08-07</a:t>
+              <a:t>2022-08-09</a:t>
             </a:fld>
             <a:endParaRPr lang="ko-KR" altLang="en-US"/>
           </a:p>
@@ -464,7 +466,7 @@
           <a:p>
             <a:fld id="{74529166-E523-47B8-A70B-56CC3122A1F0}" type="datetimeFigureOut">
               <a:rPr lang="ko-KR" altLang="en-US" smtClean="0"/>
-              <a:t>2022-08-07</a:t>
+              <a:t>2022-08-09</a:t>
             </a:fld>
             <a:endParaRPr lang="ko-KR" altLang="en-US"/>
           </a:p>
@@ -672,7 +674,7 @@
           <a:p>
             <a:fld id="{74529166-E523-47B8-A70B-56CC3122A1F0}" type="datetimeFigureOut">
               <a:rPr lang="ko-KR" altLang="en-US" smtClean="0"/>
-              <a:t>2022-08-07</a:t>
+              <a:t>2022-08-09</a:t>
             </a:fld>
             <a:endParaRPr lang="ko-KR" altLang="en-US"/>
           </a:p>
@@ -870,7 +872,7 @@
           <a:p>
             <a:fld id="{74529166-E523-47B8-A70B-56CC3122A1F0}" type="datetimeFigureOut">
               <a:rPr lang="ko-KR" altLang="en-US" smtClean="0"/>
-              <a:t>2022-08-07</a:t>
+              <a:t>2022-08-09</a:t>
             </a:fld>
             <a:endParaRPr lang="ko-KR" altLang="en-US"/>
           </a:p>
@@ -1145,7 +1147,7 @@
           <a:p>
             <a:fld id="{74529166-E523-47B8-A70B-56CC3122A1F0}" type="datetimeFigureOut">
               <a:rPr lang="ko-KR" altLang="en-US" smtClean="0"/>
-              <a:t>2022-08-07</a:t>
+              <a:t>2022-08-09</a:t>
             </a:fld>
             <a:endParaRPr lang="ko-KR" altLang="en-US"/>
           </a:p>
@@ -1410,7 +1412,7 @@
           <a:p>
             <a:fld id="{74529166-E523-47B8-A70B-56CC3122A1F0}" type="datetimeFigureOut">
               <a:rPr lang="ko-KR" altLang="en-US" smtClean="0"/>
-              <a:t>2022-08-07</a:t>
+              <a:t>2022-08-09</a:t>
             </a:fld>
             <a:endParaRPr lang="ko-KR" altLang="en-US"/>
           </a:p>
@@ -1822,7 +1824,7 @@
           <a:p>
             <a:fld id="{74529166-E523-47B8-A70B-56CC3122A1F0}" type="datetimeFigureOut">
               <a:rPr lang="ko-KR" altLang="en-US" smtClean="0"/>
-              <a:t>2022-08-07</a:t>
+              <a:t>2022-08-09</a:t>
             </a:fld>
             <a:endParaRPr lang="ko-KR" altLang="en-US"/>
           </a:p>
@@ -1963,7 +1965,7 @@
           <a:p>
             <a:fld id="{74529166-E523-47B8-A70B-56CC3122A1F0}" type="datetimeFigureOut">
               <a:rPr lang="ko-KR" altLang="en-US" smtClean="0"/>
-              <a:t>2022-08-07</a:t>
+              <a:t>2022-08-09</a:t>
             </a:fld>
             <a:endParaRPr lang="ko-KR" altLang="en-US"/>
           </a:p>
@@ -2076,7 +2078,7 @@
           <a:p>
             <a:fld id="{74529166-E523-47B8-A70B-56CC3122A1F0}" type="datetimeFigureOut">
               <a:rPr lang="ko-KR" altLang="en-US" smtClean="0"/>
-              <a:t>2022-08-07</a:t>
+              <a:t>2022-08-09</a:t>
             </a:fld>
             <a:endParaRPr lang="ko-KR" altLang="en-US"/>
           </a:p>
@@ -2387,7 +2389,7 @@
           <a:p>
             <a:fld id="{74529166-E523-47B8-A70B-56CC3122A1F0}" type="datetimeFigureOut">
               <a:rPr lang="ko-KR" altLang="en-US" smtClean="0"/>
-              <a:t>2022-08-07</a:t>
+              <a:t>2022-08-09</a:t>
             </a:fld>
             <a:endParaRPr lang="ko-KR" altLang="en-US"/>
           </a:p>
@@ -2675,7 +2677,7 @@
           <a:p>
             <a:fld id="{74529166-E523-47B8-A70B-56CC3122A1F0}" type="datetimeFigureOut">
               <a:rPr lang="ko-KR" altLang="en-US" smtClean="0"/>
-              <a:t>2022-08-07</a:t>
+              <a:t>2022-08-09</a:t>
             </a:fld>
             <a:endParaRPr lang="ko-KR" altLang="en-US"/>
           </a:p>
@@ -2916,7 +2918,7 @@
           <a:p>
             <a:fld id="{74529166-E523-47B8-A70B-56CC3122A1F0}" type="datetimeFigureOut">
               <a:rPr lang="ko-KR" altLang="en-US" smtClean="0"/>
-              <a:t>2022-08-07</a:t>
+              <a:t>2022-08-09</a:t>
             </a:fld>
             <a:endParaRPr lang="ko-KR" altLang="en-US"/>
           </a:p>
@@ -3795,8 +3797,8 @@
         </p:nvSpPr>
         <p:spPr>
           <a:xfrm>
-            <a:off x="5034651" y="1757133"/>
-            <a:ext cx="2122697" cy="584775"/>
+            <a:off x="5736837" y="1944225"/>
+            <a:ext cx="1273105" cy="584775"/>
           </a:xfrm>
           <a:prstGeom prst="rect">
             <a:avLst/>
@@ -3817,11 +3819,11 @@
           <a:lstStyle/>
           <a:p>
             <a:r>
-              <a:rPr lang="en-US" altLang="ko-KR" sz="3200" b="1" dirty="0" err="1">
+              <a:rPr lang="en-US" altLang="ko-KR" sz="3200" b="1" dirty="0">
                 <a:latin typeface="Calibri" panose="020F0502020204030204" pitchFamily="34" charset="0"/>
                 <a:cs typeface="Calibri" panose="020F0502020204030204" pitchFamily="34" charset="0"/>
               </a:rPr>
-              <a:t>Dominence</a:t>
+              <a:t>Calibri</a:t>
             </a:r>
             <a:endParaRPr lang="ko-KR" altLang="en-US" sz="3200" b="1" dirty="0">
               <a:latin typeface="Calibri" panose="020F0502020204030204" pitchFamily="34" charset="0"/>
@@ -3834,6 +3836,140 @@
     <p:extLst>
       <p:ext uri="{BB962C8B-B14F-4D97-AF65-F5344CB8AC3E}">
         <p14:creationId xmlns:p14="http://schemas.microsoft.com/office/powerpoint/2010/main" val="1394180228"/>
+      </p:ext>
+    </p:extLst>
+  </p:cSld>
+  <p:clrMapOvr>
+    <a:masterClrMapping/>
+  </p:clrMapOvr>
+</p:sld>
+</file>
+
+<file path=ppt/slides/slide10.xml><?xml version="1.0" encoding="utf-8"?>
+<p:sld xmlns:a="http://schemas.openxmlformats.org/drawingml/2006/main" xmlns:r="http://schemas.openxmlformats.org/officeDocument/2006/relationships" xmlns:p="http://schemas.openxmlformats.org/presentationml/2006/main">
+  <p:cSld>
+    <p:spTree>
+      <p:nvGrpSpPr>
+        <p:cNvPr id="1" name=""/>
+        <p:cNvGrpSpPr/>
+        <p:nvPr/>
+      </p:nvGrpSpPr>
+      <p:grpSpPr>
+        <a:xfrm>
+          <a:off x="0" y="0"/>
+          <a:ext cx="0" cy="0"/>
+          <a:chOff x="0" y="0"/>
+          <a:chExt cx="0" cy="0"/>
+        </a:xfrm>
+      </p:grpSpPr>
+      <p:sp>
+        <p:nvSpPr>
+          <p:cNvPr id="4" name="직사각형 3">
+            <a:extLst>
+              <a:ext uri="{FF2B5EF4-FFF2-40B4-BE49-F238E27FC236}">
+                <a16:creationId xmlns:a16="http://schemas.microsoft.com/office/drawing/2014/main" id="{CE0FEEE6-14D9-6D92-051A-47C632FCBD58}"/>
+              </a:ext>
+            </a:extLst>
+          </p:cNvPr>
+          <p:cNvSpPr/>
+          <p:nvPr/>
+        </p:nvSpPr>
+        <p:spPr>
+          <a:xfrm>
+            <a:off x="4631094" y="2687215"/>
+            <a:ext cx="1464906" cy="1483567"/>
+          </a:xfrm>
+          <a:prstGeom prst="rect">
+            <a:avLst/>
+          </a:prstGeom>
+          <a:solidFill>
+            <a:srgbClr val="F2F9F2"/>
+          </a:solidFill>
+          <a:ln>
+            <a:noFill/>
+          </a:ln>
+        </p:spPr>
+        <p:style>
+          <a:lnRef idx="2">
+            <a:schemeClr val="accent1">
+              <a:shade val="50000"/>
+            </a:schemeClr>
+          </a:lnRef>
+          <a:fillRef idx="1">
+            <a:schemeClr val="accent1"/>
+          </a:fillRef>
+          <a:effectRef idx="0">
+            <a:schemeClr val="accent1"/>
+          </a:effectRef>
+          <a:fontRef idx="minor">
+            <a:schemeClr val="lt1"/>
+          </a:fontRef>
+        </p:style>
+        <p:txBody>
+          <a:bodyPr rtlCol="0" anchor="ctr"/>
+          <a:lstStyle/>
+          <a:p>
+            <a:pPr algn="ctr"/>
+            <a:endParaRPr lang="ko-KR" altLang="en-US"/>
+          </a:p>
+        </p:txBody>
+      </p:sp>
+      <p:sp>
+        <p:nvSpPr>
+          <p:cNvPr id="5" name="직사각형 4">
+            <a:extLst>
+              <a:ext uri="{FF2B5EF4-FFF2-40B4-BE49-F238E27FC236}">
+                <a16:creationId xmlns:a16="http://schemas.microsoft.com/office/drawing/2014/main" id="{B815DEB8-8505-1640-E923-19E982D8A4F7}"/>
+              </a:ext>
+            </a:extLst>
+          </p:cNvPr>
+          <p:cNvSpPr/>
+          <p:nvPr/>
+        </p:nvSpPr>
+        <p:spPr>
+          <a:xfrm>
+            <a:off x="6096000" y="2687216"/>
+            <a:ext cx="1464906" cy="1483567"/>
+          </a:xfrm>
+          <a:prstGeom prst="rect">
+            <a:avLst/>
+          </a:prstGeom>
+          <a:solidFill>
+            <a:srgbClr val="F2DEDE"/>
+          </a:solidFill>
+          <a:ln>
+            <a:noFill/>
+          </a:ln>
+        </p:spPr>
+        <p:style>
+          <a:lnRef idx="2">
+            <a:schemeClr val="accent1">
+              <a:shade val="50000"/>
+            </a:schemeClr>
+          </a:lnRef>
+          <a:fillRef idx="1">
+            <a:schemeClr val="accent1"/>
+          </a:fillRef>
+          <a:effectRef idx="0">
+            <a:schemeClr val="accent1"/>
+          </a:effectRef>
+          <a:fontRef idx="minor">
+            <a:schemeClr val="lt1"/>
+          </a:fontRef>
+        </p:style>
+        <p:txBody>
+          <a:bodyPr rtlCol="0" anchor="ctr"/>
+          <a:lstStyle/>
+          <a:p>
+            <a:pPr algn="ctr"/>
+            <a:endParaRPr lang="ko-KR" altLang="en-US"/>
+          </a:p>
+        </p:txBody>
+      </p:sp>
+    </p:spTree>
+    <p:extLst>
+      <p:ext uri="{BB962C8B-B14F-4D97-AF65-F5344CB8AC3E}">
+        <p14:creationId xmlns:p14="http://schemas.microsoft.com/office/powerpoint/2010/main" val="1951826797"/>
       </p:ext>
     </p:extLst>
   </p:cSld>
@@ -3860,565 +3996,214 @@
           <a:chExt cx="0" cy="0"/>
         </a:xfrm>
       </p:grpSpPr>
-      <p:grpSp>
-        <p:nvGrpSpPr>
-          <p:cNvPr id="28" name="그룹 27">
+      <p:sp>
+        <p:nvSpPr>
+          <p:cNvPr id="2" name="눈물 방울 1">
             <a:extLst>
               <a:ext uri="{FF2B5EF4-FFF2-40B4-BE49-F238E27FC236}">
-                <a16:creationId xmlns:a16="http://schemas.microsoft.com/office/drawing/2014/main" id="{51BA670A-2F71-F7C5-BAE0-6188C1600246}"/>
+                <a16:creationId xmlns:a16="http://schemas.microsoft.com/office/drawing/2014/main" id="{BE8B4281-8216-5937-013D-94DE341C9EDF}"/>
               </a:ext>
             </a:extLst>
           </p:cNvPr>
-          <p:cNvGrpSpPr/>
+          <p:cNvSpPr/>
           <p:nvPr/>
-        </p:nvGrpSpPr>
-        <p:grpSpPr>
+        </p:nvSpPr>
+        <p:spPr>
           <a:xfrm>
-            <a:off x="2136000" y="1265876"/>
-            <a:ext cx="7920000" cy="3960000"/>
-            <a:chOff x="2136000" y="1265876"/>
-            <a:chExt cx="7920000" cy="3963124"/>
+            <a:off x="4296000" y="3429000"/>
+            <a:ext cx="1800000" cy="1800000"/>
           </a:xfrm>
-        </p:grpSpPr>
-        <p:grpSp>
-          <p:nvGrpSpPr>
-            <p:cNvPr id="13" name="그룹 12">
-              <a:extLst>
-                <a:ext uri="{FF2B5EF4-FFF2-40B4-BE49-F238E27FC236}">
-                  <a16:creationId xmlns:a16="http://schemas.microsoft.com/office/drawing/2014/main" id="{9A3B6A26-5443-F689-A042-2EC9C0066BAC}"/>
-                </a:ext>
-              </a:extLst>
-            </p:cNvPr>
-            <p:cNvGrpSpPr/>
-            <p:nvPr/>
-          </p:nvGrpSpPr>
-          <p:grpSpPr>
-            <a:xfrm>
-              <a:off x="4296000" y="1265876"/>
-              <a:ext cx="3600000" cy="3963124"/>
-              <a:chOff x="4296000" y="1265876"/>
-              <a:chExt cx="3600000" cy="3963124"/>
-            </a:xfrm>
-          </p:grpSpPr>
-          <p:pic>
-            <p:nvPicPr>
-              <p:cNvPr id="17" name="그림 16">
-                <a:extLst>
-                  <a:ext uri="{FF2B5EF4-FFF2-40B4-BE49-F238E27FC236}">
-                    <a16:creationId xmlns:a16="http://schemas.microsoft.com/office/drawing/2014/main" id="{F5EBAD99-FF08-DB06-086A-AAF6897DA2A4}"/>
-                  </a:ext>
-                </a:extLst>
-              </p:cNvPr>
-              <p:cNvPicPr>
-                <a:picLocks noChangeAspect="1"/>
-              </p:cNvPicPr>
-              <p:nvPr/>
-            </p:nvPicPr>
-            <p:blipFill>
-              <a:blip r:embed="rId2">
-                <a:extLst>
-                  <a:ext uri="{28A0092B-C50C-407E-A947-70E740481C1C}">
-                    <a14:useLocalDpi xmlns:a14="http://schemas.microsoft.com/office/drawing/2010/main" val="0"/>
-                  </a:ext>
-                </a:extLst>
-              </a:blip>
-              <a:stretch>
-                <a:fillRect/>
-              </a:stretch>
-            </p:blipFill>
-            <p:spPr>
-              <a:xfrm>
-                <a:off x="4296000" y="1629000"/>
-                <a:ext cx="3600000" cy="3600000"/>
-              </a:xfrm>
-              <a:prstGeom prst="rect">
-                <a:avLst/>
-              </a:prstGeom>
-            </p:spPr>
-          </p:pic>
-          <p:sp>
-            <p:nvSpPr>
-              <p:cNvPr id="12" name="직사각형 11">
-                <a:extLst>
-                  <a:ext uri="{FF2B5EF4-FFF2-40B4-BE49-F238E27FC236}">
-                    <a16:creationId xmlns:a16="http://schemas.microsoft.com/office/drawing/2014/main" id="{F5538747-7BDD-27C1-86FD-3E70D08257C4}"/>
-                  </a:ext>
-                </a:extLst>
-              </p:cNvPr>
-              <p:cNvSpPr/>
-              <p:nvPr/>
-            </p:nvSpPr>
-            <p:spPr>
-              <a:xfrm>
-                <a:off x="5556000" y="1265876"/>
-                <a:ext cx="1080000" cy="360000"/>
-              </a:xfrm>
-              <a:prstGeom prst="rect">
-                <a:avLst/>
-              </a:prstGeom>
-              <a:solidFill>
-                <a:schemeClr val="bg1"/>
-              </a:solidFill>
-              <a:ln>
-                <a:noFill/>
-              </a:ln>
-            </p:spPr>
-            <p:style>
-              <a:lnRef idx="2">
-                <a:schemeClr val="accent1">
-                  <a:shade val="50000"/>
-                </a:schemeClr>
-              </a:lnRef>
-              <a:fillRef idx="1">
-                <a:schemeClr val="accent1"/>
-              </a:fillRef>
-              <a:effectRef idx="0">
-                <a:schemeClr val="accent1"/>
-              </a:effectRef>
-              <a:fontRef idx="minor">
-                <a:schemeClr val="lt1"/>
-              </a:fontRef>
-            </p:style>
-            <p:txBody>
-              <a:bodyPr rtlCol="0" anchor="ctr"/>
-              <a:lstStyle/>
-              <a:p>
-                <a:pPr algn="ctr"/>
-                <a:endParaRPr lang="ko-KR" altLang="en-US"/>
-              </a:p>
-            </p:txBody>
-          </p:sp>
-        </p:grpSp>
-        <p:sp>
-          <p:nvSpPr>
-            <p:cNvPr id="24" name="직사각형 23">
-              <a:extLst>
-                <a:ext uri="{FF2B5EF4-FFF2-40B4-BE49-F238E27FC236}">
-                  <a16:creationId xmlns:a16="http://schemas.microsoft.com/office/drawing/2014/main" id="{15B49D55-C007-98E2-8E76-C9E026748FDE}"/>
-                </a:ext>
-              </a:extLst>
-            </p:cNvPr>
-            <p:cNvSpPr/>
-            <p:nvPr/>
-          </p:nvSpPr>
-          <p:spPr>
-            <a:xfrm>
-              <a:off x="2136000" y="1625876"/>
-              <a:ext cx="2160000" cy="720000"/>
-            </a:xfrm>
-            <a:prstGeom prst="rect">
-              <a:avLst/>
-            </a:prstGeom>
+          <a:prstGeom prst="teardrop">
+            <a:avLst/>
+          </a:prstGeom>
+          <a:solidFill>
+            <a:srgbClr val="33A474"/>
+          </a:solidFill>
+          <a:ln>
             <a:noFill/>
-            <a:ln>
-              <a:noFill/>
-            </a:ln>
-            <a:effectLst>
-              <a:outerShdw blurRad="50800" dist="38100" dir="2700000" algn="tl" rotWithShape="0">
-                <a:srgbClr val="FF6565"/>
-              </a:outerShdw>
-            </a:effectLst>
-          </p:spPr>
-          <p:style>
-            <a:lnRef idx="2">
-              <a:schemeClr val="accent1">
-                <a:shade val="50000"/>
-              </a:schemeClr>
-            </a:lnRef>
-            <a:fillRef idx="1">
-              <a:schemeClr val="accent1"/>
-            </a:fillRef>
-            <a:effectRef idx="0">
-              <a:schemeClr val="accent1"/>
-            </a:effectRef>
-            <a:fontRef idx="minor">
-              <a:schemeClr val="lt1"/>
-            </a:fontRef>
-          </p:style>
-          <p:txBody>
-            <a:bodyPr rtlCol="0" anchor="ctr"/>
-            <a:lstStyle/>
-            <a:p>
-              <a:pPr algn="ctr"/>
-              <a:r>
-                <a:rPr lang="en-US" altLang="ko-KR" sz="2000" b="1" dirty="0">
-                  <a:solidFill>
-                    <a:srgbClr val="FF6565"/>
-                  </a:solidFill>
-                  <a:latin typeface="Calibri" panose="020F0502020204030204" pitchFamily="34" charset="0"/>
-                  <a:cs typeface="Calibri" panose="020F0502020204030204" pitchFamily="34" charset="0"/>
-                </a:rPr>
-                <a:t>            Dominance</a:t>
-              </a:r>
-            </a:p>
-            <a:p>
-              <a:pPr algn="ctr"/>
-              <a:r>
-                <a:rPr lang="en-US" altLang="ko-KR" sz="2000" b="1" dirty="0">
-                  <a:solidFill>
-                    <a:srgbClr val="FF6565"/>
-                  </a:solidFill>
-                  <a:latin typeface="Calibri" panose="020F0502020204030204" pitchFamily="34" charset="0"/>
-                  <a:cs typeface="Calibri" panose="020F0502020204030204" pitchFamily="34" charset="0"/>
-                </a:rPr>
-                <a:t>             (</a:t>
-              </a:r>
-              <a:r>
-                <a:rPr lang="ko-KR" altLang="en-US" sz="2000" b="1" dirty="0">
-                  <a:solidFill>
-                    <a:srgbClr val="FF6565"/>
-                  </a:solidFill>
-                  <a:latin typeface="Calibri" panose="020F0502020204030204" pitchFamily="34" charset="0"/>
-                  <a:cs typeface="Calibri" panose="020F0502020204030204" pitchFamily="34" charset="0"/>
-                </a:rPr>
-                <a:t>주도형</a:t>
-              </a:r>
-              <a:r>
-                <a:rPr lang="en-US" altLang="ko-KR" sz="2000" b="1" dirty="0">
-                  <a:solidFill>
-                    <a:srgbClr val="FF6565"/>
-                  </a:solidFill>
-                  <a:latin typeface="Calibri" panose="020F0502020204030204" pitchFamily="34" charset="0"/>
-                  <a:cs typeface="Calibri" panose="020F0502020204030204" pitchFamily="34" charset="0"/>
-                </a:rPr>
-                <a:t>)</a:t>
-              </a:r>
-              <a:endParaRPr lang="ko-KR" altLang="en-US" sz="2000" b="1" dirty="0">
-                <a:solidFill>
-                  <a:srgbClr val="FF6565"/>
-                </a:solidFill>
-                <a:latin typeface="Calibri" panose="020F0502020204030204" pitchFamily="34" charset="0"/>
-                <a:cs typeface="Calibri" panose="020F0502020204030204" pitchFamily="34" charset="0"/>
-              </a:endParaRPr>
-            </a:p>
-          </p:txBody>
-        </p:sp>
-        <p:sp>
-          <p:nvSpPr>
-            <p:cNvPr id="25" name="직사각형 24">
-              <a:extLst>
-                <a:ext uri="{FF2B5EF4-FFF2-40B4-BE49-F238E27FC236}">
-                  <a16:creationId xmlns:a16="http://schemas.microsoft.com/office/drawing/2014/main" id="{87681379-2838-F2E0-E472-2C4284CC06D7}"/>
-                </a:ext>
-              </a:extLst>
-            </p:cNvPr>
-            <p:cNvSpPr/>
-            <p:nvPr/>
-          </p:nvSpPr>
-          <p:spPr>
-            <a:xfrm>
-              <a:off x="7896000" y="4509000"/>
-              <a:ext cx="2160000" cy="720000"/>
-            </a:xfrm>
-            <a:prstGeom prst="rect">
-              <a:avLst/>
-            </a:prstGeom>
+          </a:ln>
+        </p:spPr>
+        <p:style>
+          <a:lnRef idx="2">
+            <a:schemeClr val="accent1">
+              <a:shade val="50000"/>
+            </a:schemeClr>
+          </a:lnRef>
+          <a:fillRef idx="1">
+            <a:schemeClr val="accent1"/>
+          </a:fillRef>
+          <a:effectRef idx="0">
+            <a:schemeClr val="accent1"/>
+          </a:effectRef>
+          <a:fontRef idx="minor">
+            <a:schemeClr val="lt1"/>
+          </a:fontRef>
+        </p:style>
+        <p:txBody>
+          <a:bodyPr rtlCol="0" anchor="ctr"/>
+          <a:lstStyle/>
+          <a:p>
+            <a:pPr algn="ctr"/>
+            <a:endParaRPr lang="ko-KR" altLang="en-US"/>
+          </a:p>
+        </p:txBody>
+      </p:sp>
+      <p:sp>
+        <p:nvSpPr>
+          <p:cNvPr id="3" name="눈물 방울 2">
+            <a:extLst>
+              <a:ext uri="{FF2B5EF4-FFF2-40B4-BE49-F238E27FC236}">
+                <a16:creationId xmlns:a16="http://schemas.microsoft.com/office/drawing/2014/main" id="{8272ECAF-D77D-79CF-B2EB-B03292653F01}"/>
+              </a:ext>
+            </a:extLst>
+          </p:cNvPr>
+          <p:cNvSpPr/>
+          <p:nvPr/>
+        </p:nvSpPr>
+        <p:spPr>
+          <a:xfrm flipV="1">
+            <a:off x="4296000" y="1629000"/>
+            <a:ext cx="1800000" cy="1800000"/>
+          </a:xfrm>
+          <a:prstGeom prst="teardrop">
+            <a:avLst/>
+          </a:prstGeom>
+          <a:solidFill>
+            <a:srgbClr val="F25E62"/>
+          </a:solidFill>
+          <a:ln>
             <a:noFill/>
-            <a:ln>
-              <a:noFill/>
-            </a:ln>
-            <a:effectLst>
-              <a:outerShdw blurRad="50800" dist="38100" dir="2700000" algn="tl" rotWithShape="0">
-                <a:srgbClr val="77F586"/>
-              </a:outerShdw>
-            </a:effectLst>
-          </p:spPr>
-          <p:style>
-            <a:lnRef idx="2">
-              <a:schemeClr val="accent1">
-                <a:shade val="50000"/>
-              </a:schemeClr>
-            </a:lnRef>
-            <a:fillRef idx="1">
-              <a:schemeClr val="accent1"/>
-            </a:fillRef>
-            <a:effectRef idx="0">
-              <a:schemeClr val="accent1"/>
-            </a:effectRef>
-            <a:fontRef idx="minor">
-              <a:schemeClr val="lt1"/>
-            </a:fontRef>
-          </p:style>
-          <p:txBody>
-            <a:bodyPr rtlCol="0" anchor="ctr"/>
-            <a:lstStyle/>
-            <a:p>
-              <a:pPr algn="ctr"/>
-              <a:r>
-                <a:rPr lang="en-US" altLang="ko-KR" sz="2000" b="1" dirty="0">
-                  <a:solidFill>
-                    <a:srgbClr val="77F586"/>
-                  </a:solidFill>
-                  <a:latin typeface="Calibri" panose="020F0502020204030204" pitchFamily="34" charset="0"/>
-                  <a:cs typeface="Calibri" panose="020F0502020204030204" pitchFamily="34" charset="0"/>
-                </a:rPr>
-                <a:t>Conscientiousness</a:t>
-              </a:r>
-            </a:p>
-            <a:p>
-              <a:pPr algn="ctr"/>
-              <a:r>
-                <a:rPr lang="en-US" altLang="ko-KR" sz="2000" b="1" dirty="0">
-                  <a:solidFill>
-                    <a:srgbClr val="77F586"/>
-                  </a:solidFill>
-                  <a:latin typeface="Calibri" panose="020F0502020204030204" pitchFamily="34" charset="0"/>
-                  <a:cs typeface="Calibri" panose="020F0502020204030204" pitchFamily="34" charset="0"/>
-                </a:rPr>
-                <a:t>(</a:t>
-              </a:r>
-              <a:r>
-                <a:rPr lang="ko-KR" altLang="en-US" sz="2000" b="1" dirty="0">
-                  <a:solidFill>
-                    <a:srgbClr val="77F586"/>
-                  </a:solidFill>
-                  <a:latin typeface="Calibri" panose="020F0502020204030204" pitchFamily="34" charset="0"/>
-                  <a:cs typeface="Calibri" panose="020F0502020204030204" pitchFamily="34" charset="0"/>
-                </a:rPr>
-                <a:t>신중형</a:t>
-              </a:r>
-              <a:r>
-                <a:rPr lang="en-US" altLang="ko-KR" sz="2000" b="1" dirty="0">
-                  <a:solidFill>
-                    <a:srgbClr val="77F586"/>
-                  </a:solidFill>
-                  <a:latin typeface="Calibri" panose="020F0502020204030204" pitchFamily="34" charset="0"/>
-                  <a:cs typeface="Calibri" panose="020F0502020204030204" pitchFamily="34" charset="0"/>
-                </a:rPr>
-                <a:t>)</a:t>
-              </a:r>
-              <a:endParaRPr lang="ko-KR" altLang="en-US" sz="2000" b="1" dirty="0">
-                <a:solidFill>
-                  <a:srgbClr val="77F586"/>
-                </a:solidFill>
-                <a:latin typeface="Calibri" panose="020F0502020204030204" pitchFamily="34" charset="0"/>
-                <a:cs typeface="Calibri" panose="020F0502020204030204" pitchFamily="34" charset="0"/>
-              </a:endParaRPr>
-            </a:p>
-          </p:txBody>
-        </p:sp>
-        <p:sp>
-          <p:nvSpPr>
-            <p:cNvPr id="26" name="직사각형 25">
-              <a:extLst>
-                <a:ext uri="{FF2B5EF4-FFF2-40B4-BE49-F238E27FC236}">
-                  <a16:creationId xmlns:a16="http://schemas.microsoft.com/office/drawing/2014/main" id="{E0527936-EBDB-DA4A-E70C-558F9A76B7EB}"/>
-                </a:ext>
-              </a:extLst>
-            </p:cNvPr>
-            <p:cNvSpPr/>
-            <p:nvPr/>
-          </p:nvSpPr>
-          <p:spPr>
-            <a:xfrm>
-              <a:off x="2136000" y="4509000"/>
-              <a:ext cx="2160000" cy="720000"/>
-            </a:xfrm>
-            <a:prstGeom prst="rect">
-              <a:avLst/>
-            </a:prstGeom>
+          </a:ln>
+        </p:spPr>
+        <p:style>
+          <a:lnRef idx="2">
+            <a:schemeClr val="accent1">
+              <a:shade val="50000"/>
+            </a:schemeClr>
+          </a:lnRef>
+          <a:fillRef idx="1">
+            <a:schemeClr val="accent1"/>
+          </a:fillRef>
+          <a:effectRef idx="0">
+            <a:schemeClr val="accent1"/>
+          </a:effectRef>
+          <a:fontRef idx="minor">
+            <a:schemeClr val="lt1"/>
+          </a:fontRef>
+        </p:style>
+        <p:txBody>
+          <a:bodyPr rtlCol="0" anchor="ctr"/>
+          <a:lstStyle/>
+          <a:p>
+            <a:pPr algn="ctr"/>
+            <a:endParaRPr lang="ko-KR" altLang="en-US"/>
+          </a:p>
+        </p:txBody>
+      </p:sp>
+      <p:sp>
+        <p:nvSpPr>
+          <p:cNvPr id="4" name="눈물 방울 3">
+            <a:extLst>
+              <a:ext uri="{FF2B5EF4-FFF2-40B4-BE49-F238E27FC236}">
+                <a16:creationId xmlns:a16="http://schemas.microsoft.com/office/drawing/2014/main" id="{B2D768C7-EA57-B8CF-6172-B38D96F0DBD5}"/>
+              </a:ext>
+            </a:extLst>
+          </p:cNvPr>
+          <p:cNvSpPr/>
+          <p:nvPr/>
+        </p:nvSpPr>
+        <p:spPr>
+          <a:xfrm flipH="1">
+            <a:off x="6096000" y="3429000"/>
+            <a:ext cx="1800000" cy="1800000"/>
+          </a:xfrm>
+          <a:prstGeom prst="teardrop">
+            <a:avLst/>
+          </a:prstGeom>
+          <a:solidFill>
+            <a:srgbClr val="4298B4"/>
+          </a:solidFill>
+          <a:ln>
             <a:noFill/>
-            <a:ln>
-              <a:noFill/>
-            </a:ln>
-            <a:effectLst>
-              <a:outerShdw blurRad="50800" dist="38100" dir="2700000" algn="tl" rotWithShape="0">
-                <a:srgbClr val="93ADDD"/>
-              </a:outerShdw>
-            </a:effectLst>
-          </p:spPr>
-          <p:style>
-            <a:lnRef idx="2">
-              <a:schemeClr val="accent1">
-                <a:shade val="50000"/>
-              </a:schemeClr>
-            </a:lnRef>
-            <a:fillRef idx="1">
-              <a:schemeClr val="accent1"/>
-            </a:fillRef>
-            <a:effectRef idx="0">
-              <a:schemeClr val="accent1"/>
-            </a:effectRef>
-            <a:fontRef idx="minor">
-              <a:schemeClr val="lt1"/>
-            </a:fontRef>
-          </p:style>
-          <p:txBody>
-            <a:bodyPr rtlCol="0" anchor="ctr"/>
-            <a:lstStyle/>
-            <a:p>
-              <a:pPr algn="ctr"/>
-              <a:r>
-                <a:rPr lang="en-US" altLang="ko-KR" sz="2000" b="1" dirty="0">
-                  <a:solidFill>
-                    <a:srgbClr val="93ADDD"/>
-                  </a:solidFill>
-                  <a:latin typeface="Calibri" panose="020F0502020204030204" pitchFamily="34" charset="0"/>
-                  <a:cs typeface="Calibri" panose="020F0502020204030204" pitchFamily="34" charset="0"/>
-                </a:rPr>
-                <a:t>             Steadiness</a:t>
-              </a:r>
-            </a:p>
-            <a:p>
-              <a:pPr algn="ctr"/>
-              <a:r>
-                <a:rPr lang="en-US" altLang="ko-KR" sz="2000" b="1" dirty="0">
-                  <a:solidFill>
-                    <a:srgbClr val="93ADDD"/>
-                  </a:solidFill>
-                  <a:latin typeface="Calibri" panose="020F0502020204030204" pitchFamily="34" charset="0"/>
-                  <a:cs typeface="Calibri" panose="020F0502020204030204" pitchFamily="34" charset="0"/>
-                </a:rPr>
-                <a:t>             (</a:t>
-              </a:r>
-              <a:r>
-                <a:rPr lang="ko-KR" altLang="en-US" sz="2000" b="1" dirty="0">
-                  <a:solidFill>
-                    <a:srgbClr val="93ADDD"/>
-                  </a:solidFill>
-                  <a:latin typeface="Calibri" panose="020F0502020204030204" pitchFamily="34" charset="0"/>
-                  <a:cs typeface="Calibri" panose="020F0502020204030204" pitchFamily="34" charset="0"/>
-                </a:rPr>
-                <a:t>안정형</a:t>
-              </a:r>
-              <a:r>
-                <a:rPr lang="en-US" altLang="ko-KR" sz="2000" b="1" dirty="0">
-                  <a:solidFill>
-                    <a:srgbClr val="93ADDD"/>
-                  </a:solidFill>
-                  <a:latin typeface="Calibri" panose="020F0502020204030204" pitchFamily="34" charset="0"/>
-                  <a:cs typeface="Calibri" panose="020F0502020204030204" pitchFamily="34" charset="0"/>
-                </a:rPr>
-                <a:t>)</a:t>
-              </a:r>
-              <a:endParaRPr lang="ko-KR" altLang="en-US" sz="2000" b="1" dirty="0">
-                <a:solidFill>
-                  <a:srgbClr val="93ADDD"/>
-                </a:solidFill>
-                <a:latin typeface="Calibri" panose="020F0502020204030204" pitchFamily="34" charset="0"/>
-                <a:cs typeface="Calibri" panose="020F0502020204030204" pitchFamily="34" charset="0"/>
-              </a:endParaRPr>
-            </a:p>
-          </p:txBody>
-        </p:sp>
-        <p:sp>
-          <p:nvSpPr>
-            <p:cNvPr id="27" name="직사각형 26">
-              <a:extLst>
-                <a:ext uri="{FF2B5EF4-FFF2-40B4-BE49-F238E27FC236}">
-                  <a16:creationId xmlns:a16="http://schemas.microsoft.com/office/drawing/2014/main" id="{A6DC82A2-6D76-7FC2-C58A-D0822ACCB373}"/>
-                </a:ext>
-              </a:extLst>
-            </p:cNvPr>
-            <p:cNvSpPr/>
-            <p:nvPr/>
-          </p:nvSpPr>
-          <p:spPr>
-            <a:xfrm>
-              <a:off x="7896000" y="1625876"/>
-              <a:ext cx="2160000" cy="720000"/>
-            </a:xfrm>
-            <a:prstGeom prst="rect">
-              <a:avLst/>
-            </a:prstGeom>
+          </a:ln>
+        </p:spPr>
+        <p:style>
+          <a:lnRef idx="2">
+            <a:schemeClr val="accent1">
+              <a:shade val="50000"/>
+            </a:schemeClr>
+          </a:lnRef>
+          <a:fillRef idx="1">
+            <a:schemeClr val="accent1"/>
+          </a:fillRef>
+          <a:effectRef idx="0">
+            <a:schemeClr val="accent1"/>
+          </a:effectRef>
+          <a:fontRef idx="minor">
+            <a:schemeClr val="lt1"/>
+          </a:fontRef>
+        </p:style>
+        <p:txBody>
+          <a:bodyPr rtlCol="0" anchor="ctr"/>
+          <a:lstStyle/>
+          <a:p>
+            <a:pPr algn="ctr"/>
+            <a:endParaRPr lang="ko-KR" altLang="en-US"/>
+          </a:p>
+        </p:txBody>
+      </p:sp>
+      <p:sp>
+        <p:nvSpPr>
+          <p:cNvPr id="5" name="눈물 방울 4">
+            <a:extLst>
+              <a:ext uri="{FF2B5EF4-FFF2-40B4-BE49-F238E27FC236}">
+                <a16:creationId xmlns:a16="http://schemas.microsoft.com/office/drawing/2014/main" id="{3A00EF10-9337-EBA5-3EFA-1C05487A8CD1}"/>
+              </a:ext>
+            </a:extLst>
+          </p:cNvPr>
+          <p:cNvSpPr/>
+          <p:nvPr/>
+        </p:nvSpPr>
+        <p:spPr>
+          <a:xfrm flipH="1" flipV="1">
+            <a:off x="6096000" y="1629000"/>
+            <a:ext cx="1800000" cy="1800000"/>
+          </a:xfrm>
+          <a:prstGeom prst="teardrop">
+            <a:avLst/>
+          </a:prstGeom>
+          <a:solidFill>
+            <a:srgbClr val="E4AE3A"/>
+          </a:solidFill>
+          <a:ln>
             <a:noFill/>
-            <a:ln>
-              <a:noFill/>
-            </a:ln>
-            <a:effectLst>
-              <a:outerShdw blurRad="50800" dist="38100" dir="2700000" algn="tl" rotWithShape="0">
-                <a:srgbClr val="FFC000"/>
-              </a:outerShdw>
-            </a:effectLst>
-          </p:spPr>
-          <p:style>
-            <a:lnRef idx="2">
-              <a:schemeClr val="accent1">
-                <a:shade val="50000"/>
-              </a:schemeClr>
-            </a:lnRef>
-            <a:fillRef idx="1">
-              <a:schemeClr val="accent1"/>
-            </a:fillRef>
-            <a:effectRef idx="0">
-              <a:schemeClr val="accent1"/>
-            </a:effectRef>
-            <a:fontRef idx="minor">
-              <a:schemeClr val="lt1"/>
-            </a:fontRef>
-          </p:style>
-          <p:txBody>
-            <a:bodyPr rtlCol="0" anchor="ctr"/>
-            <a:lstStyle/>
-            <a:p>
-              <a:r>
-                <a:rPr lang="en-US" altLang="ko-KR" sz="2000" b="1" dirty="0">
-                  <a:solidFill>
-                    <a:schemeClr val="accent2">
-                      <a:lumMod val="40000"/>
-                      <a:lumOff val="60000"/>
-                    </a:schemeClr>
-                  </a:solidFill>
-                  <a:latin typeface="Calibri" panose="020F0502020204030204" pitchFamily="34" charset="0"/>
-                  <a:cs typeface="Calibri" panose="020F0502020204030204" pitchFamily="34" charset="0"/>
-                </a:rPr>
-                <a:t>Influence</a:t>
-              </a:r>
-            </a:p>
-            <a:p>
-              <a:r>
-                <a:rPr lang="en-US" altLang="ko-KR" sz="2000" b="1" dirty="0">
-                  <a:solidFill>
-                    <a:schemeClr val="accent2">
-                      <a:lumMod val="40000"/>
-                      <a:lumOff val="60000"/>
-                    </a:schemeClr>
-                  </a:solidFill>
-                  <a:latin typeface="Calibri" panose="020F0502020204030204" pitchFamily="34" charset="0"/>
-                  <a:cs typeface="Calibri" panose="020F0502020204030204" pitchFamily="34" charset="0"/>
-                </a:rPr>
-                <a:t> (</a:t>
-              </a:r>
-              <a:r>
-                <a:rPr lang="ko-KR" altLang="en-US" sz="2000" b="1" dirty="0">
-                  <a:solidFill>
-                    <a:schemeClr val="accent2">
-                      <a:lumMod val="40000"/>
-                      <a:lumOff val="60000"/>
-                    </a:schemeClr>
-                  </a:solidFill>
-                  <a:latin typeface="Calibri" panose="020F0502020204030204" pitchFamily="34" charset="0"/>
-                  <a:cs typeface="Calibri" panose="020F0502020204030204" pitchFamily="34" charset="0"/>
-                </a:rPr>
-                <a:t>사교형</a:t>
-              </a:r>
-              <a:r>
-                <a:rPr lang="en-US" altLang="ko-KR" sz="2000" b="1" dirty="0">
-                  <a:solidFill>
-                    <a:schemeClr val="accent2">
-                      <a:lumMod val="40000"/>
-                      <a:lumOff val="60000"/>
-                    </a:schemeClr>
-                  </a:solidFill>
-                  <a:latin typeface="Calibri" panose="020F0502020204030204" pitchFamily="34" charset="0"/>
-                  <a:cs typeface="Calibri" panose="020F0502020204030204" pitchFamily="34" charset="0"/>
-                </a:rPr>
-                <a:t>)</a:t>
-              </a:r>
-              <a:endParaRPr lang="ko-KR" altLang="en-US" sz="2000" b="1" dirty="0">
-                <a:solidFill>
-                  <a:schemeClr val="accent2">
-                    <a:lumMod val="40000"/>
-                    <a:lumOff val="60000"/>
-                  </a:schemeClr>
-                </a:solidFill>
-                <a:latin typeface="Calibri" panose="020F0502020204030204" pitchFamily="34" charset="0"/>
-                <a:cs typeface="Calibri" panose="020F0502020204030204" pitchFamily="34" charset="0"/>
-              </a:endParaRPr>
-            </a:p>
-          </p:txBody>
-        </p:sp>
-      </p:grpSp>
+          </a:ln>
+        </p:spPr>
+        <p:style>
+          <a:lnRef idx="2">
+            <a:schemeClr val="accent1">
+              <a:shade val="50000"/>
+            </a:schemeClr>
+          </a:lnRef>
+          <a:fillRef idx="1">
+            <a:schemeClr val="accent1"/>
+          </a:fillRef>
+          <a:effectRef idx="0">
+            <a:schemeClr val="accent1"/>
+          </a:effectRef>
+          <a:fontRef idx="minor">
+            <a:schemeClr val="lt1"/>
+          </a:fontRef>
+        </p:style>
+        <p:txBody>
+          <a:bodyPr rtlCol="0" anchor="ctr"/>
+          <a:lstStyle/>
+          <a:p>
+            <a:pPr algn="ctr"/>
+            <a:endParaRPr lang="ko-KR" altLang="en-US"/>
+          </a:p>
+        </p:txBody>
+      </p:sp>
     </p:spTree>
     <p:extLst>
       <p:ext uri="{BB962C8B-B14F-4D97-AF65-F5344CB8AC3E}">
@@ -4433,6 +4218,2040 @@
 </file>
 
 <file path=ppt/slides/slide3.xml><?xml version="1.0" encoding="utf-8"?>
+<p:sld xmlns:a="http://schemas.openxmlformats.org/drawingml/2006/main" xmlns:r="http://schemas.openxmlformats.org/officeDocument/2006/relationships" xmlns:p="http://schemas.openxmlformats.org/presentationml/2006/main">
+  <p:cSld>
+    <p:spTree>
+      <p:nvGrpSpPr>
+        <p:cNvPr id="1" name=""/>
+        <p:cNvGrpSpPr/>
+        <p:nvPr/>
+      </p:nvGrpSpPr>
+      <p:grpSpPr>
+        <a:xfrm>
+          <a:off x="0" y="0"/>
+          <a:ext cx="0" cy="0"/>
+          <a:chOff x="0" y="0"/>
+          <a:chExt cx="0" cy="0"/>
+        </a:xfrm>
+      </p:grpSpPr>
+      <p:grpSp>
+        <p:nvGrpSpPr>
+          <p:cNvPr id="18" name="그룹 17">
+            <a:extLst>
+              <a:ext uri="{FF2B5EF4-FFF2-40B4-BE49-F238E27FC236}">
+                <a16:creationId xmlns:a16="http://schemas.microsoft.com/office/drawing/2014/main" id="{AFD8DBEC-35E0-D719-A0CD-D8240C637A01}"/>
+              </a:ext>
+            </a:extLst>
+          </p:cNvPr>
+          <p:cNvGrpSpPr/>
+          <p:nvPr/>
+        </p:nvGrpSpPr>
+        <p:grpSpPr>
+          <a:xfrm>
+            <a:off x="4296000" y="1629000"/>
+            <a:ext cx="3600000" cy="3600000"/>
+            <a:chOff x="4296000" y="1629000"/>
+            <a:chExt cx="3600000" cy="3600000"/>
+          </a:xfrm>
+        </p:grpSpPr>
+        <p:sp>
+          <p:nvSpPr>
+            <p:cNvPr id="2" name="눈물 방울 1">
+              <a:extLst>
+                <a:ext uri="{FF2B5EF4-FFF2-40B4-BE49-F238E27FC236}">
+                  <a16:creationId xmlns:a16="http://schemas.microsoft.com/office/drawing/2014/main" id="{BE8B4281-8216-5937-013D-94DE341C9EDF}"/>
+                </a:ext>
+              </a:extLst>
+            </p:cNvPr>
+            <p:cNvSpPr/>
+            <p:nvPr/>
+          </p:nvSpPr>
+          <p:spPr>
+            <a:xfrm>
+              <a:off x="4296000" y="3429000"/>
+              <a:ext cx="1800000" cy="1800000"/>
+            </a:xfrm>
+            <a:prstGeom prst="teardrop">
+              <a:avLst/>
+            </a:prstGeom>
+            <a:solidFill>
+              <a:srgbClr val="8DE389"/>
+            </a:solidFill>
+            <a:ln>
+              <a:noFill/>
+            </a:ln>
+          </p:spPr>
+          <p:style>
+            <a:lnRef idx="2">
+              <a:schemeClr val="accent1">
+                <a:shade val="50000"/>
+              </a:schemeClr>
+            </a:lnRef>
+            <a:fillRef idx="1">
+              <a:schemeClr val="accent1"/>
+            </a:fillRef>
+            <a:effectRef idx="0">
+              <a:schemeClr val="accent1"/>
+            </a:effectRef>
+            <a:fontRef idx="minor">
+              <a:schemeClr val="lt1"/>
+            </a:fontRef>
+          </p:style>
+          <p:txBody>
+            <a:bodyPr rtlCol="0" anchor="ctr"/>
+            <a:lstStyle/>
+            <a:p>
+              <a:pPr algn="ctr"/>
+              <a:endParaRPr lang="ko-KR" altLang="en-US"/>
+            </a:p>
+          </p:txBody>
+        </p:sp>
+        <p:sp>
+          <p:nvSpPr>
+            <p:cNvPr id="3" name="눈물 방울 2">
+              <a:extLst>
+                <a:ext uri="{FF2B5EF4-FFF2-40B4-BE49-F238E27FC236}">
+                  <a16:creationId xmlns:a16="http://schemas.microsoft.com/office/drawing/2014/main" id="{8272ECAF-D77D-79CF-B2EB-B03292653F01}"/>
+                </a:ext>
+              </a:extLst>
+            </p:cNvPr>
+            <p:cNvSpPr/>
+            <p:nvPr/>
+          </p:nvSpPr>
+          <p:spPr>
+            <a:xfrm flipV="1">
+              <a:off x="4296000" y="1629000"/>
+              <a:ext cx="1800000" cy="1800000"/>
+            </a:xfrm>
+            <a:prstGeom prst="teardrop">
+              <a:avLst/>
+            </a:prstGeom>
+            <a:solidFill>
+              <a:srgbClr val="FF6565"/>
+            </a:solidFill>
+            <a:ln>
+              <a:noFill/>
+            </a:ln>
+          </p:spPr>
+          <p:style>
+            <a:lnRef idx="2">
+              <a:schemeClr val="accent1">
+                <a:shade val="50000"/>
+              </a:schemeClr>
+            </a:lnRef>
+            <a:fillRef idx="1">
+              <a:schemeClr val="accent1"/>
+            </a:fillRef>
+            <a:effectRef idx="0">
+              <a:schemeClr val="accent1"/>
+            </a:effectRef>
+            <a:fontRef idx="minor">
+              <a:schemeClr val="lt1"/>
+            </a:fontRef>
+          </p:style>
+          <p:txBody>
+            <a:bodyPr vert="horz" rtlCol="0" anchor="ctr"/>
+            <a:lstStyle/>
+            <a:p>
+              <a:pPr algn="ctr"/>
+              <a:endParaRPr lang="ko-KR" altLang="en-US" dirty="0"/>
+            </a:p>
+          </p:txBody>
+        </p:sp>
+        <p:sp>
+          <p:nvSpPr>
+            <p:cNvPr id="4" name="눈물 방울 3">
+              <a:extLst>
+                <a:ext uri="{FF2B5EF4-FFF2-40B4-BE49-F238E27FC236}">
+                  <a16:creationId xmlns:a16="http://schemas.microsoft.com/office/drawing/2014/main" id="{B2D768C7-EA57-B8CF-6172-B38D96F0DBD5}"/>
+                </a:ext>
+              </a:extLst>
+            </p:cNvPr>
+            <p:cNvSpPr/>
+            <p:nvPr/>
+          </p:nvSpPr>
+          <p:spPr>
+            <a:xfrm flipH="1">
+              <a:off x="6096000" y="3429000"/>
+              <a:ext cx="1800000" cy="1800000"/>
+            </a:xfrm>
+            <a:prstGeom prst="teardrop">
+              <a:avLst/>
+            </a:prstGeom>
+            <a:solidFill>
+              <a:srgbClr val="93ADDD"/>
+            </a:solidFill>
+            <a:ln>
+              <a:noFill/>
+            </a:ln>
+          </p:spPr>
+          <p:style>
+            <a:lnRef idx="2">
+              <a:schemeClr val="accent1">
+                <a:shade val="50000"/>
+              </a:schemeClr>
+            </a:lnRef>
+            <a:fillRef idx="1">
+              <a:schemeClr val="accent1"/>
+            </a:fillRef>
+            <a:effectRef idx="0">
+              <a:schemeClr val="accent1"/>
+            </a:effectRef>
+            <a:fontRef idx="minor">
+              <a:schemeClr val="lt1"/>
+            </a:fontRef>
+          </p:style>
+          <p:txBody>
+            <a:bodyPr rtlCol="0" anchor="ctr"/>
+            <a:lstStyle/>
+            <a:p>
+              <a:pPr algn="ctr"/>
+              <a:endParaRPr lang="ko-KR" altLang="en-US"/>
+            </a:p>
+          </p:txBody>
+        </p:sp>
+        <p:sp>
+          <p:nvSpPr>
+            <p:cNvPr id="5" name="눈물 방울 4">
+              <a:extLst>
+                <a:ext uri="{FF2B5EF4-FFF2-40B4-BE49-F238E27FC236}">
+                  <a16:creationId xmlns:a16="http://schemas.microsoft.com/office/drawing/2014/main" id="{3A00EF10-9337-EBA5-3EFA-1C05487A8CD1}"/>
+                </a:ext>
+              </a:extLst>
+            </p:cNvPr>
+            <p:cNvSpPr/>
+            <p:nvPr/>
+          </p:nvSpPr>
+          <p:spPr>
+            <a:xfrm flipH="1" flipV="1">
+              <a:off x="6096000" y="1629000"/>
+              <a:ext cx="1800000" cy="1800000"/>
+            </a:xfrm>
+            <a:prstGeom prst="teardrop">
+              <a:avLst/>
+            </a:prstGeom>
+            <a:solidFill>
+              <a:srgbClr val="ECC774"/>
+            </a:solidFill>
+            <a:ln>
+              <a:noFill/>
+            </a:ln>
+          </p:spPr>
+          <p:style>
+            <a:lnRef idx="2">
+              <a:schemeClr val="accent1">
+                <a:shade val="50000"/>
+              </a:schemeClr>
+            </a:lnRef>
+            <a:fillRef idx="1">
+              <a:schemeClr val="accent1"/>
+            </a:fillRef>
+            <a:effectRef idx="0">
+              <a:schemeClr val="accent1"/>
+            </a:effectRef>
+            <a:fontRef idx="minor">
+              <a:schemeClr val="lt1"/>
+            </a:fontRef>
+          </p:style>
+          <p:txBody>
+            <a:bodyPr rtlCol="0" anchor="ctr"/>
+            <a:lstStyle/>
+            <a:p>
+              <a:pPr algn="ctr"/>
+              <a:endParaRPr lang="ko-KR" altLang="en-US"/>
+            </a:p>
+          </p:txBody>
+        </p:sp>
+        <p:sp>
+          <p:nvSpPr>
+            <p:cNvPr id="6" name="TextBox 5">
+              <a:extLst>
+                <a:ext uri="{FF2B5EF4-FFF2-40B4-BE49-F238E27FC236}">
+                  <a16:creationId xmlns:a16="http://schemas.microsoft.com/office/drawing/2014/main" id="{5B3A9C16-42BD-9533-7E97-033FFD8B33D3}"/>
+                </a:ext>
+              </a:extLst>
+            </p:cNvPr>
+            <p:cNvSpPr txBox="1">
+              <a:spLocks noChangeAspect="1"/>
+            </p:cNvSpPr>
+            <p:nvPr/>
+          </p:nvSpPr>
+          <p:spPr>
+            <a:xfrm>
+              <a:off x="4296000" y="2216785"/>
+              <a:ext cx="1800000" cy="630942"/>
+            </a:xfrm>
+            <a:prstGeom prst="rect">
+              <a:avLst/>
+            </a:prstGeom>
+            <a:noFill/>
+            <a:effectLst>
+              <a:outerShdw blurRad="50800" dist="38100" dir="2700000" algn="tl" rotWithShape="0">
+                <a:prstClr val="black">
+                  <a:alpha val="40000"/>
+                </a:prstClr>
+              </a:outerShdw>
+            </a:effectLst>
+          </p:spPr>
+          <p:txBody>
+            <a:bodyPr wrap="square" rtlCol="0" anchor="ctr" anchorCtr="1">
+              <a:spAutoFit/>
+            </a:bodyPr>
+            <a:lstStyle/>
+            <a:p>
+              <a:r>
+                <a:rPr lang="en-US" altLang="ko-KR" sz="3500" b="1" dirty="0">
+                  <a:solidFill>
+                    <a:schemeClr val="bg1"/>
+                  </a:solidFill>
+                  <a:latin typeface="Calibri" panose="020F0502020204030204" pitchFamily="34" charset="0"/>
+                  <a:cs typeface="Calibri" panose="020F0502020204030204" pitchFamily="34" charset="0"/>
+                </a:rPr>
+                <a:t>D</a:t>
+              </a:r>
+              <a:endParaRPr lang="ko-KR" altLang="en-US" sz="3500" b="1" dirty="0">
+                <a:solidFill>
+                  <a:schemeClr val="bg1"/>
+                </a:solidFill>
+                <a:latin typeface="Calibri" panose="020F0502020204030204" pitchFamily="34" charset="0"/>
+                <a:cs typeface="Calibri" panose="020F0502020204030204" pitchFamily="34" charset="0"/>
+              </a:endParaRPr>
+            </a:p>
+          </p:txBody>
+        </p:sp>
+        <p:sp>
+          <p:nvSpPr>
+            <p:cNvPr id="10" name="TextBox 9">
+              <a:extLst>
+                <a:ext uri="{FF2B5EF4-FFF2-40B4-BE49-F238E27FC236}">
+                  <a16:creationId xmlns:a16="http://schemas.microsoft.com/office/drawing/2014/main" id="{96D7FEBA-B047-1B5C-8856-CCFE13AC3F23}"/>
+                </a:ext>
+              </a:extLst>
+            </p:cNvPr>
+            <p:cNvSpPr txBox="1">
+              <a:spLocks noChangeAspect="1"/>
+            </p:cNvSpPr>
+            <p:nvPr/>
+          </p:nvSpPr>
+          <p:spPr>
+            <a:xfrm>
+              <a:off x="6096000" y="2216785"/>
+              <a:ext cx="1800000" cy="630942"/>
+            </a:xfrm>
+            <a:prstGeom prst="rect">
+              <a:avLst/>
+            </a:prstGeom>
+            <a:noFill/>
+            <a:effectLst>
+              <a:outerShdw blurRad="50800" dist="38100" dir="2700000" algn="tl" rotWithShape="0">
+                <a:prstClr val="black">
+                  <a:alpha val="40000"/>
+                </a:prstClr>
+              </a:outerShdw>
+            </a:effectLst>
+          </p:spPr>
+          <p:txBody>
+            <a:bodyPr wrap="square" rtlCol="0" anchor="ctr" anchorCtr="1">
+              <a:spAutoFit/>
+            </a:bodyPr>
+            <a:lstStyle/>
+            <a:p>
+              <a:r>
+                <a:rPr lang="en-US" altLang="ko-KR" sz="3500" b="1" dirty="0">
+                  <a:solidFill>
+                    <a:schemeClr val="bg1"/>
+                  </a:solidFill>
+                  <a:latin typeface="Calibri" panose="020F0502020204030204" pitchFamily="34" charset="0"/>
+                  <a:cs typeface="Calibri" panose="020F0502020204030204" pitchFamily="34" charset="0"/>
+                </a:rPr>
+                <a:t>I</a:t>
+              </a:r>
+              <a:endParaRPr lang="ko-KR" altLang="en-US" sz="3500" b="1" dirty="0">
+                <a:solidFill>
+                  <a:schemeClr val="bg1"/>
+                </a:solidFill>
+                <a:latin typeface="Calibri" panose="020F0502020204030204" pitchFamily="34" charset="0"/>
+                <a:cs typeface="Calibri" panose="020F0502020204030204" pitchFamily="34" charset="0"/>
+              </a:endParaRPr>
+            </a:p>
+          </p:txBody>
+        </p:sp>
+        <p:sp>
+          <p:nvSpPr>
+            <p:cNvPr id="11" name="TextBox 10">
+              <a:extLst>
+                <a:ext uri="{FF2B5EF4-FFF2-40B4-BE49-F238E27FC236}">
+                  <a16:creationId xmlns:a16="http://schemas.microsoft.com/office/drawing/2014/main" id="{B167692E-041A-FC26-17F9-2BE3C1822967}"/>
+                </a:ext>
+              </a:extLst>
+            </p:cNvPr>
+            <p:cNvSpPr txBox="1">
+              <a:spLocks noChangeAspect="1"/>
+            </p:cNvSpPr>
+            <p:nvPr/>
+          </p:nvSpPr>
+          <p:spPr>
+            <a:xfrm>
+              <a:off x="4296000" y="3900316"/>
+              <a:ext cx="1800000" cy="630942"/>
+            </a:xfrm>
+            <a:prstGeom prst="rect">
+              <a:avLst/>
+            </a:prstGeom>
+            <a:noFill/>
+            <a:effectLst>
+              <a:outerShdw blurRad="50800" dist="38100" dir="2700000" algn="tl" rotWithShape="0">
+                <a:prstClr val="black">
+                  <a:alpha val="40000"/>
+                </a:prstClr>
+              </a:outerShdw>
+            </a:effectLst>
+          </p:spPr>
+          <p:txBody>
+            <a:bodyPr wrap="square" rtlCol="0" anchor="ctr" anchorCtr="1">
+              <a:spAutoFit/>
+            </a:bodyPr>
+            <a:lstStyle/>
+            <a:p>
+              <a:r>
+                <a:rPr lang="en-US" altLang="ko-KR" sz="3500" b="1" dirty="0">
+                  <a:solidFill>
+                    <a:schemeClr val="bg1"/>
+                  </a:solidFill>
+                  <a:latin typeface="Calibri" panose="020F0502020204030204" pitchFamily="34" charset="0"/>
+                  <a:cs typeface="Calibri" panose="020F0502020204030204" pitchFamily="34" charset="0"/>
+                </a:rPr>
+                <a:t>C</a:t>
+              </a:r>
+              <a:endParaRPr lang="ko-KR" altLang="en-US" sz="3500" b="1" dirty="0">
+                <a:solidFill>
+                  <a:schemeClr val="bg1"/>
+                </a:solidFill>
+                <a:latin typeface="Calibri" panose="020F0502020204030204" pitchFamily="34" charset="0"/>
+                <a:cs typeface="Calibri" panose="020F0502020204030204" pitchFamily="34" charset="0"/>
+              </a:endParaRPr>
+            </a:p>
+          </p:txBody>
+        </p:sp>
+        <p:sp>
+          <p:nvSpPr>
+            <p:cNvPr id="12" name="TextBox 11">
+              <a:extLst>
+                <a:ext uri="{FF2B5EF4-FFF2-40B4-BE49-F238E27FC236}">
+                  <a16:creationId xmlns:a16="http://schemas.microsoft.com/office/drawing/2014/main" id="{6B5FE6B7-0383-6660-505A-C66EF01EE1B7}"/>
+                </a:ext>
+              </a:extLst>
+            </p:cNvPr>
+            <p:cNvSpPr txBox="1">
+              <a:spLocks noChangeAspect="1"/>
+            </p:cNvSpPr>
+            <p:nvPr/>
+          </p:nvSpPr>
+          <p:spPr>
+            <a:xfrm>
+              <a:off x="6096000" y="3900316"/>
+              <a:ext cx="1800000" cy="630942"/>
+            </a:xfrm>
+            <a:prstGeom prst="rect">
+              <a:avLst/>
+            </a:prstGeom>
+            <a:noFill/>
+            <a:effectLst>
+              <a:outerShdw blurRad="50800" dist="38100" dir="2700000" algn="tl" rotWithShape="0">
+                <a:prstClr val="black">
+                  <a:alpha val="40000"/>
+                </a:prstClr>
+              </a:outerShdw>
+            </a:effectLst>
+          </p:spPr>
+          <p:txBody>
+            <a:bodyPr wrap="square" rtlCol="0" anchor="ctr" anchorCtr="1">
+              <a:spAutoFit/>
+            </a:bodyPr>
+            <a:lstStyle/>
+            <a:p>
+              <a:r>
+                <a:rPr lang="en-US" altLang="ko-KR" sz="3500" b="1" dirty="0">
+                  <a:solidFill>
+                    <a:schemeClr val="bg1"/>
+                  </a:solidFill>
+                  <a:latin typeface="Calibri" panose="020F0502020204030204" pitchFamily="34" charset="0"/>
+                  <a:cs typeface="Calibri" panose="020F0502020204030204" pitchFamily="34" charset="0"/>
+                </a:rPr>
+                <a:t>S</a:t>
+              </a:r>
+              <a:endParaRPr lang="ko-KR" altLang="en-US" sz="3500" b="1" dirty="0">
+                <a:solidFill>
+                  <a:schemeClr val="bg1"/>
+                </a:solidFill>
+                <a:latin typeface="Calibri" panose="020F0502020204030204" pitchFamily="34" charset="0"/>
+                <a:cs typeface="Calibri" panose="020F0502020204030204" pitchFamily="34" charset="0"/>
+              </a:endParaRPr>
+            </a:p>
+          </p:txBody>
+        </p:sp>
+      </p:grpSp>
+    </p:spTree>
+    <p:extLst>
+      <p:ext uri="{BB962C8B-B14F-4D97-AF65-F5344CB8AC3E}">
+        <p14:creationId xmlns:p14="http://schemas.microsoft.com/office/powerpoint/2010/main" val="1106104072"/>
+      </p:ext>
+    </p:extLst>
+  </p:cSld>
+  <p:clrMapOvr>
+    <a:masterClrMapping/>
+  </p:clrMapOvr>
+</p:sld>
+</file>
+
+<file path=ppt/slides/slide4.xml><?xml version="1.0" encoding="utf-8"?>
+<p:sld xmlns:a="http://schemas.openxmlformats.org/drawingml/2006/main" xmlns:r="http://schemas.openxmlformats.org/officeDocument/2006/relationships" xmlns:p="http://schemas.openxmlformats.org/presentationml/2006/main">
+  <p:cSld>
+    <p:spTree>
+      <p:nvGrpSpPr>
+        <p:cNvPr id="1" name=""/>
+        <p:cNvGrpSpPr/>
+        <p:nvPr/>
+      </p:nvGrpSpPr>
+      <p:grpSpPr>
+        <a:xfrm>
+          <a:off x="0" y="0"/>
+          <a:ext cx="0" cy="0"/>
+          <a:chOff x="0" y="0"/>
+          <a:chExt cx="0" cy="0"/>
+        </a:xfrm>
+      </p:grpSpPr>
+      <p:sp>
+        <p:nvSpPr>
+          <p:cNvPr id="7" name="TextBox 6">
+            <a:extLst>
+              <a:ext uri="{FF2B5EF4-FFF2-40B4-BE49-F238E27FC236}">
+                <a16:creationId xmlns:a16="http://schemas.microsoft.com/office/drawing/2014/main" id="{5E01C4D6-5744-18E0-ED3A-DEF432DD7294}"/>
+              </a:ext>
+            </a:extLst>
+          </p:cNvPr>
+          <p:cNvSpPr txBox="1"/>
+          <p:nvPr/>
+        </p:nvSpPr>
+        <p:spPr>
+          <a:xfrm>
+            <a:off x="2316000" y="2767280"/>
+            <a:ext cx="7560000" cy="1323439"/>
+          </a:xfrm>
+          <a:prstGeom prst="rect">
+            <a:avLst/>
+          </a:prstGeom>
+          <a:noFill/>
+          <a:effectLst>
+            <a:outerShdw blurRad="50800" dist="38100" dir="2700000" algn="tl" rotWithShape="0">
+              <a:prstClr val="black">
+                <a:alpha val="40000"/>
+              </a:prstClr>
+            </a:outerShdw>
+          </a:effectLst>
+        </p:spPr>
+        <p:txBody>
+          <a:bodyPr wrap="square" rtlCol="0" anchor="t" anchorCtr="0">
+            <a:spAutoFit/>
+          </a:bodyPr>
+          <a:lstStyle/>
+          <a:p>
+            <a:r>
+              <a:rPr lang="en-US" altLang="ko-KR" sz="8000" b="1" dirty="0">
+                <a:latin typeface="Bahnschrift Condensed" panose="020B0502040204020203" pitchFamily="34" charset="0"/>
+                <a:cs typeface="Calibri" panose="020F0502020204030204" pitchFamily="34" charset="0"/>
+              </a:rPr>
+              <a:t>Personality Behaviors</a:t>
+            </a:r>
+          </a:p>
+        </p:txBody>
+      </p:sp>
+    </p:spTree>
+    <p:extLst>
+      <p:ext uri="{BB962C8B-B14F-4D97-AF65-F5344CB8AC3E}">
+        <p14:creationId xmlns:p14="http://schemas.microsoft.com/office/powerpoint/2010/main" val="89691411"/>
+      </p:ext>
+    </p:extLst>
+  </p:cSld>
+  <p:clrMapOvr>
+    <a:masterClrMapping/>
+  </p:clrMapOvr>
+</p:sld>
+</file>
+
+<file path=ppt/slides/slide5.xml><?xml version="1.0" encoding="utf-8"?>
+<p:sld xmlns:a="http://schemas.openxmlformats.org/drawingml/2006/main" xmlns:r="http://schemas.openxmlformats.org/officeDocument/2006/relationships" xmlns:p="http://schemas.openxmlformats.org/presentationml/2006/main">
+  <p:cSld>
+    <p:spTree>
+      <p:nvGrpSpPr>
+        <p:cNvPr id="1" name=""/>
+        <p:cNvGrpSpPr/>
+        <p:nvPr/>
+      </p:nvGrpSpPr>
+      <p:grpSpPr>
+        <a:xfrm>
+          <a:off x="0" y="0"/>
+          <a:ext cx="0" cy="0"/>
+          <a:chOff x="0" y="0"/>
+          <a:chExt cx="0" cy="0"/>
+        </a:xfrm>
+      </p:grpSpPr>
+      <p:grpSp>
+        <p:nvGrpSpPr>
+          <p:cNvPr id="7" name="그룹 6">
+            <a:extLst>
+              <a:ext uri="{FF2B5EF4-FFF2-40B4-BE49-F238E27FC236}">
+                <a16:creationId xmlns:a16="http://schemas.microsoft.com/office/drawing/2014/main" id="{C783F0F8-2CDD-A9EC-8537-64E5FA034E46}"/>
+              </a:ext>
+            </a:extLst>
+          </p:cNvPr>
+          <p:cNvGrpSpPr/>
+          <p:nvPr/>
+        </p:nvGrpSpPr>
+        <p:grpSpPr>
+          <a:xfrm>
+            <a:off x="4296000" y="1629000"/>
+            <a:ext cx="3600000" cy="3600000"/>
+            <a:chOff x="4296000" y="1629000"/>
+            <a:chExt cx="3600000" cy="3600000"/>
+          </a:xfrm>
+        </p:grpSpPr>
+        <p:sp>
+          <p:nvSpPr>
+            <p:cNvPr id="2" name="눈물 방울 1">
+              <a:extLst>
+                <a:ext uri="{FF2B5EF4-FFF2-40B4-BE49-F238E27FC236}">
+                  <a16:creationId xmlns:a16="http://schemas.microsoft.com/office/drawing/2014/main" id="{BE8B4281-8216-5937-013D-94DE341C9EDF}"/>
+                </a:ext>
+              </a:extLst>
+            </p:cNvPr>
+            <p:cNvSpPr/>
+            <p:nvPr/>
+          </p:nvSpPr>
+          <p:spPr>
+            <a:xfrm>
+              <a:off x="4296000" y="3429000"/>
+              <a:ext cx="1800000" cy="1800000"/>
+            </a:xfrm>
+            <a:prstGeom prst="teardrop">
+              <a:avLst/>
+            </a:prstGeom>
+            <a:solidFill>
+              <a:srgbClr val="8DE389">
+                <a:alpha val="50000"/>
+              </a:srgbClr>
+            </a:solidFill>
+            <a:ln>
+              <a:noFill/>
+            </a:ln>
+          </p:spPr>
+          <p:style>
+            <a:lnRef idx="2">
+              <a:schemeClr val="accent1">
+                <a:shade val="50000"/>
+              </a:schemeClr>
+            </a:lnRef>
+            <a:fillRef idx="1">
+              <a:schemeClr val="accent1"/>
+            </a:fillRef>
+            <a:effectRef idx="0">
+              <a:schemeClr val="accent1"/>
+            </a:effectRef>
+            <a:fontRef idx="minor">
+              <a:schemeClr val="lt1"/>
+            </a:fontRef>
+          </p:style>
+          <p:txBody>
+            <a:bodyPr rtlCol="0" anchor="ctr"/>
+            <a:lstStyle/>
+            <a:p>
+              <a:pPr algn="ctr"/>
+              <a:endParaRPr lang="ko-KR" altLang="en-US"/>
+            </a:p>
+          </p:txBody>
+        </p:sp>
+        <p:sp>
+          <p:nvSpPr>
+            <p:cNvPr id="3" name="눈물 방울 2">
+              <a:extLst>
+                <a:ext uri="{FF2B5EF4-FFF2-40B4-BE49-F238E27FC236}">
+                  <a16:creationId xmlns:a16="http://schemas.microsoft.com/office/drawing/2014/main" id="{8272ECAF-D77D-79CF-B2EB-B03292653F01}"/>
+                </a:ext>
+              </a:extLst>
+            </p:cNvPr>
+            <p:cNvSpPr/>
+            <p:nvPr/>
+          </p:nvSpPr>
+          <p:spPr>
+            <a:xfrm flipV="1">
+              <a:off x="4296000" y="1629000"/>
+              <a:ext cx="1800000" cy="1800000"/>
+            </a:xfrm>
+            <a:prstGeom prst="teardrop">
+              <a:avLst/>
+            </a:prstGeom>
+            <a:solidFill>
+              <a:srgbClr val="FF6565">
+                <a:alpha val="50000"/>
+              </a:srgbClr>
+            </a:solidFill>
+            <a:ln>
+              <a:noFill/>
+            </a:ln>
+          </p:spPr>
+          <p:style>
+            <a:lnRef idx="2">
+              <a:schemeClr val="accent1">
+                <a:shade val="50000"/>
+              </a:schemeClr>
+            </a:lnRef>
+            <a:fillRef idx="1">
+              <a:schemeClr val="accent1"/>
+            </a:fillRef>
+            <a:effectRef idx="0">
+              <a:schemeClr val="accent1"/>
+            </a:effectRef>
+            <a:fontRef idx="minor">
+              <a:schemeClr val="lt1"/>
+            </a:fontRef>
+          </p:style>
+          <p:txBody>
+            <a:bodyPr vert="horz" rtlCol="0" anchor="ctr"/>
+            <a:lstStyle/>
+            <a:p>
+              <a:pPr algn="ctr"/>
+              <a:endParaRPr lang="ko-KR" altLang="en-US" dirty="0"/>
+            </a:p>
+          </p:txBody>
+        </p:sp>
+        <p:sp>
+          <p:nvSpPr>
+            <p:cNvPr id="4" name="눈물 방울 3">
+              <a:extLst>
+                <a:ext uri="{FF2B5EF4-FFF2-40B4-BE49-F238E27FC236}">
+                  <a16:creationId xmlns:a16="http://schemas.microsoft.com/office/drawing/2014/main" id="{B2D768C7-EA57-B8CF-6172-B38D96F0DBD5}"/>
+                </a:ext>
+              </a:extLst>
+            </p:cNvPr>
+            <p:cNvSpPr/>
+            <p:nvPr/>
+          </p:nvSpPr>
+          <p:spPr>
+            <a:xfrm flipH="1">
+              <a:off x="6096000" y="3429000"/>
+              <a:ext cx="1800000" cy="1800000"/>
+            </a:xfrm>
+            <a:prstGeom prst="teardrop">
+              <a:avLst/>
+            </a:prstGeom>
+            <a:solidFill>
+              <a:srgbClr val="93ADDD">
+                <a:alpha val="50000"/>
+              </a:srgbClr>
+            </a:solidFill>
+            <a:ln>
+              <a:noFill/>
+            </a:ln>
+          </p:spPr>
+          <p:style>
+            <a:lnRef idx="2">
+              <a:schemeClr val="accent1">
+                <a:shade val="50000"/>
+              </a:schemeClr>
+            </a:lnRef>
+            <a:fillRef idx="1">
+              <a:schemeClr val="accent1"/>
+            </a:fillRef>
+            <a:effectRef idx="0">
+              <a:schemeClr val="accent1"/>
+            </a:effectRef>
+            <a:fontRef idx="minor">
+              <a:schemeClr val="lt1"/>
+            </a:fontRef>
+          </p:style>
+          <p:txBody>
+            <a:bodyPr rtlCol="0" anchor="ctr"/>
+            <a:lstStyle/>
+            <a:p>
+              <a:pPr algn="ctr"/>
+              <a:endParaRPr lang="ko-KR" altLang="en-US"/>
+            </a:p>
+          </p:txBody>
+        </p:sp>
+        <p:sp>
+          <p:nvSpPr>
+            <p:cNvPr id="5" name="눈물 방울 4">
+              <a:extLst>
+                <a:ext uri="{FF2B5EF4-FFF2-40B4-BE49-F238E27FC236}">
+                  <a16:creationId xmlns:a16="http://schemas.microsoft.com/office/drawing/2014/main" id="{3A00EF10-9337-EBA5-3EFA-1C05487A8CD1}"/>
+                </a:ext>
+              </a:extLst>
+            </p:cNvPr>
+            <p:cNvSpPr/>
+            <p:nvPr/>
+          </p:nvSpPr>
+          <p:spPr>
+            <a:xfrm flipH="1" flipV="1">
+              <a:off x="6096000" y="1629000"/>
+              <a:ext cx="1800000" cy="1800000"/>
+            </a:xfrm>
+            <a:prstGeom prst="teardrop">
+              <a:avLst/>
+            </a:prstGeom>
+            <a:solidFill>
+              <a:srgbClr val="ECC774">
+                <a:alpha val="50000"/>
+              </a:srgbClr>
+            </a:solidFill>
+            <a:ln>
+              <a:noFill/>
+            </a:ln>
+          </p:spPr>
+          <p:style>
+            <a:lnRef idx="2">
+              <a:schemeClr val="accent1">
+                <a:shade val="50000"/>
+              </a:schemeClr>
+            </a:lnRef>
+            <a:fillRef idx="1">
+              <a:schemeClr val="accent1"/>
+            </a:fillRef>
+            <a:effectRef idx="0">
+              <a:schemeClr val="accent1"/>
+            </a:effectRef>
+            <a:fontRef idx="minor">
+              <a:schemeClr val="lt1"/>
+            </a:fontRef>
+          </p:style>
+          <p:txBody>
+            <a:bodyPr rtlCol="0" anchor="ctr"/>
+            <a:lstStyle/>
+            <a:p>
+              <a:pPr algn="ctr"/>
+              <a:endParaRPr lang="ko-KR" altLang="en-US"/>
+            </a:p>
+          </p:txBody>
+        </p:sp>
+      </p:grpSp>
+    </p:spTree>
+    <p:extLst>
+      <p:ext uri="{BB962C8B-B14F-4D97-AF65-F5344CB8AC3E}">
+        <p14:creationId xmlns:p14="http://schemas.microsoft.com/office/powerpoint/2010/main" val="4258824529"/>
+      </p:ext>
+    </p:extLst>
+  </p:cSld>
+  <p:clrMapOvr>
+    <a:masterClrMapping/>
+  </p:clrMapOvr>
+</p:sld>
+</file>
+
+<file path=ppt/slides/slide6.xml><?xml version="1.0" encoding="utf-8"?>
+<p:sld xmlns:a="http://schemas.openxmlformats.org/drawingml/2006/main" xmlns:r="http://schemas.openxmlformats.org/officeDocument/2006/relationships" xmlns:p="http://schemas.openxmlformats.org/presentationml/2006/main">
+  <p:cSld>
+    <p:spTree>
+      <p:nvGrpSpPr>
+        <p:cNvPr id="1" name=""/>
+        <p:cNvGrpSpPr/>
+        <p:nvPr/>
+      </p:nvGrpSpPr>
+      <p:grpSpPr>
+        <a:xfrm>
+          <a:off x="0" y="0"/>
+          <a:ext cx="0" cy="0"/>
+          <a:chOff x="0" y="0"/>
+          <a:chExt cx="0" cy="0"/>
+        </a:xfrm>
+      </p:grpSpPr>
+      <p:grpSp>
+        <p:nvGrpSpPr>
+          <p:cNvPr id="44" name="그룹 43">
+            <a:extLst>
+              <a:ext uri="{FF2B5EF4-FFF2-40B4-BE49-F238E27FC236}">
+                <a16:creationId xmlns:a16="http://schemas.microsoft.com/office/drawing/2014/main" id="{DA931B5D-24E5-EC4F-5C7B-F71B887DB1D0}"/>
+              </a:ext>
+            </a:extLst>
+          </p:cNvPr>
+          <p:cNvGrpSpPr/>
+          <p:nvPr/>
+        </p:nvGrpSpPr>
+        <p:grpSpPr>
+          <a:xfrm>
+            <a:off x="1946670" y="-676258"/>
+            <a:ext cx="8280000" cy="8280001"/>
+            <a:chOff x="1946670" y="-676258"/>
+            <a:chExt cx="8280000" cy="8280001"/>
+          </a:xfrm>
+        </p:grpSpPr>
+        <p:sp>
+          <p:nvSpPr>
+            <p:cNvPr id="3" name="눈물 방울 2">
+              <a:extLst>
+                <a:ext uri="{FF2B5EF4-FFF2-40B4-BE49-F238E27FC236}">
+                  <a16:creationId xmlns:a16="http://schemas.microsoft.com/office/drawing/2014/main" id="{5BE4D020-2C7E-76F7-A518-4F4535032CE5}"/>
+                </a:ext>
+              </a:extLst>
+            </p:cNvPr>
+            <p:cNvSpPr/>
+            <p:nvPr/>
+          </p:nvSpPr>
+          <p:spPr>
+            <a:xfrm>
+              <a:off x="4296000" y="3429000"/>
+              <a:ext cx="1800000" cy="1800000"/>
+            </a:xfrm>
+            <a:prstGeom prst="teardrop">
+              <a:avLst/>
+            </a:prstGeom>
+            <a:solidFill>
+              <a:srgbClr val="8DE389">
+                <a:alpha val="50000"/>
+              </a:srgbClr>
+            </a:solidFill>
+            <a:ln>
+              <a:noFill/>
+            </a:ln>
+          </p:spPr>
+          <p:style>
+            <a:lnRef idx="2">
+              <a:schemeClr val="accent1">
+                <a:shade val="50000"/>
+              </a:schemeClr>
+            </a:lnRef>
+            <a:fillRef idx="1">
+              <a:schemeClr val="accent1"/>
+            </a:fillRef>
+            <a:effectRef idx="0">
+              <a:schemeClr val="accent1"/>
+            </a:effectRef>
+            <a:fontRef idx="minor">
+              <a:schemeClr val="lt1"/>
+            </a:fontRef>
+          </p:style>
+          <p:txBody>
+            <a:bodyPr rtlCol="0" anchor="ctr"/>
+            <a:lstStyle/>
+            <a:p>
+              <a:pPr algn="ctr"/>
+              <a:endParaRPr lang="ko-KR" altLang="en-US"/>
+            </a:p>
+          </p:txBody>
+        </p:sp>
+        <p:sp>
+          <p:nvSpPr>
+            <p:cNvPr id="4" name="눈물 방울 3">
+              <a:extLst>
+                <a:ext uri="{FF2B5EF4-FFF2-40B4-BE49-F238E27FC236}">
+                  <a16:creationId xmlns:a16="http://schemas.microsoft.com/office/drawing/2014/main" id="{01BB1836-A093-D26F-AA81-DBE149C812BB}"/>
+                </a:ext>
+              </a:extLst>
+            </p:cNvPr>
+            <p:cNvSpPr/>
+            <p:nvPr/>
+          </p:nvSpPr>
+          <p:spPr>
+            <a:xfrm flipV="1">
+              <a:off x="4296000" y="1629000"/>
+              <a:ext cx="1800000" cy="1800000"/>
+            </a:xfrm>
+            <a:prstGeom prst="teardrop">
+              <a:avLst/>
+            </a:prstGeom>
+            <a:solidFill>
+              <a:srgbClr val="FF6565">
+                <a:alpha val="50000"/>
+              </a:srgbClr>
+            </a:solidFill>
+            <a:ln>
+              <a:noFill/>
+            </a:ln>
+          </p:spPr>
+          <p:style>
+            <a:lnRef idx="2">
+              <a:schemeClr val="accent1">
+                <a:shade val="50000"/>
+              </a:schemeClr>
+            </a:lnRef>
+            <a:fillRef idx="1">
+              <a:schemeClr val="accent1"/>
+            </a:fillRef>
+            <a:effectRef idx="0">
+              <a:schemeClr val="accent1"/>
+            </a:effectRef>
+            <a:fontRef idx="minor">
+              <a:schemeClr val="lt1"/>
+            </a:fontRef>
+          </p:style>
+          <p:txBody>
+            <a:bodyPr vert="horz" rtlCol="0" anchor="ctr"/>
+            <a:lstStyle/>
+            <a:p>
+              <a:pPr algn="ctr"/>
+              <a:endParaRPr lang="ko-KR" altLang="en-US" dirty="0"/>
+            </a:p>
+          </p:txBody>
+        </p:sp>
+        <p:sp>
+          <p:nvSpPr>
+            <p:cNvPr id="5" name="눈물 방울 4">
+              <a:extLst>
+                <a:ext uri="{FF2B5EF4-FFF2-40B4-BE49-F238E27FC236}">
+                  <a16:creationId xmlns:a16="http://schemas.microsoft.com/office/drawing/2014/main" id="{255A2450-CF74-B43D-200E-E6CEC014CE5E}"/>
+                </a:ext>
+              </a:extLst>
+            </p:cNvPr>
+            <p:cNvSpPr/>
+            <p:nvPr/>
+          </p:nvSpPr>
+          <p:spPr>
+            <a:xfrm flipH="1">
+              <a:off x="6096000" y="3429000"/>
+              <a:ext cx="1800000" cy="1800000"/>
+            </a:xfrm>
+            <a:prstGeom prst="teardrop">
+              <a:avLst/>
+            </a:prstGeom>
+            <a:solidFill>
+              <a:srgbClr val="93ADDD">
+                <a:alpha val="50000"/>
+              </a:srgbClr>
+            </a:solidFill>
+            <a:ln>
+              <a:noFill/>
+            </a:ln>
+          </p:spPr>
+          <p:style>
+            <a:lnRef idx="2">
+              <a:schemeClr val="accent1">
+                <a:shade val="50000"/>
+              </a:schemeClr>
+            </a:lnRef>
+            <a:fillRef idx="1">
+              <a:schemeClr val="accent1"/>
+            </a:fillRef>
+            <a:effectRef idx="0">
+              <a:schemeClr val="accent1"/>
+            </a:effectRef>
+            <a:fontRef idx="minor">
+              <a:schemeClr val="lt1"/>
+            </a:fontRef>
+          </p:style>
+          <p:txBody>
+            <a:bodyPr rtlCol="0" anchor="ctr"/>
+            <a:lstStyle/>
+            <a:p>
+              <a:pPr algn="ctr"/>
+              <a:endParaRPr lang="ko-KR" altLang="en-US"/>
+            </a:p>
+          </p:txBody>
+        </p:sp>
+        <p:sp>
+          <p:nvSpPr>
+            <p:cNvPr id="6" name="눈물 방울 5">
+              <a:extLst>
+                <a:ext uri="{FF2B5EF4-FFF2-40B4-BE49-F238E27FC236}">
+                  <a16:creationId xmlns:a16="http://schemas.microsoft.com/office/drawing/2014/main" id="{B047879E-F424-60D4-3847-8F2FDF6559E5}"/>
+                </a:ext>
+              </a:extLst>
+            </p:cNvPr>
+            <p:cNvSpPr/>
+            <p:nvPr/>
+          </p:nvSpPr>
+          <p:spPr>
+            <a:xfrm flipH="1" flipV="1">
+              <a:off x="6096000" y="1629000"/>
+              <a:ext cx="1800000" cy="1800000"/>
+            </a:xfrm>
+            <a:prstGeom prst="teardrop">
+              <a:avLst/>
+            </a:prstGeom>
+            <a:solidFill>
+              <a:srgbClr val="ECC774">
+                <a:alpha val="50000"/>
+              </a:srgbClr>
+            </a:solidFill>
+            <a:ln>
+              <a:noFill/>
+            </a:ln>
+          </p:spPr>
+          <p:style>
+            <a:lnRef idx="2">
+              <a:schemeClr val="accent1">
+                <a:shade val="50000"/>
+              </a:schemeClr>
+            </a:lnRef>
+            <a:fillRef idx="1">
+              <a:schemeClr val="accent1"/>
+            </a:fillRef>
+            <a:effectRef idx="0">
+              <a:schemeClr val="accent1"/>
+            </a:effectRef>
+            <a:fontRef idx="minor">
+              <a:schemeClr val="lt1"/>
+            </a:fontRef>
+          </p:style>
+          <p:txBody>
+            <a:bodyPr rtlCol="0" anchor="ctr"/>
+            <a:lstStyle/>
+            <a:p>
+              <a:pPr algn="ctr"/>
+              <a:endParaRPr lang="ko-KR" altLang="en-US"/>
+            </a:p>
+          </p:txBody>
+        </p:sp>
+        <p:sp>
+          <p:nvSpPr>
+            <p:cNvPr id="7" name="TextBox 6">
+              <a:extLst>
+                <a:ext uri="{FF2B5EF4-FFF2-40B4-BE49-F238E27FC236}">
+                  <a16:creationId xmlns:a16="http://schemas.microsoft.com/office/drawing/2014/main" id="{F5424526-EB6C-19E7-9474-F377EE7C9BEC}"/>
+                </a:ext>
+              </a:extLst>
+            </p:cNvPr>
+            <p:cNvSpPr txBox="1">
+              <a:spLocks noChangeAspect="1"/>
+            </p:cNvSpPr>
+            <p:nvPr/>
+          </p:nvSpPr>
+          <p:spPr>
+            <a:xfrm>
+              <a:off x="4296000" y="2213529"/>
+              <a:ext cx="1800000" cy="630942"/>
+            </a:xfrm>
+            <a:prstGeom prst="rect">
+              <a:avLst/>
+            </a:prstGeom>
+            <a:noFill/>
+            <a:effectLst>
+              <a:outerShdw blurRad="50800" dist="38100" dir="2700000" algn="tl" rotWithShape="0">
+                <a:prstClr val="black">
+                  <a:alpha val="40000"/>
+                </a:prstClr>
+              </a:outerShdw>
+            </a:effectLst>
+          </p:spPr>
+          <p:txBody>
+            <a:bodyPr wrap="square" rtlCol="0" anchor="ctr" anchorCtr="1">
+              <a:spAutoFit/>
+            </a:bodyPr>
+            <a:lstStyle/>
+            <a:p>
+              <a:r>
+                <a:rPr lang="en-US" altLang="ko-KR" sz="3500" b="1" dirty="0">
+                  <a:solidFill>
+                    <a:schemeClr val="bg1"/>
+                  </a:solidFill>
+                  <a:latin typeface="Calibri" panose="020F0502020204030204" pitchFamily="34" charset="0"/>
+                  <a:cs typeface="Calibri" panose="020F0502020204030204" pitchFamily="34" charset="0"/>
+                </a:rPr>
+                <a:t>D</a:t>
+              </a:r>
+              <a:endParaRPr lang="ko-KR" altLang="en-US" sz="3500" b="1" dirty="0">
+                <a:solidFill>
+                  <a:schemeClr val="bg1"/>
+                </a:solidFill>
+                <a:latin typeface="Calibri" panose="020F0502020204030204" pitchFamily="34" charset="0"/>
+                <a:cs typeface="Calibri" panose="020F0502020204030204" pitchFamily="34" charset="0"/>
+              </a:endParaRPr>
+            </a:p>
+          </p:txBody>
+        </p:sp>
+        <p:sp>
+          <p:nvSpPr>
+            <p:cNvPr id="8" name="TextBox 7">
+              <a:extLst>
+                <a:ext uri="{FF2B5EF4-FFF2-40B4-BE49-F238E27FC236}">
+                  <a16:creationId xmlns:a16="http://schemas.microsoft.com/office/drawing/2014/main" id="{050058C1-4A1F-BDE2-7B8B-0CBB16882EE4}"/>
+                </a:ext>
+              </a:extLst>
+            </p:cNvPr>
+            <p:cNvSpPr txBox="1">
+              <a:spLocks noChangeAspect="1"/>
+            </p:cNvSpPr>
+            <p:nvPr/>
+          </p:nvSpPr>
+          <p:spPr>
+            <a:xfrm>
+              <a:off x="6096000" y="2213529"/>
+              <a:ext cx="1800000" cy="630942"/>
+            </a:xfrm>
+            <a:prstGeom prst="rect">
+              <a:avLst/>
+            </a:prstGeom>
+            <a:noFill/>
+            <a:effectLst>
+              <a:outerShdw blurRad="50800" dist="38100" dir="2700000" algn="tl" rotWithShape="0">
+                <a:prstClr val="black">
+                  <a:alpha val="40000"/>
+                </a:prstClr>
+              </a:outerShdw>
+            </a:effectLst>
+          </p:spPr>
+          <p:txBody>
+            <a:bodyPr wrap="square" rtlCol="0" anchor="ctr" anchorCtr="1">
+              <a:spAutoFit/>
+            </a:bodyPr>
+            <a:lstStyle/>
+            <a:p>
+              <a:r>
+                <a:rPr lang="en-US" altLang="ko-KR" sz="3500" b="1" dirty="0">
+                  <a:solidFill>
+                    <a:schemeClr val="bg1"/>
+                  </a:solidFill>
+                  <a:latin typeface="Calibri" panose="020F0502020204030204" pitchFamily="34" charset="0"/>
+                  <a:cs typeface="Calibri" panose="020F0502020204030204" pitchFamily="34" charset="0"/>
+                </a:rPr>
+                <a:t>I</a:t>
+              </a:r>
+              <a:endParaRPr lang="ko-KR" altLang="en-US" sz="3500" b="1" dirty="0">
+                <a:solidFill>
+                  <a:schemeClr val="bg1"/>
+                </a:solidFill>
+                <a:latin typeface="Calibri" panose="020F0502020204030204" pitchFamily="34" charset="0"/>
+                <a:cs typeface="Calibri" panose="020F0502020204030204" pitchFamily="34" charset="0"/>
+              </a:endParaRPr>
+            </a:p>
+          </p:txBody>
+        </p:sp>
+        <p:sp>
+          <p:nvSpPr>
+            <p:cNvPr id="9" name="TextBox 8">
+              <a:extLst>
+                <a:ext uri="{FF2B5EF4-FFF2-40B4-BE49-F238E27FC236}">
+                  <a16:creationId xmlns:a16="http://schemas.microsoft.com/office/drawing/2014/main" id="{1528194D-D8FC-6CF9-1FA3-A52A49D1F169}"/>
+                </a:ext>
+              </a:extLst>
+            </p:cNvPr>
+            <p:cNvSpPr txBox="1">
+              <a:spLocks noChangeAspect="1"/>
+            </p:cNvSpPr>
+            <p:nvPr/>
+          </p:nvSpPr>
+          <p:spPr>
+            <a:xfrm>
+              <a:off x="4296000" y="4013529"/>
+              <a:ext cx="1800000" cy="630942"/>
+            </a:xfrm>
+            <a:prstGeom prst="rect">
+              <a:avLst/>
+            </a:prstGeom>
+            <a:noFill/>
+            <a:effectLst>
+              <a:outerShdw blurRad="50800" dist="38100" dir="2700000" algn="tl" rotWithShape="0">
+                <a:prstClr val="black">
+                  <a:alpha val="40000"/>
+                </a:prstClr>
+              </a:outerShdw>
+            </a:effectLst>
+          </p:spPr>
+          <p:txBody>
+            <a:bodyPr wrap="square" rtlCol="0" anchor="ctr" anchorCtr="1">
+              <a:spAutoFit/>
+            </a:bodyPr>
+            <a:lstStyle/>
+            <a:p>
+              <a:r>
+                <a:rPr lang="en-US" altLang="ko-KR" sz="3500" b="1" dirty="0">
+                  <a:solidFill>
+                    <a:schemeClr val="bg1"/>
+                  </a:solidFill>
+                  <a:latin typeface="Calibri" panose="020F0502020204030204" pitchFamily="34" charset="0"/>
+                  <a:cs typeface="Calibri" panose="020F0502020204030204" pitchFamily="34" charset="0"/>
+                </a:rPr>
+                <a:t>C</a:t>
+              </a:r>
+              <a:endParaRPr lang="ko-KR" altLang="en-US" sz="3500" b="1" dirty="0">
+                <a:solidFill>
+                  <a:schemeClr val="bg1"/>
+                </a:solidFill>
+                <a:latin typeface="Calibri" panose="020F0502020204030204" pitchFamily="34" charset="0"/>
+                <a:cs typeface="Calibri" panose="020F0502020204030204" pitchFamily="34" charset="0"/>
+              </a:endParaRPr>
+            </a:p>
+          </p:txBody>
+        </p:sp>
+        <p:sp>
+          <p:nvSpPr>
+            <p:cNvPr id="10" name="TextBox 9">
+              <a:extLst>
+                <a:ext uri="{FF2B5EF4-FFF2-40B4-BE49-F238E27FC236}">
+                  <a16:creationId xmlns:a16="http://schemas.microsoft.com/office/drawing/2014/main" id="{644FF17D-D071-2993-FEA7-867ABA3B0DED}"/>
+                </a:ext>
+              </a:extLst>
+            </p:cNvPr>
+            <p:cNvSpPr txBox="1">
+              <a:spLocks noChangeAspect="1"/>
+            </p:cNvSpPr>
+            <p:nvPr/>
+          </p:nvSpPr>
+          <p:spPr>
+            <a:xfrm>
+              <a:off x="6096000" y="4013529"/>
+              <a:ext cx="1800000" cy="630942"/>
+            </a:xfrm>
+            <a:prstGeom prst="rect">
+              <a:avLst/>
+            </a:prstGeom>
+            <a:noFill/>
+            <a:effectLst>
+              <a:outerShdw blurRad="50800" dist="38100" dir="2700000" algn="tl" rotWithShape="0">
+                <a:prstClr val="black">
+                  <a:alpha val="40000"/>
+                </a:prstClr>
+              </a:outerShdw>
+            </a:effectLst>
+          </p:spPr>
+          <p:txBody>
+            <a:bodyPr wrap="square" rtlCol="0" anchor="ctr" anchorCtr="1">
+              <a:spAutoFit/>
+            </a:bodyPr>
+            <a:lstStyle/>
+            <a:p>
+              <a:r>
+                <a:rPr lang="en-US" altLang="ko-KR" sz="3500" b="1" dirty="0">
+                  <a:solidFill>
+                    <a:schemeClr val="bg1"/>
+                  </a:solidFill>
+                  <a:latin typeface="Calibri" panose="020F0502020204030204" pitchFamily="34" charset="0"/>
+                  <a:cs typeface="Calibri" panose="020F0502020204030204" pitchFamily="34" charset="0"/>
+                </a:rPr>
+                <a:t>S</a:t>
+              </a:r>
+              <a:endParaRPr lang="ko-KR" altLang="en-US" sz="3500" b="1" dirty="0">
+                <a:solidFill>
+                  <a:schemeClr val="bg1"/>
+                </a:solidFill>
+                <a:latin typeface="Calibri" panose="020F0502020204030204" pitchFamily="34" charset="0"/>
+                <a:cs typeface="Calibri" panose="020F0502020204030204" pitchFamily="34" charset="0"/>
+              </a:endParaRPr>
+            </a:p>
+          </p:txBody>
+        </p:sp>
+        <p:sp>
+          <p:nvSpPr>
+            <p:cNvPr id="22" name="TextBox 21">
+              <a:extLst>
+                <a:ext uri="{FF2B5EF4-FFF2-40B4-BE49-F238E27FC236}">
+                  <a16:creationId xmlns:a16="http://schemas.microsoft.com/office/drawing/2014/main" id="{8A312C06-9EE9-1DA5-55AE-126125B40CBD}"/>
+                </a:ext>
+              </a:extLst>
+            </p:cNvPr>
+            <p:cNvSpPr txBox="1">
+              <a:spLocks/>
+            </p:cNvSpPr>
+            <p:nvPr/>
+          </p:nvSpPr>
+          <p:spPr>
+            <a:xfrm>
+              <a:off x="5546670" y="-676258"/>
+              <a:ext cx="1080000" cy="1440000"/>
+            </a:xfrm>
+            <a:prstGeom prst="rect">
+              <a:avLst/>
+            </a:prstGeom>
+            <a:noFill/>
+            <a:effectLst>
+              <a:outerShdw blurRad="50800" dist="38100" dir="2700000" algn="tl" rotWithShape="0">
+                <a:prstClr val="black">
+                  <a:alpha val="40000"/>
+                </a:prstClr>
+              </a:outerShdw>
+            </a:effectLst>
+          </p:spPr>
+          <p:txBody>
+            <a:bodyPr wrap="square" rtlCol="0" anchor="b" anchorCtr="0">
+              <a:spAutoFit/>
+            </a:bodyPr>
+            <a:lstStyle/>
+            <a:p>
+              <a:pPr algn="ctr"/>
+              <a:r>
+                <a:rPr lang="en-US" altLang="ko-KR" sz="2500" b="1" dirty="0">
+                  <a:solidFill>
+                    <a:schemeClr val="tx1">
+                      <a:lumMod val="50000"/>
+                      <a:lumOff val="50000"/>
+                    </a:schemeClr>
+                  </a:solidFill>
+                  <a:latin typeface="Calibri" panose="020F0502020204030204" pitchFamily="34" charset="0"/>
+                  <a:cs typeface="Calibri" panose="020F0502020204030204" pitchFamily="34" charset="0"/>
+                </a:rPr>
+                <a:t>Fast</a:t>
+              </a:r>
+              <a:endParaRPr lang="ko-KR" altLang="en-US" sz="2500" b="1" dirty="0">
+                <a:solidFill>
+                  <a:schemeClr val="tx1">
+                    <a:lumMod val="50000"/>
+                    <a:lumOff val="50000"/>
+                  </a:schemeClr>
+                </a:solidFill>
+                <a:latin typeface="Calibri" panose="020F0502020204030204" pitchFamily="34" charset="0"/>
+                <a:cs typeface="Calibri" panose="020F0502020204030204" pitchFamily="34" charset="0"/>
+              </a:endParaRPr>
+            </a:p>
+          </p:txBody>
+        </p:sp>
+        <p:sp>
+          <p:nvSpPr>
+            <p:cNvPr id="29" name="TextBox 28">
+              <a:extLst>
+                <a:ext uri="{FF2B5EF4-FFF2-40B4-BE49-F238E27FC236}">
+                  <a16:creationId xmlns:a16="http://schemas.microsoft.com/office/drawing/2014/main" id="{DFEEA724-3BC3-5F7A-E9B3-9EF715DE8CB1}"/>
+                </a:ext>
+              </a:extLst>
+            </p:cNvPr>
+            <p:cNvSpPr txBox="1">
+              <a:spLocks noChangeAspect="1"/>
+            </p:cNvSpPr>
+            <p:nvPr/>
+          </p:nvSpPr>
+          <p:spPr>
+            <a:xfrm>
+              <a:off x="1946670" y="2889000"/>
+              <a:ext cx="1440000" cy="1080000"/>
+            </a:xfrm>
+            <a:prstGeom prst="rect">
+              <a:avLst/>
+            </a:prstGeom>
+            <a:noFill/>
+            <a:effectLst>
+              <a:outerShdw blurRad="50800" dist="38100" dir="2700000" algn="tl" rotWithShape="0">
+                <a:prstClr val="black">
+                  <a:alpha val="40000"/>
+                </a:prstClr>
+              </a:outerShdw>
+            </a:effectLst>
+          </p:spPr>
+          <p:txBody>
+            <a:bodyPr wrap="square" rtlCol="0" anchor="ctr" anchorCtr="1">
+              <a:spAutoFit/>
+            </a:bodyPr>
+            <a:lstStyle/>
+            <a:p>
+              <a:pPr algn="ctr"/>
+              <a:r>
+                <a:rPr lang="en-US" altLang="ko-KR" sz="2500" b="1" dirty="0">
+                  <a:solidFill>
+                    <a:schemeClr val="tx1">
+                      <a:lumMod val="50000"/>
+                      <a:lumOff val="50000"/>
+                    </a:schemeClr>
+                  </a:solidFill>
+                  <a:latin typeface="Calibri" panose="020F0502020204030204" pitchFamily="34" charset="0"/>
+                  <a:cs typeface="Calibri" panose="020F0502020204030204" pitchFamily="34" charset="0"/>
+                </a:rPr>
+                <a:t>Task</a:t>
+              </a:r>
+            </a:p>
+            <a:p>
+              <a:pPr algn="ctr"/>
+              <a:r>
+                <a:rPr lang="en-US" altLang="ko-KR" sz="2500" b="1" dirty="0">
+                  <a:solidFill>
+                    <a:schemeClr val="tx1">
+                      <a:lumMod val="50000"/>
+                      <a:lumOff val="50000"/>
+                    </a:schemeClr>
+                  </a:solidFill>
+                  <a:latin typeface="Calibri" panose="020F0502020204030204" pitchFamily="34" charset="0"/>
+                  <a:cs typeface="Calibri" panose="020F0502020204030204" pitchFamily="34" charset="0"/>
+                </a:rPr>
+                <a:t>Oriented</a:t>
+              </a:r>
+              <a:endParaRPr lang="ko-KR" altLang="en-US" sz="2500" b="1" dirty="0">
+                <a:solidFill>
+                  <a:schemeClr val="tx1">
+                    <a:lumMod val="50000"/>
+                    <a:lumOff val="50000"/>
+                  </a:schemeClr>
+                </a:solidFill>
+                <a:latin typeface="Calibri" panose="020F0502020204030204" pitchFamily="34" charset="0"/>
+                <a:cs typeface="Calibri" panose="020F0502020204030204" pitchFamily="34" charset="0"/>
+              </a:endParaRPr>
+            </a:p>
+          </p:txBody>
+        </p:sp>
+        <p:cxnSp>
+          <p:nvCxnSpPr>
+            <p:cNvPr id="34" name="직선 화살표 연결선 33">
+              <a:extLst>
+                <a:ext uri="{FF2B5EF4-FFF2-40B4-BE49-F238E27FC236}">
+                  <a16:creationId xmlns:a16="http://schemas.microsoft.com/office/drawing/2014/main" id="{166C5CFA-FD6B-CFED-BE96-56311EC35E96}"/>
+                </a:ext>
+              </a:extLst>
+            </p:cNvPr>
+            <p:cNvCxnSpPr/>
+            <p:nvPr/>
+          </p:nvCxnSpPr>
+          <p:spPr>
+            <a:xfrm>
+              <a:off x="3386670" y="3429000"/>
+              <a:ext cx="5400000" cy="0"/>
+            </a:xfrm>
+            <a:prstGeom prst="straightConnector1">
+              <a:avLst/>
+            </a:prstGeom>
+            <a:ln w="25400">
+              <a:solidFill>
+                <a:schemeClr val="tx1">
+                  <a:lumMod val="50000"/>
+                  <a:lumOff val="50000"/>
+                </a:schemeClr>
+              </a:solidFill>
+              <a:headEnd type="triangle"/>
+              <a:tailEnd type="triangle"/>
+            </a:ln>
+          </p:spPr>
+          <p:style>
+            <a:lnRef idx="1">
+              <a:schemeClr val="accent1"/>
+            </a:lnRef>
+            <a:fillRef idx="0">
+              <a:schemeClr val="accent1"/>
+            </a:fillRef>
+            <a:effectRef idx="0">
+              <a:schemeClr val="accent1"/>
+            </a:effectRef>
+            <a:fontRef idx="minor">
+              <a:schemeClr val="tx1"/>
+            </a:fontRef>
+          </p:style>
+        </p:cxnSp>
+        <p:cxnSp>
+          <p:nvCxnSpPr>
+            <p:cNvPr id="36" name="직선 화살표 연결선 35">
+              <a:extLst>
+                <a:ext uri="{FF2B5EF4-FFF2-40B4-BE49-F238E27FC236}">
+                  <a16:creationId xmlns:a16="http://schemas.microsoft.com/office/drawing/2014/main" id="{477FDCD4-6E1C-9C28-1DE1-84DD1B7E35ED}"/>
+                </a:ext>
+              </a:extLst>
+            </p:cNvPr>
+            <p:cNvCxnSpPr/>
+            <p:nvPr/>
+          </p:nvCxnSpPr>
+          <p:spPr>
+            <a:xfrm>
+              <a:off x="6086670" y="763743"/>
+              <a:ext cx="0" cy="5400000"/>
+            </a:xfrm>
+            <a:prstGeom prst="straightConnector1">
+              <a:avLst/>
+            </a:prstGeom>
+            <a:ln w="25400">
+              <a:solidFill>
+                <a:schemeClr val="tx1">
+                  <a:lumMod val="50000"/>
+                  <a:lumOff val="50000"/>
+                </a:schemeClr>
+              </a:solidFill>
+              <a:headEnd type="triangle"/>
+              <a:tailEnd type="triangle"/>
+            </a:ln>
+          </p:spPr>
+          <p:style>
+            <a:lnRef idx="1">
+              <a:schemeClr val="accent1"/>
+            </a:lnRef>
+            <a:fillRef idx="0">
+              <a:schemeClr val="accent1"/>
+            </a:fillRef>
+            <a:effectRef idx="0">
+              <a:schemeClr val="accent1"/>
+            </a:effectRef>
+            <a:fontRef idx="minor">
+              <a:schemeClr val="tx1"/>
+            </a:fontRef>
+          </p:style>
+        </p:cxnSp>
+        <p:sp>
+          <p:nvSpPr>
+            <p:cNvPr id="37" name="TextBox 36">
+              <a:extLst>
+                <a:ext uri="{FF2B5EF4-FFF2-40B4-BE49-F238E27FC236}">
+                  <a16:creationId xmlns:a16="http://schemas.microsoft.com/office/drawing/2014/main" id="{024084B9-4A10-B9B6-4E37-5139D401B8C6}"/>
+                </a:ext>
+              </a:extLst>
+            </p:cNvPr>
+            <p:cNvSpPr txBox="1">
+              <a:spLocks noChangeAspect="1"/>
+            </p:cNvSpPr>
+            <p:nvPr/>
+          </p:nvSpPr>
+          <p:spPr>
+            <a:xfrm>
+              <a:off x="8786670" y="2889000"/>
+              <a:ext cx="1440000" cy="1080000"/>
+            </a:xfrm>
+            <a:prstGeom prst="rect">
+              <a:avLst/>
+            </a:prstGeom>
+            <a:noFill/>
+            <a:effectLst>
+              <a:outerShdw blurRad="50800" dist="38100" dir="2700000" algn="tl" rotWithShape="0">
+                <a:prstClr val="black">
+                  <a:alpha val="40000"/>
+                </a:prstClr>
+              </a:outerShdw>
+            </a:effectLst>
+          </p:spPr>
+          <p:txBody>
+            <a:bodyPr wrap="square" rtlCol="0" anchor="ctr" anchorCtr="1">
+              <a:spAutoFit/>
+            </a:bodyPr>
+            <a:lstStyle/>
+            <a:p>
+              <a:pPr algn="ctr"/>
+              <a:r>
+                <a:rPr lang="en-US" altLang="ko-KR" sz="2500" b="1" dirty="0">
+                  <a:solidFill>
+                    <a:schemeClr val="tx1">
+                      <a:lumMod val="50000"/>
+                      <a:lumOff val="50000"/>
+                    </a:schemeClr>
+                  </a:solidFill>
+                  <a:latin typeface="Calibri" panose="020F0502020204030204" pitchFamily="34" charset="0"/>
+                  <a:cs typeface="Calibri" panose="020F0502020204030204" pitchFamily="34" charset="0"/>
+                </a:rPr>
+                <a:t>People</a:t>
+              </a:r>
+            </a:p>
+            <a:p>
+              <a:pPr algn="ctr"/>
+              <a:r>
+                <a:rPr lang="en-US" altLang="ko-KR" sz="2500" b="1" dirty="0">
+                  <a:solidFill>
+                    <a:schemeClr val="tx1">
+                      <a:lumMod val="50000"/>
+                      <a:lumOff val="50000"/>
+                    </a:schemeClr>
+                  </a:solidFill>
+                  <a:latin typeface="Calibri" panose="020F0502020204030204" pitchFamily="34" charset="0"/>
+                  <a:cs typeface="Calibri" panose="020F0502020204030204" pitchFamily="34" charset="0"/>
+                </a:rPr>
+                <a:t>Oriented</a:t>
+              </a:r>
+              <a:endParaRPr lang="ko-KR" altLang="en-US" sz="2500" b="1" dirty="0">
+                <a:solidFill>
+                  <a:schemeClr val="tx1">
+                    <a:lumMod val="50000"/>
+                    <a:lumOff val="50000"/>
+                  </a:schemeClr>
+                </a:solidFill>
+                <a:latin typeface="Calibri" panose="020F0502020204030204" pitchFamily="34" charset="0"/>
+                <a:cs typeface="Calibri" panose="020F0502020204030204" pitchFamily="34" charset="0"/>
+              </a:endParaRPr>
+            </a:p>
+          </p:txBody>
+        </p:sp>
+        <p:sp>
+          <p:nvSpPr>
+            <p:cNvPr id="38" name="TextBox 37">
+              <a:extLst>
+                <a:ext uri="{FF2B5EF4-FFF2-40B4-BE49-F238E27FC236}">
+                  <a16:creationId xmlns:a16="http://schemas.microsoft.com/office/drawing/2014/main" id="{488A637F-4A8C-9F8D-3163-D3D8FEB0D4D2}"/>
+                </a:ext>
+              </a:extLst>
+            </p:cNvPr>
+            <p:cNvSpPr txBox="1">
+              <a:spLocks/>
+            </p:cNvSpPr>
+            <p:nvPr/>
+          </p:nvSpPr>
+          <p:spPr>
+            <a:xfrm>
+              <a:off x="5546670" y="6163743"/>
+              <a:ext cx="1080000" cy="1440000"/>
+            </a:xfrm>
+            <a:prstGeom prst="rect">
+              <a:avLst/>
+            </a:prstGeom>
+            <a:noFill/>
+            <a:effectLst>
+              <a:outerShdw blurRad="50800" dist="38100" dir="2700000" algn="tl" rotWithShape="0">
+                <a:prstClr val="black">
+                  <a:alpha val="40000"/>
+                </a:prstClr>
+              </a:outerShdw>
+            </a:effectLst>
+          </p:spPr>
+          <p:txBody>
+            <a:bodyPr wrap="square" rtlCol="0" anchor="t" anchorCtr="0">
+              <a:spAutoFit/>
+            </a:bodyPr>
+            <a:lstStyle/>
+            <a:p>
+              <a:pPr algn="ctr"/>
+              <a:r>
+                <a:rPr lang="en-US" altLang="ko-KR" sz="2500" b="1" dirty="0">
+                  <a:solidFill>
+                    <a:schemeClr val="tx1">
+                      <a:lumMod val="50000"/>
+                      <a:lumOff val="50000"/>
+                    </a:schemeClr>
+                  </a:solidFill>
+                  <a:latin typeface="Calibri" panose="020F0502020204030204" pitchFamily="34" charset="0"/>
+                  <a:cs typeface="Calibri" panose="020F0502020204030204" pitchFamily="34" charset="0"/>
+                </a:rPr>
+                <a:t>Slow</a:t>
+              </a:r>
+              <a:endParaRPr lang="ko-KR" altLang="en-US" sz="2500" b="1" dirty="0">
+                <a:solidFill>
+                  <a:schemeClr val="tx1">
+                    <a:lumMod val="50000"/>
+                    <a:lumOff val="50000"/>
+                  </a:schemeClr>
+                </a:solidFill>
+                <a:latin typeface="Calibri" panose="020F0502020204030204" pitchFamily="34" charset="0"/>
+                <a:cs typeface="Calibri" panose="020F0502020204030204" pitchFamily="34" charset="0"/>
+              </a:endParaRPr>
+            </a:p>
+          </p:txBody>
+        </p:sp>
+        <p:sp>
+          <p:nvSpPr>
+            <p:cNvPr id="40" name="TextBox 39">
+              <a:extLst>
+                <a:ext uri="{FF2B5EF4-FFF2-40B4-BE49-F238E27FC236}">
+                  <a16:creationId xmlns:a16="http://schemas.microsoft.com/office/drawing/2014/main" id="{DBC7311C-56DB-7237-CE58-F31541E68816}"/>
+                </a:ext>
+              </a:extLst>
+            </p:cNvPr>
+            <p:cNvSpPr txBox="1">
+              <a:spLocks/>
+            </p:cNvSpPr>
+            <p:nvPr/>
+          </p:nvSpPr>
+          <p:spPr>
+            <a:xfrm>
+              <a:off x="3386670" y="759472"/>
+              <a:ext cx="1440000" cy="720000"/>
+            </a:xfrm>
+            <a:prstGeom prst="rect">
+              <a:avLst/>
+            </a:prstGeom>
+            <a:noFill/>
+          </p:spPr>
+          <p:txBody>
+            <a:bodyPr wrap="square" rtlCol="0" anchor="ctr" anchorCtr="1">
+              <a:spAutoFit/>
+            </a:bodyPr>
+            <a:lstStyle/>
+            <a:p>
+              <a:pPr algn="ctr"/>
+              <a:r>
+                <a:rPr lang="en-US" altLang="ko-KR" b="1" dirty="0">
+                  <a:solidFill>
+                    <a:srgbClr val="FFB2B2"/>
+                  </a:solidFill>
+                  <a:latin typeface="Calibri" panose="020F0502020204030204" pitchFamily="34" charset="0"/>
+                  <a:cs typeface="Calibri" panose="020F0502020204030204" pitchFamily="34" charset="0"/>
+                </a:rPr>
+                <a:t>Dominance</a:t>
+              </a:r>
+            </a:p>
+            <a:p>
+              <a:pPr algn="ctr"/>
+              <a:r>
+                <a:rPr lang="en-US" altLang="ko-KR" b="1" dirty="0">
+                  <a:solidFill>
+                    <a:srgbClr val="FFB2B2"/>
+                  </a:solidFill>
+                  <a:latin typeface="Calibri" panose="020F0502020204030204" pitchFamily="34" charset="0"/>
+                  <a:cs typeface="Calibri" panose="020F0502020204030204" pitchFamily="34" charset="0"/>
+                </a:rPr>
+                <a:t>(</a:t>
+              </a:r>
+              <a:r>
+                <a:rPr lang="ko-KR" altLang="en-US" b="1" dirty="0">
+                  <a:solidFill>
+                    <a:srgbClr val="FFB2B2"/>
+                  </a:solidFill>
+                  <a:latin typeface="Calibri" panose="020F0502020204030204" pitchFamily="34" charset="0"/>
+                  <a:cs typeface="Calibri" panose="020F0502020204030204" pitchFamily="34" charset="0"/>
+                </a:rPr>
+                <a:t>주도형</a:t>
+              </a:r>
+              <a:r>
+                <a:rPr lang="en-US" altLang="ko-KR" b="1" dirty="0">
+                  <a:solidFill>
+                    <a:srgbClr val="FFB2B2"/>
+                  </a:solidFill>
+                  <a:latin typeface="Calibri" panose="020F0502020204030204" pitchFamily="34" charset="0"/>
+                  <a:cs typeface="Calibri" panose="020F0502020204030204" pitchFamily="34" charset="0"/>
+                </a:rPr>
+                <a:t>)</a:t>
+              </a:r>
+              <a:endParaRPr lang="ko-KR" altLang="en-US" b="1" dirty="0">
+                <a:solidFill>
+                  <a:srgbClr val="FFB2B2"/>
+                </a:solidFill>
+                <a:latin typeface="Calibri" panose="020F0502020204030204" pitchFamily="34" charset="0"/>
+                <a:cs typeface="Calibri" panose="020F0502020204030204" pitchFamily="34" charset="0"/>
+              </a:endParaRPr>
+            </a:p>
+          </p:txBody>
+        </p:sp>
+        <p:sp>
+          <p:nvSpPr>
+            <p:cNvPr id="41" name="TextBox 40">
+              <a:extLst>
+                <a:ext uri="{FF2B5EF4-FFF2-40B4-BE49-F238E27FC236}">
+                  <a16:creationId xmlns:a16="http://schemas.microsoft.com/office/drawing/2014/main" id="{A3A2F8C0-27C3-34D5-27B7-FA91EE6E0334}"/>
+                </a:ext>
+              </a:extLst>
+            </p:cNvPr>
+            <p:cNvSpPr txBox="1"/>
+            <p:nvPr/>
+          </p:nvSpPr>
+          <p:spPr>
+            <a:xfrm>
+              <a:off x="3386670" y="5443743"/>
+              <a:ext cx="1440000" cy="720000"/>
+            </a:xfrm>
+            <a:prstGeom prst="rect">
+              <a:avLst/>
+            </a:prstGeom>
+            <a:noFill/>
+          </p:spPr>
+          <p:txBody>
+            <a:bodyPr wrap="square" rtlCol="0" anchor="ctr" anchorCtr="1">
+              <a:spAutoFit/>
+            </a:bodyPr>
+            <a:lstStyle/>
+            <a:p>
+              <a:pPr algn="ctr"/>
+              <a:r>
+                <a:rPr lang="en-US" altLang="ko-KR" b="1" dirty="0">
+                  <a:solidFill>
+                    <a:srgbClr val="C6F1C4"/>
+                  </a:solidFill>
+                  <a:latin typeface="Calibri" panose="020F0502020204030204" pitchFamily="34" charset="0"/>
+                  <a:cs typeface="Calibri" panose="020F0502020204030204" pitchFamily="34" charset="0"/>
+                </a:rPr>
+                <a:t>Compliance</a:t>
+              </a:r>
+            </a:p>
+            <a:p>
+              <a:pPr algn="ctr"/>
+              <a:r>
+                <a:rPr lang="en-US" altLang="ko-KR" b="1" dirty="0">
+                  <a:solidFill>
+                    <a:srgbClr val="C6F1C4"/>
+                  </a:solidFill>
+                  <a:latin typeface="Calibri" panose="020F0502020204030204" pitchFamily="34" charset="0"/>
+                  <a:cs typeface="Calibri" panose="020F0502020204030204" pitchFamily="34" charset="0"/>
+                </a:rPr>
+                <a:t>(</a:t>
+              </a:r>
+              <a:r>
+                <a:rPr lang="ko-KR" altLang="en-US" b="1" dirty="0">
+                  <a:solidFill>
+                    <a:srgbClr val="C6F1C4"/>
+                  </a:solidFill>
+                  <a:latin typeface="Calibri" panose="020F0502020204030204" pitchFamily="34" charset="0"/>
+                  <a:cs typeface="Calibri" panose="020F0502020204030204" pitchFamily="34" charset="0"/>
+                </a:rPr>
+                <a:t>신중형</a:t>
+              </a:r>
+              <a:r>
+                <a:rPr lang="en-US" altLang="ko-KR" b="1" dirty="0">
+                  <a:solidFill>
+                    <a:srgbClr val="C6F1C4"/>
+                  </a:solidFill>
+                  <a:latin typeface="Calibri" panose="020F0502020204030204" pitchFamily="34" charset="0"/>
+                  <a:cs typeface="Calibri" panose="020F0502020204030204" pitchFamily="34" charset="0"/>
+                </a:rPr>
+                <a:t>)</a:t>
+              </a:r>
+              <a:endParaRPr lang="ko-KR" altLang="en-US" b="1" dirty="0">
+                <a:solidFill>
+                  <a:srgbClr val="C6F1C4"/>
+                </a:solidFill>
+                <a:latin typeface="Calibri" panose="020F0502020204030204" pitchFamily="34" charset="0"/>
+                <a:cs typeface="Calibri" panose="020F0502020204030204" pitchFamily="34" charset="0"/>
+              </a:endParaRPr>
+            </a:p>
+          </p:txBody>
+        </p:sp>
+        <p:sp>
+          <p:nvSpPr>
+            <p:cNvPr id="42" name="TextBox 41">
+              <a:extLst>
+                <a:ext uri="{FF2B5EF4-FFF2-40B4-BE49-F238E27FC236}">
+                  <a16:creationId xmlns:a16="http://schemas.microsoft.com/office/drawing/2014/main" id="{68B435D8-C50F-38D5-9640-E14D5FE38141}"/>
+                </a:ext>
+              </a:extLst>
+            </p:cNvPr>
+            <p:cNvSpPr txBox="1"/>
+            <p:nvPr/>
+          </p:nvSpPr>
+          <p:spPr>
+            <a:xfrm>
+              <a:off x="7346670" y="5443743"/>
+              <a:ext cx="1440000" cy="720000"/>
+            </a:xfrm>
+            <a:prstGeom prst="rect">
+              <a:avLst/>
+            </a:prstGeom>
+            <a:noFill/>
+          </p:spPr>
+          <p:txBody>
+            <a:bodyPr wrap="square" rtlCol="0" anchor="ctr" anchorCtr="1">
+              <a:spAutoFit/>
+            </a:bodyPr>
+            <a:lstStyle/>
+            <a:p>
+              <a:pPr algn="ctr"/>
+              <a:r>
+                <a:rPr lang="en-US" altLang="ko-KR" b="1" dirty="0">
+                  <a:solidFill>
+                    <a:srgbClr val="C9D6EE"/>
+                  </a:solidFill>
+                  <a:latin typeface="Calibri" panose="020F0502020204030204" pitchFamily="34" charset="0"/>
+                  <a:cs typeface="Calibri" panose="020F0502020204030204" pitchFamily="34" charset="0"/>
+                </a:rPr>
+                <a:t>Steadiness</a:t>
+              </a:r>
+            </a:p>
+            <a:p>
+              <a:pPr algn="ctr"/>
+              <a:r>
+                <a:rPr lang="en-US" altLang="ko-KR" b="1" dirty="0">
+                  <a:solidFill>
+                    <a:srgbClr val="C9D6EE"/>
+                  </a:solidFill>
+                  <a:latin typeface="Calibri" panose="020F0502020204030204" pitchFamily="34" charset="0"/>
+                  <a:cs typeface="Calibri" panose="020F0502020204030204" pitchFamily="34" charset="0"/>
+                </a:rPr>
+                <a:t>(</a:t>
+              </a:r>
+              <a:r>
+                <a:rPr lang="ko-KR" altLang="en-US" b="1" dirty="0">
+                  <a:solidFill>
+                    <a:srgbClr val="C9D6EE"/>
+                  </a:solidFill>
+                  <a:latin typeface="Calibri" panose="020F0502020204030204" pitchFamily="34" charset="0"/>
+                  <a:cs typeface="Calibri" panose="020F0502020204030204" pitchFamily="34" charset="0"/>
+                </a:rPr>
+                <a:t>안정형</a:t>
+              </a:r>
+              <a:r>
+                <a:rPr lang="en-US" altLang="ko-KR" b="1" dirty="0">
+                  <a:solidFill>
+                    <a:srgbClr val="C9D6EE"/>
+                  </a:solidFill>
+                  <a:latin typeface="Calibri" panose="020F0502020204030204" pitchFamily="34" charset="0"/>
+                  <a:cs typeface="Calibri" panose="020F0502020204030204" pitchFamily="34" charset="0"/>
+                </a:rPr>
+                <a:t>)</a:t>
+              </a:r>
+              <a:endParaRPr lang="ko-KR" altLang="en-US" b="1" dirty="0">
+                <a:solidFill>
+                  <a:srgbClr val="C9D6EE"/>
+                </a:solidFill>
+                <a:latin typeface="Calibri" panose="020F0502020204030204" pitchFamily="34" charset="0"/>
+                <a:cs typeface="Calibri" panose="020F0502020204030204" pitchFamily="34" charset="0"/>
+              </a:endParaRPr>
+            </a:p>
+          </p:txBody>
+        </p:sp>
+        <p:sp>
+          <p:nvSpPr>
+            <p:cNvPr id="43" name="TextBox 42">
+              <a:extLst>
+                <a:ext uri="{FF2B5EF4-FFF2-40B4-BE49-F238E27FC236}">
+                  <a16:creationId xmlns:a16="http://schemas.microsoft.com/office/drawing/2014/main" id="{6AB3BD57-8A6E-2432-2645-B6271DB50590}"/>
+                </a:ext>
+              </a:extLst>
+            </p:cNvPr>
+            <p:cNvSpPr txBox="1"/>
+            <p:nvPr/>
+          </p:nvSpPr>
+          <p:spPr>
+            <a:xfrm>
+              <a:off x="7346670" y="769162"/>
+              <a:ext cx="1440000" cy="720000"/>
+            </a:xfrm>
+            <a:prstGeom prst="rect">
+              <a:avLst/>
+            </a:prstGeom>
+            <a:noFill/>
+          </p:spPr>
+          <p:txBody>
+            <a:bodyPr wrap="square" rtlCol="0" anchor="ctr" anchorCtr="1">
+              <a:spAutoFit/>
+            </a:bodyPr>
+            <a:lstStyle/>
+            <a:p>
+              <a:pPr algn="ctr"/>
+              <a:r>
+                <a:rPr lang="en-US" altLang="ko-KR" b="1" dirty="0">
+                  <a:solidFill>
+                    <a:srgbClr val="F5E3B9"/>
+                  </a:solidFill>
+                  <a:latin typeface="Calibri" panose="020F0502020204030204" pitchFamily="34" charset="0"/>
+                  <a:cs typeface="Calibri" panose="020F0502020204030204" pitchFamily="34" charset="0"/>
+                </a:rPr>
+                <a:t>Influence</a:t>
+              </a:r>
+            </a:p>
+            <a:p>
+              <a:pPr algn="ctr"/>
+              <a:r>
+                <a:rPr lang="en-US" altLang="ko-KR" b="1" dirty="0">
+                  <a:solidFill>
+                    <a:srgbClr val="F5E3B9"/>
+                  </a:solidFill>
+                  <a:latin typeface="Calibri" panose="020F0502020204030204" pitchFamily="34" charset="0"/>
+                  <a:cs typeface="Calibri" panose="020F0502020204030204" pitchFamily="34" charset="0"/>
+                </a:rPr>
+                <a:t>(</a:t>
+              </a:r>
+              <a:r>
+                <a:rPr lang="ko-KR" altLang="en-US" b="1" dirty="0">
+                  <a:solidFill>
+                    <a:srgbClr val="F5E3B9"/>
+                  </a:solidFill>
+                  <a:latin typeface="Calibri" panose="020F0502020204030204" pitchFamily="34" charset="0"/>
+                  <a:cs typeface="Calibri" panose="020F0502020204030204" pitchFamily="34" charset="0"/>
+                </a:rPr>
+                <a:t>사교형</a:t>
+              </a:r>
+              <a:r>
+                <a:rPr lang="en-US" altLang="ko-KR" b="1" dirty="0">
+                  <a:solidFill>
+                    <a:srgbClr val="F5E3B9"/>
+                  </a:solidFill>
+                  <a:latin typeface="Calibri" panose="020F0502020204030204" pitchFamily="34" charset="0"/>
+                  <a:cs typeface="Calibri" panose="020F0502020204030204" pitchFamily="34" charset="0"/>
+                </a:rPr>
+                <a:t>)</a:t>
+              </a:r>
+              <a:endParaRPr lang="ko-KR" altLang="en-US" b="1" dirty="0">
+                <a:solidFill>
+                  <a:srgbClr val="F5E3B9"/>
+                </a:solidFill>
+                <a:latin typeface="Calibri" panose="020F0502020204030204" pitchFamily="34" charset="0"/>
+                <a:cs typeface="Calibri" panose="020F0502020204030204" pitchFamily="34" charset="0"/>
+              </a:endParaRPr>
+            </a:p>
+          </p:txBody>
+        </p:sp>
+      </p:grpSp>
+    </p:spTree>
+    <p:extLst>
+      <p:ext uri="{BB962C8B-B14F-4D97-AF65-F5344CB8AC3E}">
+        <p14:creationId xmlns:p14="http://schemas.microsoft.com/office/powerpoint/2010/main" val="1648543024"/>
+      </p:ext>
+    </p:extLst>
+  </p:cSld>
+  <p:clrMapOvr>
+    <a:masterClrMapping/>
+  </p:clrMapOvr>
+</p:sld>
+</file>
+
+<file path=ppt/slides/slide7.xml><?xml version="1.0" encoding="utf-8"?>
 <p:sld xmlns:a="http://schemas.openxmlformats.org/drawingml/2006/main" xmlns:r="http://schemas.openxmlformats.org/officeDocument/2006/relationships" xmlns:p="http://schemas.openxmlformats.org/presentationml/2006/main">
   <p:cSld>
     <p:spTree>
@@ -6804,37 +8623,7 @@
 </p:sld>
 </file>
 
-<file path=ppt/slides/slide4.xml><?xml version="1.0" encoding="utf-8"?>
-<p:sld xmlns:a="http://schemas.openxmlformats.org/drawingml/2006/main" xmlns:r="http://schemas.openxmlformats.org/officeDocument/2006/relationships" xmlns:p="http://schemas.openxmlformats.org/presentationml/2006/main">
-  <p:cSld>
-    <p:spTree>
-      <p:nvGrpSpPr>
-        <p:cNvPr id="1" name=""/>
-        <p:cNvGrpSpPr/>
-        <p:nvPr/>
-      </p:nvGrpSpPr>
-      <p:grpSpPr>
-        <a:xfrm>
-          <a:off x="0" y="0"/>
-          <a:ext cx="0" cy="0"/>
-          <a:chOff x="0" y="0"/>
-          <a:chExt cx="0" cy="0"/>
-        </a:xfrm>
-      </p:grpSpPr>
-    </p:spTree>
-    <p:extLst>
-      <p:ext uri="{BB962C8B-B14F-4D97-AF65-F5344CB8AC3E}">
-        <p14:creationId xmlns:p14="http://schemas.microsoft.com/office/powerpoint/2010/main" val="160113912"/>
-      </p:ext>
-    </p:extLst>
-  </p:cSld>
-  <p:clrMapOvr>
-    <a:masterClrMapping/>
-  </p:clrMapOvr>
-</p:sld>
-</file>
-
-<file path=ppt/slides/slide5.xml><?xml version="1.0" encoding="utf-8"?>
+<file path=ppt/slides/slide8.xml><?xml version="1.0" encoding="utf-8"?>
 <p:sld xmlns:a="http://schemas.openxmlformats.org/drawingml/2006/main" xmlns:r="http://schemas.openxmlformats.org/officeDocument/2006/relationships" xmlns:p="http://schemas.openxmlformats.org/presentationml/2006/main">
   <p:cSld>
     <p:spTree>
@@ -6900,7 +8689,7 @@
 </p:sld>
 </file>
 
-<file path=ppt/slides/slide6.xml><?xml version="1.0" encoding="utf-8"?>
+<file path=ppt/slides/slide9.xml><?xml version="1.0" encoding="utf-8"?>
 <p:sld xmlns:a="http://schemas.openxmlformats.org/drawingml/2006/main" xmlns:r="http://schemas.openxmlformats.org/officeDocument/2006/relationships" xmlns:p="http://schemas.openxmlformats.org/presentationml/2006/main">
   <p:cSld>
     <p:spTree>
@@ -7029,435 +8818,6 @@
     <p:extLst>
       <p:ext uri="{BB962C8B-B14F-4D97-AF65-F5344CB8AC3E}">
         <p14:creationId xmlns:p14="http://schemas.microsoft.com/office/powerpoint/2010/main" val="3144296427"/>
-      </p:ext>
-    </p:extLst>
-  </p:cSld>
-  <p:clrMapOvr>
-    <a:masterClrMapping/>
-  </p:clrMapOvr>
-</p:sld>
-</file>
-
-<file path=ppt/slides/slide7.xml><?xml version="1.0" encoding="utf-8"?>
-<p:sld xmlns:a="http://schemas.openxmlformats.org/drawingml/2006/main" xmlns:r="http://schemas.openxmlformats.org/officeDocument/2006/relationships" xmlns:p="http://schemas.openxmlformats.org/presentationml/2006/main">
-  <p:cSld>
-    <p:spTree>
-      <p:nvGrpSpPr>
-        <p:cNvPr id="1" name=""/>
-        <p:cNvGrpSpPr/>
-        <p:nvPr/>
-      </p:nvGrpSpPr>
-      <p:grpSpPr>
-        <a:xfrm>
-          <a:off x="0" y="0"/>
-          <a:ext cx="0" cy="0"/>
-          <a:chOff x="0" y="0"/>
-          <a:chExt cx="0" cy="0"/>
-        </a:xfrm>
-      </p:grpSpPr>
-      <p:sp>
-        <p:nvSpPr>
-          <p:cNvPr id="4" name="직사각형 3">
-            <a:extLst>
-              <a:ext uri="{FF2B5EF4-FFF2-40B4-BE49-F238E27FC236}">
-                <a16:creationId xmlns:a16="http://schemas.microsoft.com/office/drawing/2014/main" id="{CE0FEEE6-14D9-6D92-051A-47C632FCBD58}"/>
-              </a:ext>
-            </a:extLst>
-          </p:cNvPr>
-          <p:cNvSpPr/>
-          <p:nvPr/>
-        </p:nvSpPr>
-        <p:spPr>
-          <a:xfrm>
-            <a:off x="4631094" y="2687215"/>
-            <a:ext cx="1464906" cy="1483567"/>
-          </a:xfrm>
-          <a:prstGeom prst="rect">
-            <a:avLst/>
-          </a:prstGeom>
-          <a:solidFill>
-            <a:srgbClr val="F2F9F2"/>
-          </a:solidFill>
-          <a:ln>
-            <a:noFill/>
-          </a:ln>
-        </p:spPr>
-        <p:style>
-          <a:lnRef idx="2">
-            <a:schemeClr val="accent1">
-              <a:shade val="50000"/>
-            </a:schemeClr>
-          </a:lnRef>
-          <a:fillRef idx="1">
-            <a:schemeClr val="accent1"/>
-          </a:fillRef>
-          <a:effectRef idx="0">
-            <a:schemeClr val="accent1"/>
-          </a:effectRef>
-          <a:fontRef idx="minor">
-            <a:schemeClr val="lt1"/>
-          </a:fontRef>
-        </p:style>
-        <p:txBody>
-          <a:bodyPr rtlCol="0" anchor="ctr"/>
-          <a:lstStyle/>
-          <a:p>
-            <a:pPr algn="ctr"/>
-            <a:endParaRPr lang="ko-KR" altLang="en-US"/>
-          </a:p>
-        </p:txBody>
-      </p:sp>
-      <p:sp>
-        <p:nvSpPr>
-          <p:cNvPr id="5" name="직사각형 4">
-            <a:extLst>
-              <a:ext uri="{FF2B5EF4-FFF2-40B4-BE49-F238E27FC236}">
-                <a16:creationId xmlns:a16="http://schemas.microsoft.com/office/drawing/2014/main" id="{B815DEB8-8505-1640-E923-19E982D8A4F7}"/>
-              </a:ext>
-            </a:extLst>
-          </p:cNvPr>
-          <p:cNvSpPr/>
-          <p:nvPr/>
-        </p:nvSpPr>
-        <p:spPr>
-          <a:xfrm>
-            <a:off x="6096000" y="2687216"/>
-            <a:ext cx="1464906" cy="1483567"/>
-          </a:xfrm>
-          <a:prstGeom prst="rect">
-            <a:avLst/>
-          </a:prstGeom>
-          <a:solidFill>
-            <a:srgbClr val="F2DEDE"/>
-          </a:solidFill>
-          <a:ln>
-            <a:noFill/>
-          </a:ln>
-        </p:spPr>
-        <p:style>
-          <a:lnRef idx="2">
-            <a:schemeClr val="accent1">
-              <a:shade val="50000"/>
-            </a:schemeClr>
-          </a:lnRef>
-          <a:fillRef idx="1">
-            <a:schemeClr val="accent1"/>
-          </a:fillRef>
-          <a:effectRef idx="0">
-            <a:schemeClr val="accent1"/>
-          </a:effectRef>
-          <a:fontRef idx="minor">
-            <a:schemeClr val="lt1"/>
-          </a:fontRef>
-        </p:style>
-        <p:txBody>
-          <a:bodyPr rtlCol="0" anchor="ctr"/>
-          <a:lstStyle/>
-          <a:p>
-            <a:pPr algn="ctr"/>
-            <a:endParaRPr lang="ko-KR" altLang="en-US"/>
-          </a:p>
-        </p:txBody>
-      </p:sp>
-    </p:spTree>
-    <p:extLst>
-      <p:ext uri="{BB962C8B-B14F-4D97-AF65-F5344CB8AC3E}">
-        <p14:creationId xmlns:p14="http://schemas.microsoft.com/office/powerpoint/2010/main" val="1951826797"/>
-      </p:ext>
-    </p:extLst>
-  </p:cSld>
-  <p:clrMapOvr>
-    <a:masterClrMapping/>
-  </p:clrMapOvr>
-</p:sld>
-</file>
-
-<file path=ppt/slides/slide8.xml><?xml version="1.0" encoding="utf-8"?>
-<p:sld xmlns:a="http://schemas.openxmlformats.org/drawingml/2006/main" xmlns:r="http://schemas.openxmlformats.org/officeDocument/2006/relationships" xmlns:p="http://schemas.openxmlformats.org/presentationml/2006/main">
-  <p:cSld>
-    <p:spTree>
-      <p:nvGrpSpPr>
-        <p:cNvPr id="1" name=""/>
-        <p:cNvGrpSpPr/>
-        <p:nvPr/>
-      </p:nvGrpSpPr>
-      <p:grpSpPr>
-        <a:xfrm>
-          <a:off x="0" y="0"/>
-          <a:ext cx="0" cy="0"/>
-          <a:chOff x="0" y="0"/>
-          <a:chExt cx="0" cy="0"/>
-        </a:xfrm>
-      </p:grpSpPr>
-      <p:grpSp>
-        <p:nvGrpSpPr>
-          <p:cNvPr id="4" name="그룹 3">
-            <a:extLst>
-              <a:ext uri="{FF2B5EF4-FFF2-40B4-BE49-F238E27FC236}">
-                <a16:creationId xmlns:a16="http://schemas.microsoft.com/office/drawing/2014/main" id="{A1799870-32F6-737C-E121-65617D6CC2E3}"/>
-              </a:ext>
-            </a:extLst>
-          </p:cNvPr>
-          <p:cNvGrpSpPr/>
-          <p:nvPr/>
-        </p:nvGrpSpPr>
-        <p:grpSpPr>
-          <a:xfrm>
-            <a:off x="4296000" y="1630419"/>
-            <a:ext cx="3600000" cy="3597162"/>
-            <a:chOff x="4296000" y="1630419"/>
-            <a:chExt cx="3600000" cy="3597162"/>
-          </a:xfrm>
-        </p:grpSpPr>
-        <p:pic>
-          <p:nvPicPr>
-            <p:cNvPr id="17" name="그림 16">
-              <a:extLst>
-                <a:ext uri="{FF2B5EF4-FFF2-40B4-BE49-F238E27FC236}">
-                  <a16:creationId xmlns:a16="http://schemas.microsoft.com/office/drawing/2014/main" id="{F5EBAD99-FF08-DB06-086A-AAF6897DA2A4}"/>
-                </a:ext>
-              </a:extLst>
-            </p:cNvPr>
-            <p:cNvPicPr>
-              <a:picLocks noChangeAspect="1"/>
-            </p:cNvPicPr>
-            <p:nvPr/>
-          </p:nvPicPr>
-          <p:blipFill>
-            <a:blip r:embed="rId2">
-              <a:extLst>
-                <a:ext uri="{28A0092B-C50C-407E-A947-70E740481C1C}">
-                  <a14:useLocalDpi xmlns:a14="http://schemas.microsoft.com/office/drawing/2010/main" val="0"/>
-                </a:ext>
-              </a:extLst>
-            </a:blip>
-            <a:stretch>
-              <a:fillRect/>
-            </a:stretch>
-          </p:blipFill>
-          <p:spPr>
-            <a:xfrm>
-              <a:off x="4296000" y="1630419"/>
-              <a:ext cx="3600000" cy="3597162"/>
-            </a:xfrm>
-            <a:prstGeom prst="rect">
-              <a:avLst/>
-            </a:prstGeom>
-          </p:spPr>
-        </p:pic>
-        <p:sp>
-          <p:nvSpPr>
-            <p:cNvPr id="3" name="직사각형 2">
-              <a:extLst>
-                <a:ext uri="{FF2B5EF4-FFF2-40B4-BE49-F238E27FC236}">
-                  <a16:creationId xmlns:a16="http://schemas.microsoft.com/office/drawing/2014/main" id="{99DA0BAA-9587-438D-0852-50892BDB202C}"/>
-                </a:ext>
-              </a:extLst>
-            </p:cNvPr>
-            <p:cNvSpPr/>
-            <p:nvPr/>
-          </p:nvSpPr>
-          <p:spPr>
-            <a:xfrm>
-              <a:off x="4694540" y="2160970"/>
-              <a:ext cx="838512" cy="747693"/>
-            </a:xfrm>
-            <a:prstGeom prst="rect">
-              <a:avLst/>
-            </a:prstGeom>
-            <a:solidFill>
-              <a:srgbClr val="FF6565"/>
-            </a:solidFill>
-            <a:ln>
-              <a:noFill/>
-            </a:ln>
-          </p:spPr>
-          <p:style>
-            <a:lnRef idx="2">
-              <a:schemeClr val="accent1">
-                <a:shade val="50000"/>
-              </a:schemeClr>
-            </a:lnRef>
-            <a:fillRef idx="1">
-              <a:schemeClr val="accent1"/>
-            </a:fillRef>
-            <a:effectRef idx="0">
-              <a:schemeClr val="accent1"/>
-            </a:effectRef>
-            <a:fontRef idx="minor">
-              <a:schemeClr val="lt1"/>
-            </a:fontRef>
-          </p:style>
-          <p:txBody>
-            <a:bodyPr rtlCol="0" anchor="ctr"/>
-            <a:lstStyle/>
-            <a:p>
-              <a:pPr algn="ctr"/>
-              <a:endParaRPr lang="ko-KR" altLang="en-US"/>
-            </a:p>
-          </p:txBody>
-        </p:sp>
-        <p:sp>
-          <p:nvSpPr>
-            <p:cNvPr id="14" name="직사각형 13">
-              <a:extLst>
-                <a:ext uri="{FF2B5EF4-FFF2-40B4-BE49-F238E27FC236}">
-                  <a16:creationId xmlns:a16="http://schemas.microsoft.com/office/drawing/2014/main" id="{2FE3AC5B-B552-8E99-B9F3-939F3EF44767}"/>
-                </a:ext>
-              </a:extLst>
-            </p:cNvPr>
-            <p:cNvSpPr/>
-            <p:nvPr/>
-          </p:nvSpPr>
-          <p:spPr>
-            <a:xfrm>
-              <a:off x="6622058" y="4060683"/>
-              <a:ext cx="838512" cy="747693"/>
-            </a:xfrm>
-            <a:prstGeom prst="rect">
-              <a:avLst/>
-            </a:prstGeom>
-            <a:solidFill>
-              <a:srgbClr val="77F586"/>
-            </a:solidFill>
-            <a:ln>
-              <a:noFill/>
-            </a:ln>
-          </p:spPr>
-          <p:style>
-            <a:lnRef idx="2">
-              <a:schemeClr val="accent1">
-                <a:shade val="50000"/>
-              </a:schemeClr>
-            </a:lnRef>
-            <a:fillRef idx="1">
-              <a:schemeClr val="accent1"/>
-            </a:fillRef>
-            <a:effectRef idx="0">
-              <a:schemeClr val="accent1"/>
-            </a:effectRef>
-            <a:fontRef idx="minor">
-              <a:schemeClr val="lt1"/>
-            </a:fontRef>
-          </p:style>
-          <p:txBody>
-            <a:bodyPr rtlCol="0" anchor="ctr"/>
-            <a:lstStyle/>
-            <a:p>
-              <a:pPr algn="ctr"/>
-              <a:endParaRPr lang="ko-KR" altLang="en-US"/>
-            </a:p>
-          </p:txBody>
-        </p:sp>
-        <p:sp>
-          <p:nvSpPr>
-            <p:cNvPr id="15" name="직사각형 14">
-              <a:extLst>
-                <a:ext uri="{FF2B5EF4-FFF2-40B4-BE49-F238E27FC236}">
-                  <a16:creationId xmlns:a16="http://schemas.microsoft.com/office/drawing/2014/main" id="{D67B016F-828F-F227-DAC1-7C7FEEF3DC51}"/>
-                </a:ext>
-              </a:extLst>
-            </p:cNvPr>
-            <p:cNvSpPr/>
-            <p:nvPr/>
-          </p:nvSpPr>
-          <p:spPr>
-            <a:xfrm>
-              <a:off x="6658950" y="2263607"/>
-              <a:ext cx="838512" cy="747693"/>
-            </a:xfrm>
-            <a:prstGeom prst="rect">
-              <a:avLst/>
-            </a:prstGeom>
-            <a:solidFill>
-              <a:srgbClr val="FFFFAB"/>
-            </a:solidFill>
-            <a:ln>
-              <a:noFill/>
-            </a:ln>
-          </p:spPr>
-          <p:style>
-            <a:lnRef idx="2">
-              <a:schemeClr val="accent1">
-                <a:shade val="50000"/>
-              </a:schemeClr>
-            </a:lnRef>
-            <a:fillRef idx="1">
-              <a:schemeClr val="accent1"/>
-            </a:fillRef>
-            <a:effectRef idx="0">
-              <a:schemeClr val="accent1"/>
-            </a:effectRef>
-            <a:fontRef idx="minor">
-              <a:schemeClr val="lt1"/>
-            </a:fontRef>
-          </p:style>
-          <p:txBody>
-            <a:bodyPr rtlCol="0" anchor="ctr"/>
-            <a:lstStyle/>
-            <a:p>
-              <a:pPr algn="ctr"/>
-              <a:endParaRPr lang="ko-KR" altLang="en-US"/>
-            </a:p>
-          </p:txBody>
-        </p:sp>
-        <p:sp>
-          <p:nvSpPr>
-            <p:cNvPr id="16" name="직사각형 15">
-              <a:extLst>
-                <a:ext uri="{FF2B5EF4-FFF2-40B4-BE49-F238E27FC236}">
-                  <a16:creationId xmlns:a16="http://schemas.microsoft.com/office/drawing/2014/main" id="{AEE32158-1E24-1684-0AC9-CB6782003687}"/>
-                </a:ext>
-              </a:extLst>
-            </p:cNvPr>
-            <p:cNvSpPr/>
-            <p:nvPr/>
-          </p:nvSpPr>
-          <p:spPr>
-            <a:xfrm>
-              <a:off x="5039773" y="3885891"/>
-              <a:ext cx="838512" cy="747693"/>
-            </a:xfrm>
-            <a:prstGeom prst="rect">
-              <a:avLst/>
-            </a:prstGeom>
-            <a:solidFill>
-              <a:srgbClr val="93ADDD"/>
-            </a:solidFill>
-            <a:ln>
-              <a:noFill/>
-            </a:ln>
-          </p:spPr>
-          <p:style>
-            <a:lnRef idx="2">
-              <a:schemeClr val="accent1">
-                <a:shade val="50000"/>
-              </a:schemeClr>
-            </a:lnRef>
-            <a:fillRef idx="1">
-              <a:schemeClr val="accent1"/>
-            </a:fillRef>
-            <a:effectRef idx="0">
-              <a:schemeClr val="accent1"/>
-            </a:effectRef>
-            <a:fontRef idx="minor">
-              <a:schemeClr val="lt1"/>
-            </a:fontRef>
-          </p:style>
-          <p:txBody>
-            <a:bodyPr rtlCol="0" anchor="ctr"/>
-            <a:lstStyle/>
-            <a:p>
-              <a:pPr algn="ctr"/>
-              <a:endParaRPr lang="ko-KR" altLang="en-US"/>
-            </a:p>
-          </p:txBody>
-        </p:sp>
-      </p:grpSp>
-    </p:spTree>
-    <p:extLst>
-      <p:ext uri="{BB962C8B-B14F-4D97-AF65-F5344CB8AC3E}">
-        <p14:creationId xmlns:p14="http://schemas.microsoft.com/office/powerpoint/2010/main" val="373223169"/>
       </p:ext>
     </p:extLst>
   </p:cSld>

</xml_diff>

<commit_message>
[DISC-7] Result 컴포넌트 개발 13
</commit_message>
<xml_diff>
--- a/src/img/IMG.pptx
+++ b/src/img/IMG.pptx
@@ -15,6 +15,7 @@
     <p:sldId id="262" r:id="rId9"/>
     <p:sldId id="263" r:id="rId10"/>
     <p:sldId id="264" r:id="rId11"/>
+    <p:sldId id="270" r:id="rId12"/>
   </p:sldIdLst>
   <p:sldSz cx="12192000" cy="6858000"/>
   <p:notesSz cx="6858000" cy="9144000"/>
@@ -268,7 +269,7 @@
           <a:p>
             <a:fld id="{74529166-E523-47B8-A70B-56CC3122A1F0}" type="datetimeFigureOut">
               <a:rPr lang="ko-KR" altLang="en-US" smtClean="0"/>
-              <a:t>2022-08-09</a:t>
+              <a:t>2022-08-11</a:t>
             </a:fld>
             <a:endParaRPr lang="ko-KR" altLang="en-US"/>
           </a:p>
@@ -466,7 +467,7 @@
           <a:p>
             <a:fld id="{74529166-E523-47B8-A70B-56CC3122A1F0}" type="datetimeFigureOut">
               <a:rPr lang="ko-KR" altLang="en-US" smtClean="0"/>
-              <a:t>2022-08-09</a:t>
+              <a:t>2022-08-11</a:t>
             </a:fld>
             <a:endParaRPr lang="ko-KR" altLang="en-US"/>
           </a:p>
@@ -674,7 +675,7 @@
           <a:p>
             <a:fld id="{74529166-E523-47B8-A70B-56CC3122A1F0}" type="datetimeFigureOut">
               <a:rPr lang="ko-KR" altLang="en-US" smtClean="0"/>
-              <a:t>2022-08-09</a:t>
+              <a:t>2022-08-11</a:t>
             </a:fld>
             <a:endParaRPr lang="ko-KR" altLang="en-US"/>
           </a:p>
@@ -872,7 +873,7 @@
           <a:p>
             <a:fld id="{74529166-E523-47B8-A70B-56CC3122A1F0}" type="datetimeFigureOut">
               <a:rPr lang="ko-KR" altLang="en-US" smtClean="0"/>
-              <a:t>2022-08-09</a:t>
+              <a:t>2022-08-11</a:t>
             </a:fld>
             <a:endParaRPr lang="ko-KR" altLang="en-US"/>
           </a:p>
@@ -1147,7 +1148,7 @@
           <a:p>
             <a:fld id="{74529166-E523-47B8-A70B-56CC3122A1F0}" type="datetimeFigureOut">
               <a:rPr lang="ko-KR" altLang="en-US" smtClean="0"/>
-              <a:t>2022-08-09</a:t>
+              <a:t>2022-08-11</a:t>
             </a:fld>
             <a:endParaRPr lang="ko-KR" altLang="en-US"/>
           </a:p>
@@ -1412,7 +1413,7 @@
           <a:p>
             <a:fld id="{74529166-E523-47B8-A70B-56CC3122A1F0}" type="datetimeFigureOut">
               <a:rPr lang="ko-KR" altLang="en-US" smtClean="0"/>
-              <a:t>2022-08-09</a:t>
+              <a:t>2022-08-11</a:t>
             </a:fld>
             <a:endParaRPr lang="ko-KR" altLang="en-US"/>
           </a:p>
@@ -1824,7 +1825,7 @@
           <a:p>
             <a:fld id="{74529166-E523-47B8-A70B-56CC3122A1F0}" type="datetimeFigureOut">
               <a:rPr lang="ko-KR" altLang="en-US" smtClean="0"/>
-              <a:t>2022-08-09</a:t>
+              <a:t>2022-08-11</a:t>
             </a:fld>
             <a:endParaRPr lang="ko-KR" altLang="en-US"/>
           </a:p>
@@ -1965,7 +1966,7 @@
           <a:p>
             <a:fld id="{74529166-E523-47B8-A70B-56CC3122A1F0}" type="datetimeFigureOut">
               <a:rPr lang="ko-KR" altLang="en-US" smtClean="0"/>
-              <a:t>2022-08-09</a:t>
+              <a:t>2022-08-11</a:t>
             </a:fld>
             <a:endParaRPr lang="ko-KR" altLang="en-US"/>
           </a:p>
@@ -2078,7 +2079,7 @@
           <a:p>
             <a:fld id="{74529166-E523-47B8-A70B-56CC3122A1F0}" type="datetimeFigureOut">
               <a:rPr lang="ko-KR" altLang="en-US" smtClean="0"/>
-              <a:t>2022-08-09</a:t>
+              <a:t>2022-08-11</a:t>
             </a:fld>
             <a:endParaRPr lang="ko-KR" altLang="en-US"/>
           </a:p>
@@ -2389,7 +2390,7 @@
           <a:p>
             <a:fld id="{74529166-E523-47B8-A70B-56CC3122A1F0}" type="datetimeFigureOut">
               <a:rPr lang="ko-KR" altLang="en-US" smtClean="0"/>
-              <a:t>2022-08-09</a:t>
+              <a:t>2022-08-11</a:t>
             </a:fld>
             <a:endParaRPr lang="ko-KR" altLang="en-US"/>
           </a:p>
@@ -2677,7 +2678,7 @@
           <a:p>
             <a:fld id="{74529166-E523-47B8-A70B-56CC3122A1F0}" type="datetimeFigureOut">
               <a:rPr lang="ko-KR" altLang="en-US" smtClean="0"/>
-              <a:t>2022-08-09</a:t>
+              <a:t>2022-08-11</a:t>
             </a:fld>
             <a:endParaRPr lang="ko-KR" altLang="en-US"/>
           </a:p>
@@ -2918,7 +2919,7 @@
           <a:p>
             <a:fld id="{74529166-E523-47B8-A70B-56CC3122A1F0}" type="datetimeFigureOut">
               <a:rPr lang="ko-KR" altLang="en-US" smtClean="0"/>
-              <a:t>2022-08-09</a:t>
+              <a:t>2022-08-11</a:t>
             </a:fld>
             <a:endParaRPr lang="ko-KR" altLang="en-US"/>
           </a:p>
@@ -3970,6 +3971,200 @@
     <p:extLst>
       <p:ext uri="{BB962C8B-B14F-4D97-AF65-F5344CB8AC3E}">
         <p14:creationId xmlns:p14="http://schemas.microsoft.com/office/powerpoint/2010/main" val="1951826797"/>
+      </p:ext>
+    </p:extLst>
+  </p:cSld>
+  <p:clrMapOvr>
+    <a:masterClrMapping/>
+  </p:clrMapOvr>
+</p:sld>
+</file>
+
+<file path=ppt/slides/slide11.xml><?xml version="1.0" encoding="utf-8"?>
+<p:sld xmlns:a="http://schemas.openxmlformats.org/drawingml/2006/main" xmlns:r="http://schemas.openxmlformats.org/officeDocument/2006/relationships" xmlns:p="http://schemas.openxmlformats.org/presentationml/2006/main">
+  <p:cSld>
+    <p:spTree>
+      <p:nvGrpSpPr>
+        <p:cNvPr id="1" name=""/>
+        <p:cNvGrpSpPr/>
+        <p:nvPr/>
+      </p:nvGrpSpPr>
+      <p:grpSpPr>
+        <a:xfrm>
+          <a:off x="0" y="0"/>
+          <a:ext cx="0" cy="0"/>
+          <a:chOff x="0" y="0"/>
+          <a:chExt cx="0" cy="0"/>
+        </a:xfrm>
+      </p:grpSpPr>
+      <p:pic>
+        <p:nvPicPr>
+          <p:cNvPr id="3" name="그림 2">
+            <a:extLst>
+              <a:ext uri="{FF2B5EF4-FFF2-40B4-BE49-F238E27FC236}">
+                <a16:creationId xmlns:a16="http://schemas.microsoft.com/office/drawing/2014/main" id="{97A579E6-A6C6-5A19-E468-9600D0482194}"/>
+              </a:ext>
+            </a:extLst>
+          </p:cNvPr>
+          <p:cNvPicPr>
+            <a:picLocks noChangeAspect="1"/>
+          </p:cNvPicPr>
+          <p:nvPr/>
+        </p:nvPicPr>
+        <p:blipFill rotWithShape="1">
+          <a:blip r:embed="rId2">
+            <a:extLst>
+              <a:ext uri="{28A0092B-C50C-407E-A947-70E740481C1C}">
+                <a14:useLocalDpi xmlns:a14="http://schemas.microsoft.com/office/drawing/2010/main" val="0"/>
+              </a:ext>
+            </a:extLst>
+          </a:blip>
+          <a:srcRect l="62112" t="2794" r="4359" b="56189"/>
+          <a:stretch/>
+        </p:blipFill>
+        <p:spPr>
+          <a:xfrm>
+            <a:off x="4066903" y="0"/>
+            <a:ext cx="4058194" cy="6862804"/>
+          </a:xfrm>
+          <a:prstGeom prst="rect">
+            <a:avLst/>
+          </a:prstGeom>
+        </p:spPr>
+      </p:pic>
+      <p:cxnSp>
+        <p:nvCxnSpPr>
+          <p:cNvPr id="7" name="직선 연결선 6">
+            <a:extLst>
+              <a:ext uri="{FF2B5EF4-FFF2-40B4-BE49-F238E27FC236}">
+                <a16:creationId xmlns:a16="http://schemas.microsoft.com/office/drawing/2014/main" id="{0417624F-6C08-8117-2CA7-1C874310CB10}"/>
+              </a:ext>
+            </a:extLst>
+          </p:cNvPr>
+          <p:cNvCxnSpPr>
+            <a:cxnSpLocks/>
+          </p:cNvCxnSpPr>
+          <p:nvPr/>
+        </p:nvCxnSpPr>
+        <p:spPr>
+          <a:xfrm flipV="1">
+            <a:off x="4926563" y="3051110"/>
+            <a:ext cx="620486" cy="1623527"/>
+          </a:xfrm>
+          <a:prstGeom prst="line">
+            <a:avLst/>
+          </a:prstGeom>
+          <a:ln w="38100">
+            <a:solidFill>
+              <a:srgbClr val="FF0000"/>
+            </a:solidFill>
+          </a:ln>
+        </p:spPr>
+        <p:style>
+          <a:lnRef idx="1">
+            <a:schemeClr val="accent1"/>
+          </a:lnRef>
+          <a:fillRef idx="0">
+            <a:schemeClr val="accent1"/>
+          </a:fillRef>
+          <a:effectRef idx="0">
+            <a:schemeClr val="accent1"/>
+          </a:effectRef>
+          <a:fontRef idx="minor">
+            <a:schemeClr val="tx1"/>
+          </a:fontRef>
+        </p:style>
+      </p:cxnSp>
+      <p:cxnSp>
+        <p:nvCxnSpPr>
+          <p:cNvPr id="9" name="직선 연결선 8">
+            <a:extLst>
+              <a:ext uri="{FF2B5EF4-FFF2-40B4-BE49-F238E27FC236}">
+                <a16:creationId xmlns:a16="http://schemas.microsoft.com/office/drawing/2014/main" id="{2A4EF018-84C3-EB81-A95E-92356AFEB5E0}"/>
+              </a:ext>
+            </a:extLst>
+          </p:cNvPr>
+          <p:cNvCxnSpPr>
+            <a:cxnSpLocks/>
+          </p:cNvCxnSpPr>
+          <p:nvPr/>
+        </p:nvCxnSpPr>
+        <p:spPr>
+          <a:xfrm flipH="1" flipV="1">
+            <a:off x="5551714" y="3051110"/>
+            <a:ext cx="615821" cy="914400"/>
+          </a:xfrm>
+          <a:prstGeom prst="line">
+            <a:avLst/>
+          </a:prstGeom>
+          <a:ln w="38100">
+            <a:solidFill>
+              <a:srgbClr val="FF0000"/>
+            </a:solidFill>
+          </a:ln>
+        </p:spPr>
+        <p:style>
+          <a:lnRef idx="1">
+            <a:schemeClr val="accent1"/>
+          </a:lnRef>
+          <a:fillRef idx="0">
+            <a:schemeClr val="accent1"/>
+          </a:fillRef>
+          <a:effectRef idx="0">
+            <a:schemeClr val="accent1"/>
+          </a:effectRef>
+          <a:fontRef idx="minor">
+            <a:schemeClr val="tx1"/>
+          </a:fontRef>
+        </p:style>
+      </p:cxnSp>
+      <p:cxnSp>
+        <p:nvCxnSpPr>
+          <p:cNvPr id="11" name="직선 연결선 10">
+            <a:extLst>
+              <a:ext uri="{FF2B5EF4-FFF2-40B4-BE49-F238E27FC236}">
+                <a16:creationId xmlns:a16="http://schemas.microsoft.com/office/drawing/2014/main" id="{0F0A98E8-15C6-B023-ED5E-F600C5873DBE}"/>
+              </a:ext>
+            </a:extLst>
+          </p:cNvPr>
+          <p:cNvCxnSpPr>
+            <a:cxnSpLocks/>
+          </p:cNvCxnSpPr>
+          <p:nvPr/>
+        </p:nvCxnSpPr>
+        <p:spPr>
+          <a:xfrm flipH="1">
+            <a:off x="6167535" y="3303037"/>
+            <a:ext cx="559836" cy="662473"/>
+          </a:xfrm>
+          <a:prstGeom prst="line">
+            <a:avLst/>
+          </a:prstGeom>
+          <a:ln w="38100">
+            <a:solidFill>
+              <a:srgbClr val="FF0000"/>
+            </a:solidFill>
+          </a:ln>
+        </p:spPr>
+        <p:style>
+          <a:lnRef idx="1">
+            <a:schemeClr val="accent1"/>
+          </a:lnRef>
+          <a:fillRef idx="0">
+            <a:schemeClr val="accent1"/>
+          </a:fillRef>
+          <a:effectRef idx="0">
+            <a:schemeClr val="accent1"/>
+          </a:effectRef>
+          <a:fontRef idx="minor">
+            <a:schemeClr val="tx1"/>
+          </a:fontRef>
+        </p:style>
+      </p:cxnSp>
+    </p:spTree>
+    <p:extLst>
+      <p:ext uri="{BB962C8B-B14F-4D97-AF65-F5344CB8AC3E}">
+        <p14:creationId xmlns:p14="http://schemas.microsoft.com/office/powerpoint/2010/main" val="2928853985"/>
       </p:ext>
     </p:extLst>
   </p:cSld>

</xml_diff>